<commit_message>
working on azure [[t
</commit_message>
<xml_diff>
--- a/MSFT_Azure/Microsoft Azure.pptx
+++ b/MSFT_Azure/Microsoft Azure.pptx
@@ -5,22 +5,25 @@
     <p:sldMasterId id="2147483684" r:id="rId4"/>
   </p:sldMasterIdLst>
   <p:notesMasterIdLst>
-    <p:notesMasterId r:id="rId15"/>
+    <p:notesMasterId r:id="rId18"/>
   </p:notesMasterIdLst>
   <p:handoutMasterIdLst>
-    <p:handoutMasterId r:id="rId16"/>
+    <p:handoutMasterId r:id="rId19"/>
   </p:handoutMasterIdLst>
   <p:sldIdLst>
     <p:sldId id="257" r:id="rId5"/>
     <p:sldId id="317" r:id="rId6"/>
     <p:sldId id="392" r:id="rId7"/>
-    <p:sldId id="278" r:id="rId8"/>
-    <p:sldId id="279" r:id="rId9"/>
-    <p:sldId id="272" r:id="rId10"/>
-    <p:sldId id="270" r:id="rId11"/>
-    <p:sldId id="281" r:id="rId12"/>
-    <p:sldId id="321" r:id="rId13"/>
-    <p:sldId id="391" r:id="rId14"/>
+    <p:sldId id="395" r:id="rId8"/>
+    <p:sldId id="393" r:id="rId9"/>
+    <p:sldId id="394" r:id="rId10"/>
+    <p:sldId id="278" r:id="rId11"/>
+    <p:sldId id="279" r:id="rId12"/>
+    <p:sldId id="272" r:id="rId13"/>
+    <p:sldId id="270" r:id="rId14"/>
+    <p:sldId id="281" r:id="rId15"/>
+    <p:sldId id="321" r:id="rId16"/>
+    <p:sldId id="391" r:id="rId17"/>
   </p:sldIdLst>
   <p:sldSz cx="12192000" cy="6858000"/>
   <p:notesSz cx="6858000" cy="9144000"/>
@@ -4609,7 +4612,7 @@
           <a:p>
             <a:fld id="{C17F2C1D-F243-42AB-ADF2-E7CB4E04900E}" type="datetimeFigureOut">
               <a:rPr lang="en-US" smtClean="0"/>
-              <a:t>7/4/2022</a:t>
+              <a:t>7/5/2022</a:t>
             </a:fld>
             <a:endParaRPr lang="en-US"/>
           </a:p>
@@ -4786,7 +4789,7 @@
           <a:p>
             <a:fld id="{020CE34E-5667-4A32-A6BA-10C7A552BC63}" type="datetimeFigureOut">
               <a:rPr lang="en-US" smtClean="0"/>
-              <a:t>7/4/2022</a:t>
+              <a:t>7/5/2022</a:t>
             </a:fld>
             <a:endParaRPr lang="en-US"/>
           </a:p>
@@ -5349,7 +5352,7 @@
           <a:bodyPr/>
           <a:lstStyle/>
           <a:p>
-            <a:endParaRPr lang="en-US"/>
+            <a:endParaRPr lang="en-US" dirty="0"/>
           </a:p>
         </p:txBody>
       </p:sp>
@@ -5360,7 +5363,7 @@
             <a:spLocks noGrp="1"/>
           </p:cNvSpPr>
           <p:nvPr>
-            <p:ph type="sldNum" sz="quarter" idx="10"/>
+            <p:ph type="sldNum" sz="quarter" idx="5"/>
           </p:nvPr>
         </p:nvSpPr>
         <p:spPr/>
@@ -5368,9 +5371,9 @@
           <a:bodyPr/>
           <a:lstStyle/>
           <a:p>
-            <a:fld id="{32DC0559-D619-4E56-BF6F-3712370C2150}" type="slidenum">
+            <a:fld id="{1983A999-5E0E-42CA-8400-604AE921FF7C}" type="slidenum">
               <a:rPr lang="en-US" smtClean="0"/>
-              <a:t>6</a:t>
+              <a:t>4</a:t>
             </a:fld>
             <a:endParaRPr lang="en-US"/>
           </a:p>
@@ -5379,7 +5382,7 @@
     </p:spTree>
     <p:extLst>
       <p:ext uri="{BB962C8B-B14F-4D97-AF65-F5344CB8AC3E}">
-        <p14:creationId xmlns:p14="http://schemas.microsoft.com/office/powerpoint/2010/main" val="514541281"/>
+        <p14:creationId xmlns:p14="http://schemas.microsoft.com/office/powerpoint/2010/main" val="3451060739"/>
       </p:ext>
     </p:extLst>
   </p:cSld>
@@ -5454,7 +5457,7 @@
           <a:p>
             <a:fld id="{1983A999-5E0E-42CA-8400-604AE921FF7C}" type="slidenum">
               <a:rPr lang="en-US" smtClean="0"/>
-              <a:t>7</a:t>
+              <a:t>5</a:t>
             </a:fld>
             <a:endParaRPr lang="en-US"/>
           </a:p>
@@ -5463,7 +5466,7 @@
     </p:spTree>
     <p:extLst>
       <p:ext uri="{BB962C8B-B14F-4D97-AF65-F5344CB8AC3E}">
-        <p14:creationId xmlns:p14="http://schemas.microsoft.com/office/powerpoint/2010/main" val="404304175"/>
+        <p14:creationId xmlns:p14="http://schemas.microsoft.com/office/powerpoint/2010/main" val="540255490"/>
       </p:ext>
     </p:extLst>
   </p:cSld>
@@ -5538,7 +5541,259 @@
           <a:p>
             <a:fld id="{1983A999-5E0E-42CA-8400-604AE921FF7C}" type="slidenum">
               <a:rPr lang="en-US" smtClean="0"/>
+              <a:t>6</a:t>
+            </a:fld>
+            <a:endParaRPr lang="en-US"/>
+          </a:p>
+        </p:txBody>
+      </p:sp>
+    </p:spTree>
+    <p:extLst>
+      <p:ext uri="{BB962C8B-B14F-4D97-AF65-F5344CB8AC3E}">
+        <p14:creationId xmlns:p14="http://schemas.microsoft.com/office/powerpoint/2010/main" val="3742640134"/>
+      </p:ext>
+    </p:extLst>
+  </p:cSld>
+  <p:clrMapOvr>
+    <a:masterClrMapping/>
+  </p:clrMapOvr>
+</p:notes>
+</file>
+
+<file path=ppt/notesSlides/notesSlide7.xml><?xml version="1.0" encoding="utf-8"?>
+<p:notes xmlns:a="http://schemas.openxmlformats.org/drawingml/2006/main" xmlns:r="http://schemas.openxmlformats.org/officeDocument/2006/relationships" xmlns:p="http://schemas.openxmlformats.org/presentationml/2006/main">
+  <p:cSld>
+    <p:spTree>
+      <p:nvGrpSpPr>
+        <p:cNvPr id="1" name=""/>
+        <p:cNvGrpSpPr/>
+        <p:nvPr/>
+      </p:nvGrpSpPr>
+      <p:grpSpPr>
+        <a:xfrm>
+          <a:off x="0" y="0"/>
+          <a:ext cx="0" cy="0"/>
+          <a:chOff x="0" y="0"/>
+          <a:chExt cx="0" cy="0"/>
+        </a:xfrm>
+      </p:grpSpPr>
+      <p:sp>
+        <p:nvSpPr>
+          <p:cNvPr id="2" name="Slide Image Placeholder 1"/>
+          <p:cNvSpPr>
+            <a:spLocks noGrp="1" noRot="1" noChangeAspect="1"/>
+          </p:cNvSpPr>
+          <p:nvPr>
+            <p:ph type="sldImg"/>
+          </p:nvPr>
+        </p:nvSpPr>
+        <p:spPr/>
+      </p:sp>
+      <p:sp>
+        <p:nvSpPr>
+          <p:cNvPr id="3" name="Notes Placeholder 2"/>
+          <p:cNvSpPr>
+            <a:spLocks noGrp="1"/>
+          </p:cNvSpPr>
+          <p:nvPr>
+            <p:ph type="body" idx="1"/>
+          </p:nvPr>
+        </p:nvSpPr>
+        <p:spPr/>
+        <p:txBody>
+          <a:bodyPr/>
+          <a:lstStyle/>
+          <a:p>
+            <a:endParaRPr lang="en-US"/>
+          </a:p>
+        </p:txBody>
+      </p:sp>
+      <p:sp>
+        <p:nvSpPr>
+          <p:cNvPr id="4" name="Slide Number Placeholder 3"/>
+          <p:cNvSpPr>
+            <a:spLocks noGrp="1"/>
+          </p:cNvSpPr>
+          <p:nvPr>
+            <p:ph type="sldNum" sz="quarter" idx="10"/>
+          </p:nvPr>
+        </p:nvSpPr>
+        <p:spPr/>
+        <p:txBody>
+          <a:bodyPr/>
+          <a:lstStyle/>
+          <a:p>
+            <a:fld id="{32DC0559-D619-4E56-BF6F-3712370C2150}" type="slidenum">
+              <a:rPr lang="en-US" smtClean="0"/>
               <a:t>9</a:t>
+            </a:fld>
+            <a:endParaRPr lang="en-US"/>
+          </a:p>
+        </p:txBody>
+      </p:sp>
+    </p:spTree>
+    <p:extLst>
+      <p:ext uri="{BB962C8B-B14F-4D97-AF65-F5344CB8AC3E}">
+        <p14:creationId xmlns:p14="http://schemas.microsoft.com/office/powerpoint/2010/main" val="514541281"/>
+      </p:ext>
+    </p:extLst>
+  </p:cSld>
+  <p:clrMapOvr>
+    <a:masterClrMapping/>
+  </p:clrMapOvr>
+</p:notes>
+</file>
+
+<file path=ppt/notesSlides/notesSlide8.xml><?xml version="1.0" encoding="utf-8"?>
+<p:notes xmlns:a="http://schemas.openxmlformats.org/drawingml/2006/main" xmlns:r="http://schemas.openxmlformats.org/officeDocument/2006/relationships" xmlns:p="http://schemas.openxmlformats.org/presentationml/2006/main">
+  <p:cSld>
+    <p:spTree>
+      <p:nvGrpSpPr>
+        <p:cNvPr id="1" name=""/>
+        <p:cNvGrpSpPr/>
+        <p:nvPr/>
+      </p:nvGrpSpPr>
+      <p:grpSpPr>
+        <a:xfrm>
+          <a:off x="0" y="0"/>
+          <a:ext cx="0" cy="0"/>
+          <a:chOff x="0" y="0"/>
+          <a:chExt cx="0" cy="0"/>
+        </a:xfrm>
+      </p:grpSpPr>
+      <p:sp>
+        <p:nvSpPr>
+          <p:cNvPr id="2" name="Slide Image Placeholder 1"/>
+          <p:cNvSpPr>
+            <a:spLocks noGrp="1" noRot="1" noChangeAspect="1"/>
+          </p:cNvSpPr>
+          <p:nvPr>
+            <p:ph type="sldImg"/>
+          </p:nvPr>
+        </p:nvSpPr>
+        <p:spPr/>
+      </p:sp>
+      <p:sp>
+        <p:nvSpPr>
+          <p:cNvPr id="3" name="Notes Placeholder 2"/>
+          <p:cNvSpPr>
+            <a:spLocks noGrp="1"/>
+          </p:cNvSpPr>
+          <p:nvPr>
+            <p:ph type="body" idx="1"/>
+          </p:nvPr>
+        </p:nvSpPr>
+        <p:spPr/>
+        <p:txBody>
+          <a:bodyPr/>
+          <a:lstStyle/>
+          <a:p>
+            <a:endParaRPr lang="en-US" dirty="0"/>
+          </a:p>
+        </p:txBody>
+      </p:sp>
+      <p:sp>
+        <p:nvSpPr>
+          <p:cNvPr id="4" name="Slide Number Placeholder 3"/>
+          <p:cNvSpPr>
+            <a:spLocks noGrp="1"/>
+          </p:cNvSpPr>
+          <p:nvPr>
+            <p:ph type="sldNum" sz="quarter" idx="5"/>
+          </p:nvPr>
+        </p:nvSpPr>
+        <p:spPr/>
+        <p:txBody>
+          <a:bodyPr/>
+          <a:lstStyle/>
+          <a:p>
+            <a:fld id="{1983A999-5E0E-42CA-8400-604AE921FF7C}" type="slidenum">
+              <a:rPr lang="en-US" smtClean="0"/>
+              <a:t>10</a:t>
+            </a:fld>
+            <a:endParaRPr lang="en-US"/>
+          </a:p>
+        </p:txBody>
+      </p:sp>
+    </p:spTree>
+    <p:extLst>
+      <p:ext uri="{BB962C8B-B14F-4D97-AF65-F5344CB8AC3E}">
+        <p14:creationId xmlns:p14="http://schemas.microsoft.com/office/powerpoint/2010/main" val="404304175"/>
+      </p:ext>
+    </p:extLst>
+  </p:cSld>
+  <p:clrMapOvr>
+    <a:masterClrMapping/>
+  </p:clrMapOvr>
+</p:notes>
+</file>
+
+<file path=ppt/notesSlides/notesSlide9.xml><?xml version="1.0" encoding="utf-8"?>
+<p:notes xmlns:a="http://schemas.openxmlformats.org/drawingml/2006/main" xmlns:r="http://schemas.openxmlformats.org/officeDocument/2006/relationships" xmlns:p="http://schemas.openxmlformats.org/presentationml/2006/main">
+  <p:cSld>
+    <p:spTree>
+      <p:nvGrpSpPr>
+        <p:cNvPr id="1" name=""/>
+        <p:cNvGrpSpPr/>
+        <p:nvPr/>
+      </p:nvGrpSpPr>
+      <p:grpSpPr>
+        <a:xfrm>
+          <a:off x="0" y="0"/>
+          <a:ext cx="0" cy="0"/>
+          <a:chOff x="0" y="0"/>
+          <a:chExt cx="0" cy="0"/>
+        </a:xfrm>
+      </p:grpSpPr>
+      <p:sp>
+        <p:nvSpPr>
+          <p:cNvPr id="2" name="Slide Image Placeholder 1"/>
+          <p:cNvSpPr>
+            <a:spLocks noGrp="1" noRot="1" noChangeAspect="1"/>
+          </p:cNvSpPr>
+          <p:nvPr>
+            <p:ph type="sldImg"/>
+          </p:nvPr>
+        </p:nvSpPr>
+        <p:spPr/>
+      </p:sp>
+      <p:sp>
+        <p:nvSpPr>
+          <p:cNvPr id="3" name="Notes Placeholder 2"/>
+          <p:cNvSpPr>
+            <a:spLocks noGrp="1"/>
+          </p:cNvSpPr>
+          <p:nvPr>
+            <p:ph type="body" idx="1"/>
+          </p:nvPr>
+        </p:nvSpPr>
+        <p:spPr/>
+        <p:txBody>
+          <a:bodyPr/>
+          <a:lstStyle/>
+          <a:p>
+            <a:endParaRPr lang="en-US" dirty="0"/>
+          </a:p>
+        </p:txBody>
+      </p:sp>
+      <p:sp>
+        <p:nvSpPr>
+          <p:cNvPr id="4" name="Slide Number Placeholder 3"/>
+          <p:cNvSpPr>
+            <a:spLocks noGrp="1"/>
+          </p:cNvSpPr>
+          <p:nvPr>
+            <p:ph type="sldNum" sz="quarter" idx="5"/>
+          </p:nvPr>
+        </p:nvSpPr>
+        <p:spPr/>
+        <p:txBody>
+          <a:bodyPr/>
+          <a:lstStyle/>
+          <a:p>
+            <a:fld id="{1983A999-5E0E-42CA-8400-604AE921FF7C}" type="slidenum">
+              <a:rPr lang="en-US" smtClean="0"/>
+              <a:t>12</a:t>
             </a:fld>
             <a:endParaRPr lang="en-US"/>
           </a:p>
@@ -17729,6 +17984,1508 @@
           <a:chExt cx="0" cy="0"/>
         </a:xfrm>
       </p:grpSpPr>
+      <p:grpSp>
+        <p:nvGrpSpPr>
+          <p:cNvPr id="25" name="Group 24">
+            <a:extLst>
+              <a:ext uri="{FF2B5EF4-FFF2-40B4-BE49-F238E27FC236}">
+                <a16:creationId xmlns:a16="http://schemas.microsoft.com/office/drawing/2014/main" id="{D10F3D66-0109-4903-90B9-66D0E288F721}"/>
+              </a:ext>
+              <a:ext uri="{C183D7F6-B498-43B3-948B-1728B52AA6E4}">
+                <adec:decorative xmlns:adec="http://schemas.microsoft.com/office/drawing/2017/decorative" val="1"/>
+              </a:ext>
+            </a:extLst>
+          </p:cNvPr>
+          <p:cNvGrpSpPr/>
+          <p:nvPr/>
+        </p:nvGrpSpPr>
+        <p:grpSpPr>
+          <a:xfrm>
+            <a:off x="10379261" y="2030035"/>
+            <a:ext cx="1335600" cy="1262947"/>
+            <a:chOff x="10145015" y="2343978"/>
+            <a:chExt cx="1335600" cy="1262947"/>
+          </a:xfrm>
+        </p:grpSpPr>
+        <p:sp>
+          <p:nvSpPr>
+            <p:cNvPr id="26" name="Freeform: Shape 25">
+              <a:extLst>
+                <a:ext uri="{FF2B5EF4-FFF2-40B4-BE49-F238E27FC236}">
+                  <a16:creationId xmlns:a16="http://schemas.microsoft.com/office/drawing/2014/main" id="{57DAB968-9B52-4EFF-AD39-7657DFEA6E48}"/>
+                </a:ext>
+              </a:extLst>
+            </p:cNvPr>
+            <p:cNvSpPr>
+              <a:spLocks noChangeAspect="1"/>
+            </p:cNvSpPr>
+            <p:nvPr/>
+          </p:nvSpPr>
+          <p:spPr>
+            <a:xfrm rot="8100000">
+              <a:off x="10400615" y="2343978"/>
+              <a:ext cx="1080000" cy="1262947"/>
+            </a:xfrm>
+            <a:custGeom>
+              <a:avLst/>
+              <a:gdLst>
+                <a:gd name="connsiteX0" fmla="*/ 540000 w 1080000"/>
+                <a:gd name="connsiteY0" fmla="*/ 0 h 1262947"/>
+                <a:gd name="connsiteX1" fmla="*/ 1080000 w 1080000"/>
+                <a:gd name="connsiteY1" fmla="*/ 931034 h 1262947"/>
+                <a:gd name="connsiteX2" fmla="*/ 1064374 w 1080000"/>
+                <a:gd name="connsiteY2" fmla="*/ 931034 h 1262947"/>
+                <a:gd name="connsiteX3" fmla="*/ 1069029 w 1080000"/>
+                <a:gd name="connsiteY3" fmla="*/ 938533 h 1262947"/>
+                <a:gd name="connsiteX4" fmla="*/ 1080000 w 1080000"/>
+                <a:gd name="connsiteY4" fmla="*/ 992947 h 1262947"/>
+                <a:gd name="connsiteX5" fmla="*/ 540000 w 1080000"/>
+                <a:gd name="connsiteY5" fmla="*/ 1262947 h 1262947"/>
+                <a:gd name="connsiteX6" fmla="*/ 0 w 1080000"/>
+                <a:gd name="connsiteY6" fmla="*/ 992947 h 1262947"/>
+                <a:gd name="connsiteX7" fmla="*/ 10971 w 1080000"/>
+                <a:gd name="connsiteY7" fmla="*/ 938533 h 1262947"/>
+                <a:gd name="connsiteX8" fmla="*/ 15626 w 1080000"/>
+                <a:gd name="connsiteY8" fmla="*/ 931034 h 1262947"/>
+                <a:gd name="connsiteX9" fmla="*/ 0 w 1080000"/>
+                <a:gd name="connsiteY9" fmla="*/ 931034 h 1262947"/>
+                <a:gd name="connsiteX0" fmla="*/ 540000 w 1080000"/>
+                <a:gd name="connsiteY0" fmla="*/ 0 h 1262947"/>
+                <a:gd name="connsiteX1" fmla="*/ 1080000 w 1080000"/>
+                <a:gd name="connsiteY1" fmla="*/ 931034 h 1262947"/>
+                <a:gd name="connsiteX2" fmla="*/ 1064374 w 1080000"/>
+                <a:gd name="connsiteY2" fmla="*/ 931034 h 1262947"/>
+                <a:gd name="connsiteX3" fmla="*/ 1069029 w 1080000"/>
+                <a:gd name="connsiteY3" fmla="*/ 938533 h 1262947"/>
+                <a:gd name="connsiteX4" fmla="*/ 1080000 w 1080000"/>
+                <a:gd name="connsiteY4" fmla="*/ 992947 h 1262947"/>
+                <a:gd name="connsiteX5" fmla="*/ 540000 w 1080000"/>
+                <a:gd name="connsiteY5" fmla="*/ 1262947 h 1262947"/>
+                <a:gd name="connsiteX6" fmla="*/ 0 w 1080000"/>
+                <a:gd name="connsiteY6" fmla="*/ 992947 h 1262947"/>
+                <a:gd name="connsiteX7" fmla="*/ 10971 w 1080000"/>
+                <a:gd name="connsiteY7" fmla="*/ 938533 h 1262947"/>
+                <a:gd name="connsiteX8" fmla="*/ 15626 w 1080000"/>
+                <a:gd name="connsiteY8" fmla="*/ 931034 h 1262947"/>
+                <a:gd name="connsiteX9" fmla="*/ 540000 w 1080000"/>
+                <a:gd name="connsiteY9" fmla="*/ 0 h 1262947"/>
+                <a:gd name="connsiteX0" fmla="*/ 540000 w 1080000"/>
+                <a:gd name="connsiteY0" fmla="*/ 0 h 1262947"/>
+                <a:gd name="connsiteX1" fmla="*/ 1064374 w 1080000"/>
+                <a:gd name="connsiteY1" fmla="*/ 931034 h 1262947"/>
+                <a:gd name="connsiteX2" fmla="*/ 1069029 w 1080000"/>
+                <a:gd name="connsiteY2" fmla="*/ 938533 h 1262947"/>
+                <a:gd name="connsiteX3" fmla="*/ 1080000 w 1080000"/>
+                <a:gd name="connsiteY3" fmla="*/ 992947 h 1262947"/>
+                <a:gd name="connsiteX4" fmla="*/ 540000 w 1080000"/>
+                <a:gd name="connsiteY4" fmla="*/ 1262947 h 1262947"/>
+                <a:gd name="connsiteX5" fmla="*/ 0 w 1080000"/>
+                <a:gd name="connsiteY5" fmla="*/ 992947 h 1262947"/>
+                <a:gd name="connsiteX6" fmla="*/ 10971 w 1080000"/>
+                <a:gd name="connsiteY6" fmla="*/ 938533 h 1262947"/>
+                <a:gd name="connsiteX7" fmla="*/ 15626 w 1080000"/>
+                <a:gd name="connsiteY7" fmla="*/ 931034 h 1262947"/>
+                <a:gd name="connsiteX8" fmla="*/ 540000 w 1080000"/>
+                <a:gd name="connsiteY8" fmla="*/ 0 h 1262947"/>
+              </a:gdLst>
+              <a:ahLst/>
+              <a:cxnLst>
+                <a:cxn ang="0">
+                  <a:pos x="connsiteX0" y="connsiteY0"/>
+                </a:cxn>
+                <a:cxn ang="0">
+                  <a:pos x="connsiteX1" y="connsiteY1"/>
+                </a:cxn>
+                <a:cxn ang="0">
+                  <a:pos x="connsiteX2" y="connsiteY2"/>
+                </a:cxn>
+                <a:cxn ang="0">
+                  <a:pos x="connsiteX3" y="connsiteY3"/>
+                </a:cxn>
+                <a:cxn ang="0">
+                  <a:pos x="connsiteX4" y="connsiteY4"/>
+                </a:cxn>
+                <a:cxn ang="0">
+                  <a:pos x="connsiteX5" y="connsiteY5"/>
+                </a:cxn>
+                <a:cxn ang="0">
+                  <a:pos x="connsiteX6" y="connsiteY6"/>
+                </a:cxn>
+                <a:cxn ang="0">
+                  <a:pos x="connsiteX7" y="connsiteY7"/>
+                </a:cxn>
+                <a:cxn ang="0">
+                  <a:pos x="connsiteX8" y="connsiteY8"/>
+                </a:cxn>
+              </a:cxnLst>
+              <a:rect l="l" t="t" r="r" b="b"/>
+              <a:pathLst>
+                <a:path w="1080000" h="1262947">
+                  <a:moveTo>
+                    <a:pt x="540000" y="0"/>
+                  </a:moveTo>
+                  <a:lnTo>
+                    <a:pt x="1064374" y="931034"/>
+                  </a:lnTo>
+                  <a:lnTo>
+                    <a:pt x="1069029" y="938533"/>
+                  </a:lnTo>
+                  <a:cubicBezTo>
+                    <a:pt x="1076223" y="956109"/>
+                    <a:pt x="1080000" y="974307"/>
+                    <a:pt x="1080000" y="992947"/>
+                  </a:cubicBezTo>
+                  <a:cubicBezTo>
+                    <a:pt x="1080000" y="1142064"/>
+                    <a:pt x="838234" y="1262947"/>
+                    <a:pt x="540000" y="1262947"/>
+                  </a:cubicBezTo>
+                  <a:cubicBezTo>
+                    <a:pt x="241766" y="1262947"/>
+                    <a:pt x="0" y="1142064"/>
+                    <a:pt x="0" y="992947"/>
+                  </a:cubicBezTo>
+                  <a:cubicBezTo>
+                    <a:pt x="0" y="974307"/>
+                    <a:pt x="3778" y="956109"/>
+                    <a:pt x="10971" y="938533"/>
+                  </a:cubicBezTo>
+                  <a:lnTo>
+                    <a:pt x="15626" y="931034"/>
+                  </a:lnTo>
+                  <a:lnTo>
+                    <a:pt x="540000" y="0"/>
+                  </a:lnTo>
+                  <a:close/>
+                </a:path>
+              </a:pathLst>
+            </a:custGeom>
+            <a:gradFill>
+              <a:gsLst>
+                <a:gs pos="60000">
+                  <a:schemeClr val="bg2">
+                    <a:lumMod val="90000"/>
+                    <a:lumOff val="10000"/>
+                  </a:schemeClr>
+                </a:gs>
+                <a:gs pos="30000">
+                  <a:schemeClr val="bg2">
+                    <a:lumMod val="90000"/>
+                    <a:lumOff val="10000"/>
+                  </a:schemeClr>
+                </a:gs>
+                <a:gs pos="40000">
+                  <a:schemeClr val="bg2">
+                    <a:lumMod val="80000"/>
+                    <a:lumOff val="20000"/>
+                  </a:schemeClr>
+                </a:gs>
+                <a:gs pos="100000">
+                  <a:schemeClr val="bg2"/>
+                </a:gs>
+              </a:gsLst>
+              <a:lin ang="600000" scaled="0"/>
+            </a:gradFill>
+            <a:ln>
+              <a:noFill/>
+            </a:ln>
+            <a:effectLst>
+              <a:innerShdw blurRad="254000" dist="101600" dir="7320000">
+                <a:schemeClr val="accent1">
+                  <a:lumMod val="60000"/>
+                  <a:lumOff val="40000"/>
+                  <a:alpha val="40000"/>
+                </a:schemeClr>
+              </a:innerShdw>
+            </a:effectLst>
+          </p:spPr>
+          <p:style>
+            <a:lnRef idx="2">
+              <a:schemeClr val="accent1">
+                <a:shade val="50000"/>
+              </a:schemeClr>
+            </a:lnRef>
+            <a:fillRef idx="1">
+              <a:schemeClr val="accent1"/>
+            </a:fillRef>
+            <a:effectRef idx="0">
+              <a:schemeClr val="accent1"/>
+            </a:effectRef>
+            <a:fontRef idx="minor">
+              <a:schemeClr val="lt1"/>
+            </a:fontRef>
+          </p:style>
+          <p:txBody>
+            <a:bodyPr rot="0" spcFirstLastPara="0" vertOverflow="overflow" horzOverflow="overflow" vert="horz" wrap="square" lIns="91440" tIns="45720" rIns="91440" bIns="45720" numCol="1" spcCol="0" rtlCol="0" fromWordArt="0" anchor="ctr" anchorCtr="0" forceAA="0" compatLnSpc="1">
+              <a:prstTxWarp prst="textNoShape">
+                <a:avLst/>
+              </a:prstTxWarp>
+              <a:noAutofit/>
+            </a:bodyPr>
+            <a:lstStyle/>
+            <a:p>
+              <a:pPr algn="ctr"/>
+              <a:endParaRPr lang="en-US"/>
+            </a:p>
+          </p:txBody>
+        </p:sp>
+        <p:sp>
+          <p:nvSpPr>
+            <p:cNvPr id="27" name="Oval 26">
+              <a:extLst>
+                <a:ext uri="{FF2B5EF4-FFF2-40B4-BE49-F238E27FC236}">
+                  <a16:creationId xmlns:a16="http://schemas.microsoft.com/office/drawing/2014/main" id="{962BE440-9634-4380-B142-5DB692420C52}"/>
+                </a:ext>
+              </a:extLst>
+            </p:cNvPr>
+            <p:cNvSpPr/>
+            <p:nvPr/>
+          </p:nvSpPr>
+          <p:spPr>
+            <a:xfrm rot="13500000">
+              <a:off x="10415015" y="2179851"/>
+              <a:ext cx="540000" cy="1080000"/>
+            </a:xfrm>
+            <a:prstGeom prst="ellipse">
+              <a:avLst/>
+            </a:prstGeom>
+            <a:gradFill>
+              <a:gsLst>
+                <a:gs pos="100000">
+                  <a:schemeClr val="accent1">
+                    <a:lumMod val="60000"/>
+                    <a:lumOff val="40000"/>
+                    <a:alpha val="0"/>
+                  </a:schemeClr>
+                </a:gs>
+                <a:gs pos="0">
+                  <a:schemeClr val="bg2">
+                    <a:lumMod val="75000"/>
+                    <a:lumOff val="25000"/>
+                    <a:alpha val="33000"/>
+                  </a:schemeClr>
+                </a:gs>
+              </a:gsLst>
+              <a:lin ang="5400000" scaled="0"/>
+            </a:gradFill>
+            <a:ln>
+              <a:noFill/>
+            </a:ln>
+            <a:effectLst>
+              <a:innerShdw blurRad="1270000" dist="2540000">
+                <a:schemeClr val="accent1">
+                  <a:lumMod val="60000"/>
+                  <a:lumOff val="40000"/>
+                  <a:alpha val="0"/>
+                </a:schemeClr>
+              </a:innerShdw>
+            </a:effectLst>
+          </p:spPr>
+          <p:style>
+            <a:lnRef idx="2">
+              <a:schemeClr val="accent1">
+                <a:shade val="50000"/>
+              </a:schemeClr>
+            </a:lnRef>
+            <a:fillRef idx="1">
+              <a:schemeClr val="accent1"/>
+            </a:fillRef>
+            <a:effectRef idx="0">
+              <a:schemeClr val="accent1"/>
+            </a:effectRef>
+            <a:fontRef idx="minor">
+              <a:schemeClr val="lt1"/>
+            </a:fontRef>
+          </p:style>
+          <p:txBody>
+            <a:bodyPr rot="0" spcFirstLastPara="0" vertOverflow="overflow" horzOverflow="overflow" vert="horz" wrap="square" lIns="91440" tIns="45720" rIns="91440" bIns="45720" numCol="1" spcCol="0" rtlCol="0" fromWordArt="0" anchor="ctr" anchorCtr="0" forceAA="0" compatLnSpc="1">
+              <a:prstTxWarp prst="textNoShape">
+                <a:avLst/>
+              </a:prstTxWarp>
+              <a:noAutofit/>
+            </a:bodyPr>
+            <a:lstStyle/>
+            <a:p>
+              <a:pPr algn="ctr"/>
+              <a:endParaRPr lang="en-US"/>
+            </a:p>
+          </p:txBody>
+        </p:sp>
+      </p:grpSp>
+      <p:sp>
+        <p:nvSpPr>
+          <p:cNvPr id="7" name="Title 6">
+            <a:extLst>
+              <a:ext uri="{FF2B5EF4-FFF2-40B4-BE49-F238E27FC236}">
+                <a16:creationId xmlns:a16="http://schemas.microsoft.com/office/drawing/2014/main" id="{4B18D636-CC10-4B1E-AA38-419DCCF2D9C9}"/>
+              </a:ext>
+            </a:extLst>
+          </p:cNvPr>
+          <p:cNvSpPr>
+            <a:spLocks noGrp="1"/>
+          </p:cNvSpPr>
+          <p:nvPr>
+            <p:ph type="title"/>
+          </p:nvPr>
+        </p:nvSpPr>
+        <p:spPr>
+          <a:xfrm>
+            <a:off x="550862" y="549275"/>
+            <a:ext cx="11097551" cy="1332000"/>
+          </a:xfrm>
+        </p:spPr>
+        <p:txBody>
+          <a:bodyPr>
+            <a:normAutofit/>
+          </a:bodyPr>
+          <a:lstStyle/>
+          <a:p>
+            <a:r>
+              <a:rPr lang="en-US" dirty="0"/>
+              <a:t>Content </a:t>
+            </a:r>
+          </a:p>
+        </p:txBody>
+      </p:sp>
+      <p:sp>
+        <p:nvSpPr>
+          <p:cNvPr id="9" name="Text Placeholder 8">
+            <a:extLst>
+              <a:ext uri="{FF2B5EF4-FFF2-40B4-BE49-F238E27FC236}">
+                <a16:creationId xmlns:a16="http://schemas.microsoft.com/office/drawing/2014/main" id="{0D098C43-2F2A-4100-89BC-5931039293FA}"/>
+              </a:ext>
+            </a:extLst>
+          </p:cNvPr>
+          <p:cNvSpPr>
+            <a:spLocks noGrp="1"/>
+          </p:cNvSpPr>
+          <p:nvPr>
+            <p:ph type="body" idx="1"/>
+          </p:nvPr>
+        </p:nvSpPr>
+        <p:spPr>
+          <a:xfrm>
+            <a:off x="550864" y="1731375"/>
+            <a:ext cx="5437186" cy="535354"/>
+          </a:xfrm>
+        </p:spPr>
+        <p:txBody>
+          <a:bodyPr/>
+          <a:lstStyle/>
+          <a:p>
+            <a:r>
+              <a:rPr lang="en-US"/>
+              <a:t>Subtitle</a:t>
+            </a:r>
+            <a:endParaRPr lang="en-US" dirty="0"/>
+          </a:p>
+        </p:txBody>
+      </p:sp>
+      <p:sp>
+        <p:nvSpPr>
+          <p:cNvPr id="10" name="Content Placeholder 9">
+            <a:extLst>
+              <a:ext uri="{FF2B5EF4-FFF2-40B4-BE49-F238E27FC236}">
+                <a16:creationId xmlns:a16="http://schemas.microsoft.com/office/drawing/2014/main" id="{1DB251F7-EBE7-46AC-A920-FFE2C5AF68EA}"/>
+              </a:ext>
+            </a:extLst>
+          </p:cNvPr>
+          <p:cNvSpPr>
+            <a:spLocks noGrp="1"/>
+          </p:cNvSpPr>
+          <p:nvPr>
+            <p:ph sz="half" idx="2"/>
+          </p:nvPr>
+        </p:nvSpPr>
+        <p:spPr>
+          <a:xfrm>
+            <a:off x="550863" y="2427370"/>
+            <a:ext cx="5429114" cy="3515555"/>
+          </a:xfrm>
+        </p:spPr>
+        <p:txBody>
+          <a:bodyPr/>
+          <a:lstStyle/>
+          <a:p>
+            <a:r>
+              <a:rPr lang="en-US" dirty="0"/>
+              <a:t>Add text, images, art, and videos. </a:t>
+            </a:r>
+          </a:p>
+          <a:p>
+            <a:r>
+              <a:rPr lang="en-US" dirty="0"/>
+              <a:t>Add transitions, animations, and motion. </a:t>
+            </a:r>
+          </a:p>
+          <a:p>
+            <a:r>
+              <a:rPr lang="en-US" dirty="0"/>
+              <a:t>Save to OneDrive, to get to your presentations from your computer, tablet, or phone. </a:t>
+            </a:r>
+          </a:p>
+        </p:txBody>
+      </p:sp>
+      <p:sp>
+        <p:nvSpPr>
+          <p:cNvPr id="11" name="Text Placeholder 10">
+            <a:extLst>
+              <a:ext uri="{FF2B5EF4-FFF2-40B4-BE49-F238E27FC236}">
+                <a16:creationId xmlns:a16="http://schemas.microsoft.com/office/drawing/2014/main" id="{60726BA7-44D6-4116-90E3-38325026EAAD}"/>
+              </a:ext>
+            </a:extLst>
+          </p:cNvPr>
+          <p:cNvSpPr>
+            <a:spLocks noGrp="1"/>
+          </p:cNvSpPr>
+          <p:nvPr>
+            <p:ph type="body" sz="quarter" idx="3"/>
+          </p:nvPr>
+        </p:nvSpPr>
+        <p:spPr>
+          <a:xfrm>
+            <a:off x="6212024" y="1731375"/>
+            <a:ext cx="5436392" cy="535354"/>
+          </a:xfrm>
+        </p:spPr>
+        <p:txBody>
+          <a:bodyPr/>
+          <a:lstStyle/>
+          <a:p>
+            <a:r>
+              <a:rPr lang="en-US" dirty="0"/>
+              <a:t>Subtitle</a:t>
+            </a:r>
+          </a:p>
+        </p:txBody>
+      </p:sp>
+      <p:sp>
+        <p:nvSpPr>
+          <p:cNvPr id="12" name="Content Placeholder 11">
+            <a:extLst>
+              <a:ext uri="{FF2B5EF4-FFF2-40B4-BE49-F238E27FC236}">
+                <a16:creationId xmlns:a16="http://schemas.microsoft.com/office/drawing/2014/main" id="{7FB7F30B-2A84-4C44-BC5A-E826ED6E74A2}"/>
+              </a:ext>
+            </a:extLst>
+          </p:cNvPr>
+          <p:cNvSpPr>
+            <a:spLocks noGrp="1"/>
+          </p:cNvSpPr>
+          <p:nvPr>
+            <p:ph sz="quarter" idx="4"/>
+          </p:nvPr>
+        </p:nvSpPr>
+        <p:spPr>
+          <a:xfrm>
+            <a:off x="6212023" y="2427370"/>
+            <a:ext cx="5436391" cy="3515555"/>
+          </a:xfrm>
+        </p:spPr>
+        <p:txBody>
+          <a:bodyPr/>
+          <a:lstStyle/>
+          <a:p>
+            <a:r>
+              <a:rPr lang="en-US" dirty="0"/>
+              <a:t>Open the Design Ideas pane for instant slide makeovers. </a:t>
+            </a:r>
+          </a:p>
+          <a:p>
+            <a:r>
+              <a:rPr lang="en-US" dirty="0"/>
+              <a:t>When we have design ideas, we’ll show them to you right there. </a:t>
+            </a:r>
+          </a:p>
+          <a:p>
+            <a:endParaRPr lang="en-US" dirty="0"/>
+          </a:p>
+        </p:txBody>
+      </p:sp>
+      <p:sp>
+        <p:nvSpPr>
+          <p:cNvPr id="4" name="Date Placeholder 3">
+            <a:extLst>
+              <a:ext uri="{FF2B5EF4-FFF2-40B4-BE49-F238E27FC236}">
+                <a16:creationId xmlns:a16="http://schemas.microsoft.com/office/drawing/2014/main" id="{0C329F70-04F7-4C70-BCF8-D4371F54EF2F}"/>
+              </a:ext>
+            </a:extLst>
+          </p:cNvPr>
+          <p:cNvSpPr>
+            <a:spLocks noGrp="1"/>
+          </p:cNvSpPr>
+          <p:nvPr>
+            <p:ph type="dt" sz="half" idx="10"/>
+          </p:nvPr>
+        </p:nvSpPr>
+        <p:spPr>
+          <a:xfrm>
+            <a:off x="550863" y="6507212"/>
+            <a:ext cx="2628900" cy="153888"/>
+          </a:xfrm>
+        </p:spPr>
+        <p:txBody>
+          <a:bodyPr/>
+          <a:lstStyle/>
+          <a:p>
+            <a:r>
+              <a:rPr lang="en-US"/>
+              <a:t>Tuesday, February 2, 20XX</a:t>
+            </a:r>
+            <a:endParaRPr lang="en-US" dirty="0"/>
+          </a:p>
+        </p:txBody>
+      </p:sp>
+      <p:sp>
+        <p:nvSpPr>
+          <p:cNvPr id="5" name="Footer Placeholder 4">
+            <a:extLst>
+              <a:ext uri="{FF2B5EF4-FFF2-40B4-BE49-F238E27FC236}">
+                <a16:creationId xmlns:a16="http://schemas.microsoft.com/office/drawing/2014/main" id="{06A3302E-502D-4151-81C9-5FD6AF9596D6}"/>
+              </a:ext>
+            </a:extLst>
+          </p:cNvPr>
+          <p:cNvSpPr>
+            <a:spLocks noGrp="1"/>
+          </p:cNvSpPr>
+          <p:nvPr>
+            <p:ph type="ftr" sz="quarter" idx="11"/>
+          </p:nvPr>
+        </p:nvSpPr>
+        <p:spPr>
+          <a:xfrm>
+            <a:off x="3359150" y="6507212"/>
+            <a:ext cx="6379210" cy="153888"/>
+          </a:xfrm>
+        </p:spPr>
+        <p:txBody>
+          <a:bodyPr/>
+          <a:lstStyle/>
+          <a:p>
+            <a:r>
+              <a:rPr lang="en-US"/>
+              <a:t>Sample Footer Text</a:t>
+            </a:r>
+          </a:p>
+        </p:txBody>
+      </p:sp>
+      <p:sp>
+        <p:nvSpPr>
+          <p:cNvPr id="6" name="Slide Number Placeholder 5">
+            <a:extLst>
+              <a:ext uri="{FF2B5EF4-FFF2-40B4-BE49-F238E27FC236}">
+                <a16:creationId xmlns:a16="http://schemas.microsoft.com/office/drawing/2014/main" id="{9ED907F8-C614-4D59-A03F-BF9CD5E35703}"/>
+              </a:ext>
+            </a:extLst>
+          </p:cNvPr>
+          <p:cNvSpPr>
+            <a:spLocks noGrp="1"/>
+          </p:cNvSpPr>
+          <p:nvPr>
+            <p:ph type="sldNum" sz="quarter" idx="12"/>
+          </p:nvPr>
+        </p:nvSpPr>
+        <p:spPr>
+          <a:xfrm>
+            <a:off x="9948863" y="6507212"/>
+            <a:ext cx="1692274" cy="153888"/>
+          </a:xfrm>
+        </p:spPr>
+        <p:txBody>
+          <a:bodyPr/>
+          <a:lstStyle/>
+          <a:p>
+            <a:fld id="{DBA1B0FB-D917-4C8C-928F-313BD683BF39}" type="slidenum">
+              <a:rPr lang="en-US" smtClean="0"/>
+              <a:pPr/>
+              <a:t>10</a:t>
+            </a:fld>
+            <a:endParaRPr lang="en-US"/>
+          </a:p>
+        </p:txBody>
+      </p:sp>
+      <p:sp>
+        <p:nvSpPr>
+          <p:cNvPr id="22" name="Freeform: Shape 21">
+            <a:extLst>
+              <a:ext uri="{FF2B5EF4-FFF2-40B4-BE49-F238E27FC236}">
+                <a16:creationId xmlns:a16="http://schemas.microsoft.com/office/drawing/2014/main" id="{C6F3814E-455F-456B-B1AF-7B993965A2C0}"/>
+              </a:ext>
+              <a:ext uri="{C183D7F6-B498-43B3-948B-1728B52AA6E4}">
+                <adec:decorative xmlns:adec="http://schemas.microsoft.com/office/drawing/2017/decorative" val="1"/>
+              </a:ext>
+            </a:extLst>
+          </p:cNvPr>
+          <p:cNvSpPr>
+            <a:spLocks noChangeAspect="1"/>
+          </p:cNvSpPr>
+          <p:nvPr/>
+        </p:nvSpPr>
+        <p:spPr>
+          <a:xfrm>
+            <a:off x="4295775" y="0"/>
+            <a:ext cx="360000" cy="274638"/>
+          </a:xfrm>
+          <a:custGeom>
+            <a:avLst/>
+            <a:gdLst>
+              <a:gd name="connsiteX0" fmla="*/ 30714 w 360000"/>
+              <a:gd name="connsiteY0" fmla="*/ 0 h 274638"/>
+              <a:gd name="connsiteX1" fmla="*/ 329286 w 360000"/>
+              <a:gd name="connsiteY1" fmla="*/ 0 h 274638"/>
+              <a:gd name="connsiteX2" fmla="*/ 345855 w 360000"/>
+              <a:gd name="connsiteY2" fmla="*/ 24574 h 274638"/>
+              <a:gd name="connsiteX3" fmla="*/ 360000 w 360000"/>
+              <a:gd name="connsiteY3" fmla="*/ 94638 h 274638"/>
+              <a:gd name="connsiteX4" fmla="*/ 180000 w 360000"/>
+              <a:gd name="connsiteY4" fmla="*/ 274638 h 274638"/>
+              <a:gd name="connsiteX5" fmla="*/ 0 w 360000"/>
+              <a:gd name="connsiteY5" fmla="*/ 94638 h 274638"/>
+              <a:gd name="connsiteX6" fmla="*/ 14145 w 360000"/>
+              <a:gd name="connsiteY6" fmla="*/ 24574 h 274638"/>
+            </a:gdLst>
+            <a:ahLst/>
+            <a:cxnLst>
+              <a:cxn ang="0">
+                <a:pos x="connsiteX0" y="connsiteY0"/>
+              </a:cxn>
+              <a:cxn ang="0">
+                <a:pos x="connsiteX1" y="connsiteY1"/>
+              </a:cxn>
+              <a:cxn ang="0">
+                <a:pos x="connsiteX2" y="connsiteY2"/>
+              </a:cxn>
+              <a:cxn ang="0">
+                <a:pos x="connsiteX3" y="connsiteY3"/>
+              </a:cxn>
+              <a:cxn ang="0">
+                <a:pos x="connsiteX4" y="connsiteY4"/>
+              </a:cxn>
+              <a:cxn ang="0">
+                <a:pos x="connsiteX5" y="connsiteY5"/>
+              </a:cxn>
+              <a:cxn ang="0">
+                <a:pos x="connsiteX6" y="connsiteY6"/>
+              </a:cxn>
+            </a:cxnLst>
+            <a:rect l="l" t="t" r="r" b="b"/>
+            <a:pathLst>
+              <a:path w="360000" h="274638">
+                <a:moveTo>
+                  <a:pt x="30714" y="0"/>
+                </a:moveTo>
+                <a:lnTo>
+                  <a:pt x="329286" y="0"/>
+                </a:lnTo>
+                <a:lnTo>
+                  <a:pt x="345855" y="24574"/>
+                </a:lnTo>
+                <a:cubicBezTo>
+                  <a:pt x="354963" y="46109"/>
+                  <a:pt x="360000" y="69785"/>
+                  <a:pt x="360000" y="94638"/>
+                </a:cubicBezTo>
+                <a:cubicBezTo>
+                  <a:pt x="360000" y="194049"/>
+                  <a:pt x="279411" y="274638"/>
+                  <a:pt x="180000" y="274638"/>
+                </a:cubicBezTo>
+                <a:cubicBezTo>
+                  <a:pt x="80589" y="274638"/>
+                  <a:pt x="0" y="194049"/>
+                  <a:pt x="0" y="94638"/>
+                </a:cubicBezTo>
+                <a:cubicBezTo>
+                  <a:pt x="0" y="69785"/>
+                  <a:pt x="5037" y="46109"/>
+                  <a:pt x="14145" y="24574"/>
+                </a:cubicBezTo>
+                <a:close/>
+              </a:path>
+            </a:pathLst>
+          </a:custGeom>
+          <a:gradFill flip="none" rotWithShape="1">
+            <a:gsLst>
+              <a:gs pos="100000">
+                <a:schemeClr val="bg2">
+                  <a:lumMod val="50000"/>
+                  <a:lumOff val="50000"/>
+                </a:schemeClr>
+              </a:gs>
+              <a:gs pos="60000">
+                <a:schemeClr val="bg2"/>
+              </a:gs>
+            </a:gsLst>
+            <a:path path="circle">
+              <a:fillToRect l="100000" b="100000"/>
+            </a:path>
+            <a:tileRect t="-100000" r="-100000"/>
+          </a:gradFill>
+          <a:ln>
+            <a:noFill/>
+          </a:ln>
+          <a:effectLst>
+            <a:innerShdw blurRad="127000" dist="63500" dir="2700000">
+              <a:schemeClr val="accent1">
+                <a:lumMod val="60000"/>
+                <a:lumOff val="40000"/>
+                <a:alpha val="20000"/>
+              </a:schemeClr>
+            </a:innerShdw>
+            <a:softEdge rad="0"/>
+          </a:effectLst>
+        </p:spPr>
+        <p:style>
+          <a:lnRef idx="2">
+            <a:schemeClr val="accent1">
+              <a:shade val="50000"/>
+            </a:schemeClr>
+          </a:lnRef>
+          <a:fillRef idx="1">
+            <a:schemeClr val="accent1"/>
+          </a:fillRef>
+          <a:effectRef idx="0">
+            <a:schemeClr val="accent1"/>
+          </a:effectRef>
+          <a:fontRef idx="minor">
+            <a:schemeClr val="lt1"/>
+          </a:fontRef>
+        </p:style>
+        <p:txBody>
+          <a:bodyPr rot="0" spcFirstLastPara="0" vertOverflow="overflow" horzOverflow="overflow" vert="horz" wrap="square" lIns="91440" tIns="45720" rIns="91440" bIns="45720" numCol="1" spcCol="0" rtlCol="0" fromWordArt="0" anchor="ctr" anchorCtr="0" forceAA="0" compatLnSpc="1">
+            <a:prstTxWarp prst="textNoShape">
+              <a:avLst/>
+            </a:prstTxWarp>
+            <a:noAutofit/>
+          </a:bodyPr>
+          <a:lstStyle/>
+          <a:p>
+            <a:pPr algn="ctr"/>
+            <a:endParaRPr lang="en-US"/>
+          </a:p>
+        </p:txBody>
+      </p:sp>
+    </p:spTree>
+    <p:extLst>
+      <p:ext uri="{BB962C8B-B14F-4D97-AF65-F5344CB8AC3E}">
+        <p14:creationId xmlns:p14="http://schemas.microsoft.com/office/powerpoint/2010/main" val="3891345585"/>
+      </p:ext>
+    </p:extLst>
+  </p:cSld>
+  <p:clrMapOvr>
+    <a:masterClrMapping/>
+  </p:clrMapOvr>
+</p:sld>
+</file>
+
+<file path=ppt/slides/slide11.xml><?xml version="1.0" encoding="utf-8"?>
+<p:sld xmlns:a="http://schemas.openxmlformats.org/drawingml/2006/main" xmlns:r="http://schemas.openxmlformats.org/officeDocument/2006/relationships" xmlns:p="http://schemas.openxmlformats.org/presentationml/2006/main">
+  <p:cSld>
+    <p:spTree>
+      <p:nvGrpSpPr>
+        <p:cNvPr id="1" name=""/>
+        <p:cNvGrpSpPr/>
+        <p:nvPr/>
+      </p:nvGrpSpPr>
+      <p:grpSpPr>
+        <a:xfrm>
+          <a:off x="0" y="0"/>
+          <a:ext cx="0" cy="0"/>
+          <a:chOff x="0" y="0"/>
+          <a:chExt cx="0" cy="0"/>
+        </a:xfrm>
+      </p:grpSpPr>
+      <p:sp>
+        <p:nvSpPr>
+          <p:cNvPr id="7" name="Title 6">
+            <a:extLst>
+              <a:ext uri="{FF2B5EF4-FFF2-40B4-BE49-F238E27FC236}">
+                <a16:creationId xmlns:a16="http://schemas.microsoft.com/office/drawing/2014/main" id="{47788B34-4190-4916-9048-47720EA5ABF1}"/>
+              </a:ext>
+            </a:extLst>
+          </p:cNvPr>
+          <p:cNvSpPr>
+            <a:spLocks noGrp="1"/>
+          </p:cNvSpPr>
+          <p:nvPr>
+            <p:ph type="title"/>
+          </p:nvPr>
+        </p:nvSpPr>
+        <p:spPr>
+          <a:xfrm>
+            <a:off x="550862" y="549275"/>
+            <a:ext cx="11097551" cy="1332000"/>
+          </a:xfrm>
+        </p:spPr>
+        <p:txBody>
+          <a:bodyPr/>
+          <a:lstStyle/>
+          <a:p>
+            <a:r>
+              <a:rPr lang="en-US" dirty="0"/>
+              <a:t>Content 2 </a:t>
+            </a:r>
+          </a:p>
+        </p:txBody>
+      </p:sp>
+      <p:sp>
+        <p:nvSpPr>
+          <p:cNvPr id="8" name="Text Placeholder 7">
+            <a:extLst>
+              <a:ext uri="{FF2B5EF4-FFF2-40B4-BE49-F238E27FC236}">
+                <a16:creationId xmlns:a16="http://schemas.microsoft.com/office/drawing/2014/main" id="{ABA415A0-3B77-43FB-A408-5F1DA4B0AAFA}"/>
+              </a:ext>
+            </a:extLst>
+          </p:cNvPr>
+          <p:cNvSpPr>
+            <a:spLocks noGrp="1"/>
+          </p:cNvSpPr>
+          <p:nvPr>
+            <p:ph type="body" idx="1"/>
+          </p:nvPr>
+        </p:nvSpPr>
+        <p:spPr>
+          <a:xfrm>
+            <a:off x="550864" y="1731375"/>
+            <a:ext cx="3563936" cy="535354"/>
+          </a:xfrm>
+        </p:spPr>
+        <p:txBody>
+          <a:bodyPr/>
+          <a:lstStyle/>
+          <a:p>
+            <a:r>
+              <a:rPr lang="en-US" dirty="0"/>
+              <a:t>Subtitle</a:t>
+            </a:r>
+          </a:p>
+        </p:txBody>
+      </p:sp>
+      <p:sp>
+        <p:nvSpPr>
+          <p:cNvPr id="9" name="Content Placeholder 8">
+            <a:extLst>
+              <a:ext uri="{FF2B5EF4-FFF2-40B4-BE49-F238E27FC236}">
+                <a16:creationId xmlns:a16="http://schemas.microsoft.com/office/drawing/2014/main" id="{8598ECEC-4413-4244-8F21-0076EC511806}"/>
+              </a:ext>
+            </a:extLst>
+          </p:cNvPr>
+          <p:cNvSpPr>
+            <a:spLocks noGrp="1"/>
+          </p:cNvSpPr>
+          <p:nvPr>
+            <p:ph sz="half" idx="2"/>
+          </p:nvPr>
+        </p:nvSpPr>
+        <p:spPr>
+          <a:xfrm>
+            <a:off x="559476" y="2432304"/>
+            <a:ext cx="3563936" cy="3515555"/>
+          </a:xfrm>
+        </p:spPr>
+        <p:txBody>
+          <a:bodyPr>
+            <a:normAutofit fontScale="92500" lnSpcReduction="20000"/>
+          </a:bodyPr>
+          <a:lstStyle/>
+          <a:p>
+            <a:pPr lvl="0"/>
+            <a:r>
+              <a:rPr lang="en-US" dirty="0"/>
+              <a:t>Add text, images, art, and videos. </a:t>
+            </a:r>
+          </a:p>
+          <a:p>
+            <a:pPr lvl="0"/>
+            <a:r>
+              <a:rPr lang="en-US" dirty="0"/>
+              <a:t>Add transitions, animations, and motion. </a:t>
+            </a:r>
+          </a:p>
+          <a:p>
+            <a:pPr lvl="0"/>
+            <a:r>
+              <a:rPr lang="en-US" dirty="0"/>
+              <a:t>Save to OneDrive, to get to your presentations from your computer, tablet, or phone. </a:t>
+            </a:r>
+          </a:p>
+          <a:p>
+            <a:r>
+              <a:rPr lang="en-US" dirty="0"/>
+              <a:t>Open the Design Ideas pane for instant slide makeovers. </a:t>
+            </a:r>
+          </a:p>
+          <a:p>
+            <a:r>
+              <a:rPr lang="en-US" dirty="0"/>
+              <a:t>When we have design ideas, we’ll show them to you right there. </a:t>
+            </a:r>
+          </a:p>
+          <a:p>
+            <a:pPr lvl="0"/>
+            <a:endParaRPr lang="en-US" dirty="0"/>
+          </a:p>
+          <a:p>
+            <a:endParaRPr lang="en-US" dirty="0"/>
+          </a:p>
+        </p:txBody>
+      </p:sp>
+      <p:sp>
+        <p:nvSpPr>
+          <p:cNvPr id="12" name="Text Placeholder 11">
+            <a:extLst>
+              <a:ext uri="{FF2B5EF4-FFF2-40B4-BE49-F238E27FC236}">
+                <a16:creationId xmlns:a16="http://schemas.microsoft.com/office/drawing/2014/main" id="{3A63626D-0E6E-4023-ABFC-A744C9862159}"/>
+              </a:ext>
+            </a:extLst>
+          </p:cNvPr>
+          <p:cNvSpPr>
+            <a:spLocks noGrp="1"/>
+          </p:cNvSpPr>
+          <p:nvPr>
+            <p:ph type="body" sz="quarter" idx="13"/>
+          </p:nvPr>
+        </p:nvSpPr>
+        <p:spPr>
+          <a:xfrm>
+            <a:off x="4341573" y="1731375"/>
+            <a:ext cx="3566160" cy="535354"/>
+          </a:xfrm>
+        </p:spPr>
+        <p:txBody>
+          <a:bodyPr/>
+          <a:lstStyle/>
+          <a:p>
+            <a:r>
+              <a:rPr lang="en-US" dirty="0"/>
+              <a:t>subtitle</a:t>
+            </a:r>
+          </a:p>
+        </p:txBody>
+      </p:sp>
+      <p:sp>
+        <p:nvSpPr>
+          <p:cNvPr id="13" name="Content Placeholder 12">
+            <a:extLst>
+              <a:ext uri="{FF2B5EF4-FFF2-40B4-BE49-F238E27FC236}">
+                <a16:creationId xmlns:a16="http://schemas.microsoft.com/office/drawing/2014/main" id="{258E9390-685C-4BAD-BFAD-EC56E81C4745}"/>
+              </a:ext>
+            </a:extLst>
+          </p:cNvPr>
+          <p:cNvSpPr>
+            <a:spLocks noGrp="1"/>
+          </p:cNvSpPr>
+          <p:nvPr>
+            <p:ph sz="quarter" idx="14"/>
+          </p:nvPr>
+        </p:nvSpPr>
+        <p:spPr>
+          <a:xfrm>
+            <a:off x="4341573" y="2427370"/>
+            <a:ext cx="3508755" cy="3515555"/>
+          </a:xfrm>
+        </p:spPr>
+        <p:txBody>
+          <a:bodyPr>
+            <a:normAutofit lnSpcReduction="10000"/>
+          </a:bodyPr>
+          <a:lstStyle/>
+          <a:p>
+            <a:pPr lvl="0"/>
+            <a:r>
+              <a:rPr lang="en-US" dirty="0"/>
+              <a:t>Add text, images, art, and videos. </a:t>
+            </a:r>
+          </a:p>
+          <a:p>
+            <a:pPr lvl="0"/>
+            <a:r>
+              <a:rPr lang="en-US" dirty="0"/>
+              <a:t>Add transitions, animations, and motion. </a:t>
+            </a:r>
+          </a:p>
+          <a:p>
+            <a:pPr lvl="0"/>
+            <a:r>
+              <a:rPr lang="en-US" dirty="0"/>
+              <a:t>Save to OneDrive, to get to your presentations from your computer, tablet, or phone. </a:t>
+            </a:r>
+          </a:p>
+          <a:p>
+            <a:r>
+              <a:rPr lang="en-US" dirty="0"/>
+              <a:t>Open the Design Ideas pane for instant slide makeovers. </a:t>
+            </a:r>
+          </a:p>
+          <a:p>
+            <a:r>
+              <a:rPr lang="en-US" dirty="0"/>
+              <a:t>When we have design ideas, we’ll show them to you right there.</a:t>
+            </a:r>
+          </a:p>
+        </p:txBody>
+      </p:sp>
+      <p:sp>
+        <p:nvSpPr>
+          <p:cNvPr id="10" name="Text Placeholder 9">
+            <a:extLst>
+              <a:ext uri="{FF2B5EF4-FFF2-40B4-BE49-F238E27FC236}">
+                <a16:creationId xmlns:a16="http://schemas.microsoft.com/office/drawing/2014/main" id="{34A9BC34-CFDB-4D7A-8D6C-1CE608D0909F}"/>
+              </a:ext>
+            </a:extLst>
+          </p:cNvPr>
+          <p:cNvSpPr>
+            <a:spLocks noGrp="1"/>
+          </p:cNvSpPr>
+          <p:nvPr>
+            <p:ph type="body" sz="quarter" idx="3"/>
+          </p:nvPr>
+        </p:nvSpPr>
+        <p:spPr>
+          <a:xfrm>
+            <a:off x="8139659" y="1731375"/>
+            <a:ext cx="3566160" cy="535354"/>
+          </a:xfrm>
+        </p:spPr>
+        <p:txBody>
+          <a:bodyPr/>
+          <a:lstStyle/>
+          <a:p>
+            <a:r>
+              <a:rPr lang="en-US"/>
+              <a:t>subtitle</a:t>
+            </a:r>
+            <a:endParaRPr lang="en-US" dirty="0"/>
+          </a:p>
+        </p:txBody>
+      </p:sp>
+      <p:sp>
+        <p:nvSpPr>
+          <p:cNvPr id="11" name="Content Placeholder 10">
+            <a:extLst>
+              <a:ext uri="{FF2B5EF4-FFF2-40B4-BE49-F238E27FC236}">
+                <a16:creationId xmlns:a16="http://schemas.microsoft.com/office/drawing/2014/main" id="{1D014E48-5DD9-49CE-AD5B-0FEF69204F68}"/>
+              </a:ext>
+            </a:extLst>
+          </p:cNvPr>
+          <p:cNvSpPr>
+            <a:spLocks noGrp="1"/>
+          </p:cNvSpPr>
+          <p:nvPr>
+            <p:ph sz="quarter" idx="4"/>
+          </p:nvPr>
+        </p:nvSpPr>
+        <p:spPr>
+          <a:xfrm>
+            <a:off x="8139659" y="2427370"/>
+            <a:ext cx="3508755" cy="3515555"/>
+          </a:xfrm>
+        </p:spPr>
+        <p:txBody>
+          <a:bodyPr>
+            <a:normAutofit lnSpcReduction="10000"/>
+          </a:bodyPr>
+          <a:lstStyle/>
+          <a:p>
+            <a:pPr lvl="0"/>
+            <a:r>
+              <a:rPr lang="en-US" dirty="0"/>
+              <a:t>Add text, images, art, and videos. </a:t>
+            </a:r>
+          </a:p>
+          <a:p>
+            <a:pPr lvl="0"/>
+            <a:r>
+              <a:rPr lang="en-US" dirty="0"/>
+              <a:t>Add transitions, animations, and motion. </a:t>
+            </a:r>
+          </a:p>
+          <a:p>
+            <a:pPr lvl="0"/>
+            <a:r>
+              <a:rPr lang="en-US" dirty="0"/>
+              <a:t>Save to OneDrive, to get to your presentations from your computer, tablet, or phone. </a:t>
+            </a:r>
+          </a:p>
+          <a:p>
+            <a:r>
+              <a:rPr lang="en-US" dirty="0"/>
+              <a:t>Open the Design Ideas pane for instant slide makeovers. </a:t>
+            </a:r>
+          </a:p>
+          <a:p>
+            <a:r>
+              <a:rPr lang="en-US" dirty="0"/>
+              <a:t>When we have design ideas, we’ll show them to you right there.</a:t>
+            </a:r>
+          </a:p>
+        </p:txBody>
+      </p:sp>
+      <p:sp>
+        <p:nvSpPr>
+          <p:cNvPr id="14" name="Date Placeholder 13">
+            <a:extLst>
+              <a:ext uri="{FF2B5EF4-FFF2-40B4-BE49-F238E27FC236}">
+                <a16:creationId xmlns:a16="http://schemas.microsoft.com/office/drawing/2014/main" id="{D236478C-E242-44E0-8357-C72C9B588CA7}"/>
+              </a:ext>
+            </a:extLst>
+          </p:cNvPr>
+          <p:cNvSpPr>
+            <a:spLocks noGrp="1"/>
+          </p:cNvSpPr>
+          <p:nvPr>
+            <p:ph type="dt" sz="half" idx="10"/>
+          </p:nvPr>
+        </p:nvSpPr>
+        <p:spPr>
+          <a:xfrm>
+            <a:off x="550863" y="6507212"/>
+            <a:ext cx="2628900" cy="153888"/>
+          </a:xfrm>
+        </p:spPr>
+        <p:txBody>
+          <a:bodyPr/>
+          <a:lstStyle/>
+          <a:p>
+            <a:r>
+              <a:rPr lang="en-US"/>
+              <a:t>Tuesday, February 2, 20XX</a:t>
+            </a:r>
+            <a:endParaRPr lang="en-US" dirty="0"/>
+          </a:p>
+        </p:txBody>
+      </p:sp>
+      <p:sp>
+        <p:nvSpPr>
+          <p:cNvPr id="15" name="Footer Placeholder 14">
+            <a:extLst>
+              <a:ext uri="{FF2B5EF4-FFF2-40B4-BE49-F238E27FC236}">
+                <a16:creationId xmlns:a16="http://schemas.microsoft.com/office/drawing/2014/main" id="{65A6DC02-681E-4AF7-AC6E-57CDDB2FBA28}"/>
+              </a:ext>
+            </a:extLst>
+          </p:cNvPr>
+          <p:cNvSpPr>
+            <a:spLocks noGrp="1"/>
+          </p:cNvSpPr>
+          <p:nvPr>
+            <p:ph type="ftr" sz="quarter" idx="11"/>
+          </p:nvPr>
+        </p:nvSpPr>
+        <p:spPr>
+          <a:xfrm>
+            <a:off x="3359150" y="6507212"/>
+            <a:ext cx="6379210" cy="153888"/>
+          </a:xfrm>
+        </p:spPr>
+        <p:txBody>
+          <a:bodyPr/>
+          <a:lstStyle/>
+          <a:p>
+            <a:r>
+              <a:rPr lang="en-US"/>
+              <a:t>Sample Footer Text</a:t>
+            </a:r>
+          </a:p>
+        </p:txBody>
+      </p:sp>
+      <p:sp>
+        <p:nvSpPr>
+          <p:cNvPr id="16" name="Slide Number Placeholder 15">
+            <a:extLst>
+              <a:ext uri="{FF2B5EF4-FFF2-40B4-BE49-F238E27FC236}">
+                <a16:creationId xmlns:a16="http://schemas.microsoft.com/office/drawing/2014/main" id="{CF0A8666-4477-461C-A79D-E91232EE973E}"/>
+              </a:ext>
+            </a:extLst>
+          </p:cNvPr>
+          <p:cNvSpPr>
+            <a:spLocks noGrp="1"/>
+          </p:cNvSpPr>
+          <p:nvPr>
+            <p:ph type="sldNum" sz="quarter" idx="12"/>
+          </p:nvPr>
+        </p:nvSpPr>
+        <p:spPr>
+          <a:xfrm>
+            <a:off x="9948863" y="6507212"/>
+            <a:ext cx="1692274" cy="153888"/>
+          </a:xfrm>
+        </p:spPr>
+        <p:txBody>
+          <a:bodyPr/>
+          <a:lstStyle/>
+          <a:p>
+            <a:fld id="{DBA1B0FB-D917-4C8C-928F-313BD683BF39}" type="slidenum">
+              <a:rPr lang="en-US" smtClean="0"/>
+              <a:pPr/>
+              <a:t>11</a:t>
+            </a:fld>
+            <a:endParaRPr lang="en-US"/>
+          </a:p>
+        </p:txBody>
+      </p:sp>
+    </p:spTree>
+    <p:extLst>
+      <p:ext uri="{BB962C8B-B14F-4D97-AF65-F5344CB8AC3E}">
+        <p14:creationId xmlns:p14="http://schemas.microsoft.com/office/powerpoint/2010/main" val="1420547054"/>
+      </p:ext>
+    </p:extLst>
+  </p:cSld>
+  <p:clrMapOvr>
+    <a:masterClrMapping/>
+  </p:clrMapOvr>
+</p:sld>
+</file>
+
+<file path=ppt/slides/slide12.xml><?xml version="1.0" encoding="utf-8"?>
+<p:sld xmlns:a="http://schemas.openxmlformats.org/drawingml/2006/main" xmlns:r="http://schemas.openxmlformats.org/officeDocument/2006/relationships" xmlns:p="http://schemas.openxmlformats.org/presentationml/2006/main">
+  <p:cSld>
+    <p:spTree>
+      <p:nvGrpSpPr>
+        <p:cNvPr id="1" name=""/>
+        <p:cNvGrpSpPr/>
+        <p:nvPr/>
+      </p:nvGrpSpPr>
+      <p:grpSpPr>
+        <a:xfrm>
+          <a:off x="0" y="0"/>
+          <a:ext cx="0" cy="0"/>
+          <a:chOff x="0" y="0"/>
+          <a:chExt cx="0" cy="0"/>
+        </a:xfrm>
+      </p:grpSpPr>
+      <p:sp>
+        <p:nvSpPr>
+          <p:cNvPr id="11" name="Title 10">
+            <a:extLst>
+              <a:ext uri="{FF2B5EF4-FFF2-40B4-BE49-F238E27FC236}">
+                <a16:creationId xmlns:a16="http://schemas.microsoft.com/office/drawing/2014/main" id="{581E8936-2270-47FE-94A4-398CB123EF90}"/>
+              </a:ext>
+            </a:extLst>
+          </p:cNvPr>
+          <p:cNvSpPr>
+            <a:spLocks noGrp="1"/>
+          </p:cNvSpPr>
+          <p:nvPr>
+            <p:ph type="title"/>
+          </p:nvPr>
+        </p:nvSpPr>
+        <p:spPr>
+          <a:xfrm>
+            <a:off x="550863" y="4508500"/>
+            <a:ext cx="4500562" cy="1562959"/>
+          </a:xfrm>
+        </p:spPr>
+        <p:txBody>
+          <a:bodyPr/>
+          <a:lstStyle/>
+          <a:p>
+            <a:r>
+              <a:rPr lang="en-US" dirty="0"/>
+              <a:t>Summary</a:t>
+            </a:r>
+          </a:p>
+        </p:txBody>
+      </p:sp>
+      <p:pic>
+        <p:nvPicPr>
+          <p:cNvPr id="16" name="Picture Placeholder 15" descr="Data Points Digital background">
+            <a:extLst>
+              <a:ext uri="{FF2B5EF4-FFF2-40B4-BE49-F238E27FC236}">
+                <a16:creationId xmlns:a16="http://schemas.microsoft.com/office/drawing/2014/main" id="{361E9ADB-7377-4CF1-9AE4-AEFBDEBEEEEC}"/>
+              </a:ext>
+            </a:extLst>
+          </p:cNvPr>
+          <p:cNvPicPr>
+            <a:picLocks noGrp="1" noChangeAspect="1"/>
+          </p:cNvPicPr>
+          <p:nvPr>
+            <p:ph type="pic" sz="quarter" idx="13"/>
+          </p:nvPr>
+        </p:nvPicPr>
+        <p:blipFill rotWithShape="1">
+          <a:blip r:embed="rId3" cstate="screen">
+            <a:extLst>
+              <a:ext uri="{28A0092B-C50C-407E-A947-70E740481C1C}">
+                <a14:useLocalDpi xmlns:a14="http://schemas.microsoft.com/office/drawing/2010/main" val="0"/>
+              </a:ext>
+            </a:extLst>
+          </a:blip>
+          <a:srcRect/>
+          <a:stretch/>
+        </p:blipFill>
+        <p:spPr>
+          <a:xfrm>
+            <a:off x="0" y="0"/>
+            <a:ext cx="12192000" cy="3776472"/>
+          </a:xfrm>
+        </p:spPr>
+      </p:pic>
+      <p:sp>
+        <p:nvSpPr>
+          <p:cNvPr id="13" name="Content Placeholder 12">
+            <a:extLst>
+              <a:ext uri="{FF2B5EF4-FFF2-40B4-BE49-F238E27FC236}">
+                <a16:creationId xmlns:a16="http://schemas.microsoft.com/office/drawing/2014/main" id="{C0287FEC-3826-4868-8D93-52429C6156F5}"/>
+              </a:ext>
+            </a:extLst>
+          </p:cNvPr>
+          <p:cNvSpPr>
+            <a:spLocks noGrp="1"/>
+          </p:cNvSpPr>
+          <p:nvPr>
+            <p:ph sz="quarter" idx="15"/>
+          </p:nvPr>
+        </p:nvSpPr>
+        <p:spPr>
+          <a:xfrm>
+            <a:off x="5262411" y="4508500"/>
+            <a:ext cx="6221412" cy="1563688"/>
+          </a:xfrm>
+        </p:spPr>
+        <p:txBody>
+          <a:bodyPr>
+            <a:normAutofit lnSpcReduction="10000"/>
+          </a:bodyPr>
+          <a:lstStyle/>
+          <a:p>
+            <a:r>
+              <a:rPr lang="en-US" dirty="0"/>
+              <a:t>With PowerPoint, you can create presentations and share your work with others, wherever they are. Type the text you want here to get started. You can also add images, art, and videos on this template. Save to OneDrive and access your presentations from your computer, tablet, or phone. </a:t>
+            </a:r>
+          </a:p>
+        </p:txBody>
+      </p:sp>
+      <p:sp>
+        <p:nvSpPr>
+          <p:cNvPr id="4" name="Date Placeholder 3">
+            <a:extLst>
+              <a:ext uri="{FF2B5EF4-FFF2-40B4-BE49-F238E27FC236}">
+                <a16:creationId xmlns:a16="http://schemas.microsoft.com/office/drawing/2014/main" id="{0C329F70-04F7-4C70-BCF8-D4371F54EF2F}"/>
+              </a:ext>
+            </a:extLst>
+          </p:cNvPr>
+          <p:cNvSpPr>
+            <a:spLocks noGrp="1"/>
+          </p:cNvSpPr>
+          <p:nvPr>
+            <p:ph type="dt" sz="half" idx="10"/>
+          </p:nvPr>
+        </p:nvSpPr>
+        <p:spPr>
+          <a:xfrm>
+            <a:off x="550863" y="6507212"/>
+            <a:ext cx="2628900" cy="153888"/>
+          </a:xfrm>
+        </p:spPr>
+        <p:txBody>
+          <a:bodyPr/>
+          <a:lstStyle/>
+          <a:p>
+            <a:r>
+              <a:rPr lang="en-US"/>
+              <a:t>Tuesday, February 2, 20XX</a:t>
+            </a:r>
+            <a:endParaRPr lang="en-US" dirty="0"/>
+          </a:p>
+        </p:txBody>
+      </p:sp>
+      <p:sp>
+        <p:nvSpPr>
+          <p:cNvPr id="5" name="Footer Placeholder 4">
+            <a:extLst>
+              <a:ext uri="{FF2B5EF4-FFF2-40B4-BE49-F238E27FC236}">
+                <a16:creationId xmlns:a16="http://schemas.microsoft.com/office/drawing/2014/main" id="{06A3302E-502D-4151-81C9-5FD6AF9596D6}"/>
+              </a:ext>
+            </a:extLst>
+          </p:cNvPr>
+          <p:cNvSpPr>
+            <a:spLocks noGrp="1"/>
+          </p:cNvSpPr>
+          <p:nvPr>
+            <p:ph type="ftr" sz="quarter" idx="11"/>
+          </p:nvPr>
+        </p:nvSpPr>
+        <p:spPr>
+          <a:xfrm>
+            <a:off x="3359150" y="6507212"/>
+            <a:ext cx="6379210" cy="153888"/>
+          </a:xfrm>
+        </p:spPr>
+        <p:txBody>
+          <a:bodyPr/>
+          <a:lstStyle/>
+          <a:p>
+            <a:r>
+              <a:rPr lang="en-US"/>
+              <a:t>Sample Footer Text</a:t>
+            </a:r>
+          </a:p>
+        </p:txBody>
+      </p:sp>
+      <p:sp>
+        <p:nvSpPr>
+          <p:cNvPr id="6" name="Slide Number Placeholder 5">
+            <a:extLst>
+              <a:ext uri="{FF2B5EF4-FFF2-40B4-BE49-F238E27FC236}">
+                <a16:creationId xmlns:a16="http://schemas.microsoft.com/office/drawing/2014/main" id="{9ED907F8-C614-4D59-A03F-BF9CD5E35703}"/>
+              </a:ext>
+            </a:extLst>
+          </p:cNvPr>
+          <p:cNvSpPr>
+            <a:spLocks noGrp="1"/>
+          </p:cNvSpPr>
+          <p:nvPr>
+            <p:ph type="sldNum" sz="quarter" idx="12"/>
+          </p:nvPr>
+        </p:nvSpPr>
+        <p:spPr>
+          <a:xfrm>
+            <a:off x="9948863" y="6507212"/>
+            <a:ext cx="1692274" cy="153888"/>
+          </a:xfrm>
+        </p:spPr>
+        <p:txBody>
+          <a:bodyPr/>
+          <a:lstStyle/>
+          <a:p>
+            <a:fld id="{DBA1B0FB-D917-4C8C-928F-313BD683BF39}" type="slidenum">
+              <a:rPr lang="en-US" smtClean="0"/>
+              <a:pPr/>
+              <a:t>12</a:t>
+            </a:fld>
+            <a:endParaRPr lang="en-US"/>
+          </a:p>
+        </p:txBody>
+      </p:sp>
+    </p:spTree>
+    <p:extLst>
+      <p:ext uri="{BB962C8B-B14F-4D97-AF65-F5344CB8AC3E}">
+        <p14:creationId xmlns:p14="http://schemas.microsoft.com/office/powerpoint/2010/main" val="3521561301"/>
+      </p:ext>
+    </p:extLst>
+  </p:cSld>
+  <p:clrMapOvr>
+    <a:masterClrMapping/>
+  </p:clrMapOvr>
+</p:sld>
+</file>
+
+<file path=ppt/slides/slide13.xml><?xml version="1.0" encoding="utf-8"?>
+<p:sld xmlns:a="http://schemas.openxmlformats.org/drawingml/2006/main" xmlns:r="http://schemas.openxmlformats.org/officeDocument/2006/relationships" xmlns:p="http://schemas.openxmlformats.org/presentationml/2006/main">
+  <p:cSld>
+    <p:spTree>
+      <p:nvGrpSpPr>
+        <p:cNvPr id="1" name=""/>
+        <p:cNvGrpSpPr/>
+        <p:nvPr/>
+      </p:nvGrpSpPr>
+      <p:grpSpPr>
+        <a:xfrm>
+          <a:off x="0" y="0"/>
+          <a:ext cx="0" cy="0"/>
+          <a:chOff x="0" y="0"/>
+          <a:chExt cx="0" cy="0"/>
+        </a:xfrm>
+      </p:grpSpPr>
       <p:sp>
         <p:nvSpPr>
           <p:cNvPr id="22" name="Title 21">
@@ -17859,7 +19616,7 @@
             <a:fld id="{DBA1B0FB-D917-4C8C-928F-313BD683BF39}" type="slidenum">
               <a:rPr lang="en-US" smtClean="0"/>
               <a:pPr/>
-              <a:t>10</a:t>
+              <a:t>13</a:t>
             </a:fld>
             <a:endParaRPr lang="en-US"/>
           </a:p>
@@ -19616,27 +21373,31 @@
           <a:lstStyle/>
           <a:p>
             <a:r>
-              <a:rPr lang="en-US" dirty="0"/>
+              <a:rPr lang="en-US" dirty="0">
+                <a:solidFill>
+                  <a:srgbClr val="FFFFFF"/>
+                </a:solidFill>
+              </a:rPr>
               <a:t>CI (continuous integration) is a modern software development practice in which incremental code changes are made frequently and reliably</a:t>
             </a:r>
           </a:p>
           <a:p>
             <a:r>
-              <a:rPr lang="en-US" dirty="0"/>
-              <a:t>CD (continuous delivery) is the automated delivery of completed code to environments like </a:t>
+              <a:rPr lang="en-US" dirty="0">
+                <a:solidFill>
+                  <a:srgbClr val="FFFFFF"/>
+                </a:solidFill>
+              </a:rPr>
+              <a:t>CD (continuous delivery) is the automated delivery of completed code to environments like automated testing.</a:t>
             </a:r>
+          </a:p>
+          <a:p>
             <a:r>
-              <a:rPr lang="en-US" u="sng" dirty="0"/>
-              <a:t>automated testing</a:t>
-            </a:r>
-            <a:r>
-              <a:rPr lang="en-US" dirty="0"/>
-              <a:t>.</a:t>
-            </a:r>
-          </a:p>
-          <a:p>
-            <a:r>
-              <a:rPr lang="en-US" dirty="0"/>
+              <a:rPr lang="en-US" dirty="0">
+                <a:solidFill>
+                  <a:srgbClr val="FFFFFF"/>
+                </a:solidFill>
+              </a:rPr>
               <a:t>CD (continuous deployment) deploying polished code to production.</a:t>
             </a:r>
           </a:p>
@@ -19959,6 +21720,1365 @@
 </file>
 
 <file path=ppt/slides/slide4.xml><?xml version="1.0" encoding="utf-8"?>
+<p:sld xmlns:a="http://schemas.openxmlformats.org/drawingml/2006/main" xmlns:r="http://schemas.openxmlformats.org/officeDocument/2006/relationships" xmlns:p="http://schemas.openxmlformats.org/presentationml/2006/main">
+  <p:cSld>
+    <p:spTree>
+      <p:nvGrpSpPr>
+        <p:cNvPr id="1" name=""/>
+        <p:cNvGrpSpPr/>
+        <p:nvPr/>
+      </p:nvGrpSpPr>
+      <p:grpSpPr>
+        <a:xfrm>
+          <a:off x="0" y="0"/>
+          <a:ext cx="0" cy="0"/>
+          <a:chOff x="0" y="0"/>
+          <a:chExt cx="0" cy="0"/>
+        </a:xfrm>
+      </p:grpSpPr>
+      <p:grpSp>
+        <p:nvGrpSpPr>
+          <p:cNvPr id="25" name="Group 24">
+            <a:extLst>
+              <a:ext uri="{FF2B5EF4-FFF2-40B4-BE49-F238E27FC236}">
+                <a16:creationId xmlns:a16="http://schemas.microsoft.com/office/drawing/2014/main" id="{D10F3D66-0109-4903-90B9-66D0E288F721}"/>
+              </a:ext>
+              <a:ext uri="{C183D7F6-B498-43B3-948B-1728B52AA6E4}">
+                <adec:decorative xmlns:adec="http://schemas.microsoft.com/office/drawing/2017/decorative" val="1"/>
+              </a:ext>
+            </a:extLst>
+          </p:cNvPr>
+          <p:cNvGrpSpPr/>
+          <p:nvPr/>
+        </p:nvGrpSpPr>
+        <p:grpSpPr>
+          <a:xfrm>
+            <a:off x="10379261" y="2030035"/>
+            <a:ext cx="1335600" cy="1262947"/>
+            <a:chOff x="10145015" y="2343978"/>
+            <a:chExt cx="1335600" cy="1262947"/>
+          </a:xfrm>
+        </p:grpSpPr>
+        <p:sp>
+          <p:nvSpPr>
+            <p:cNvPr id="26" name="Freeform: Shape 25">
+              <a:extLst>
+                <a:ext uri="{FF2B5EF4-FFF2-40B4-BE49-F238E27FC236}">
+                  <a16:creationId xmlns:a16="http://schemas.microsoft.com/office/drawing/2014/main" id="{57DAB968-9B52-4EFF-AD39-7657DFEA6E48}"/>
+                </a:ext>
+              </a:extLst>
+            </p:cNvPr>
+            <p:cNvSpPr>
+              <a:spLocks noChangeAspect="1"/>
+            </p:cNvSpPr>
+            <p:nvPr/>
+          </p:nvSpPr>
+          <p:spPr>
+            <a:xfrm rot="8100000">
+              <a:off x="10400615" y="2343978"/>
+              <a:ext cx="1080000" cy="1262947"/>
+            </a:xfrm>
+            <a:custGeom>
+              <a:avLst/>
+              <a:gdLst>
+                <a:gd name="connsiteX0" fmla="*/ 540000 w 1080000"/>
+                <a:gd name="connsiteY0" fmla="*/ 0 h 1262947"/>
+                <a:gd name="connsiteX1" fmla="*/ 1080000 w 1080000"/>
+                <a:gd name="connsiteY1" fmla="*/ 931034 h 1262947"/>
+                <a:gd name="connsiteX2" fmla="*/ 1064374 w 1080000"/>
+                <a:gd name="connsiteY2" fmla="*/ 931034 h 1262947"/>
+                <a:gd name="connsiteX3" fmla="*/ 1069029 w 1080000"/>
+                <a:gd name="connsiteY3" fmla="*/ 938533 h 1262947"/>
+                <a:gd name="connsiteX4" fmla="*/ 1080000 w 1080000"/>
+                <a:gd name="connsiteY4" fmla="*/ 992947 h 1262947"/>
+                <a:gd name="connsiteX5" fmla="*/ 540000 w 1080000"/>
+                <a:gd name="connsiteY5" fmla="*/ 1262947 h 1262947"/>
+                <a:gd name="connsiteX6" fmla="*/ 0 w 1080000"/>
+                <a:gd name="connsiteY6" fmla="*/ 992947 h 1262947"/>
+                <a:gd name="connsiteX7" fmla="*/ 10971 w 1080000"/>
+                <a:gd name="connsiteY7" fmla="*/ 938533 h 1262947"/>
+                <a:gd name="connsiteX8" fmla="*/ 15626 w 1080000"/>
+                <a:gd name="connsiteY8" fmla="*/ 931034 h 1262947"/>
+                <a:gd name="connsiteX9" fmla="*/ 0 w 1080000"/>
+                <a:gd name="connsiteY9" fmla="*/ 931034 h 1262947"/>
+                <a:gd name="connsiteX0" fmla="*/ 540000 w 1080000"/>
+                <a:gd name="connsiteY0" fmla="*/ 0 h 1262947"/>
+                <a:gd name="connsiteX1" fmla="*/ 1080000 w 1080000"/>
+                <a:gd name="connsiteY1" fmla="*/ 931034 h 1262947"/>
+                <a:gd name="connsiteX2" fmla="*/ 1064374 w 1080000"/>
+                <a:gd name="connsiteY2" fmla="*/ 931034 h 1262947"/>
+                <a:gd name="connsiteX3" fmla="*/ 1069029 w 1080000"/>
+                <a:gd name="connsiteY3" fmla="*/ 938533 h 1262947"/>
+                <a:gd name="connsiteX4" fmla="*/ 1080000 w 1080000"/>
+                <a:gd name="connsiteY4" fmla="*/ 992947 h 1262947"/>
+                <a:gd name="connsiteX5" fmla="*/ 540000 w 1080000"/>
+                <a:gd name="connsiteY5" fmla="*/ 1262947 h 1262947"/>
+                <a:gd name="connsiteX6" fmla="*/ 0 w 1080000"/>
+                <a:gd name="connsiteY6" fmla="*/ 992947 h 1262947"/>
+                <a:gd name="connsiteX7" fmla="*/ 10971 w 1080000"/>
+                <a:gd name="connsiteY7" fmla="*/ 938533 h 1262947"/>
+                <a:gd name="connsiteX8" fmla="*/ 15626 w 1080000"/>
+                <a:gd name="connsiteY8" fmla="*/ 931034 h 1262947"/>
+                <a:gd name="connsiteX9" fmla="*/ 540000 w 1080000"/>
+                <a:gd name="connsiteY9" fmla="*/ 0 h 1262947"/>
+                <a:gd name="connsiteX0" fmla="*/ 540000 w 1080000"/>
+                <a:gd name="connsiteY0" fmla="*/ 0 h 1262947"/>
+                <a:gd name="connsiteX1" fmla="*/ 1064374 w 1080000"/>
+                <a:gd name="connsiteY1" fmla="*/ 931034 h 1262947"/>
+                <a:gd name="connsiteX2" fmla="*/ 1069029 w 1080000"/>
+                <a:gd name="connsiteY2" fmla="*/ 938533 h 1262947"/>
+                <a:gd name="connsiteX3" fmla="*/ 1080000 w 1080000"/>
+                <a:gd name="connsiteY3" fmla="*/ 992947 h 1262947"/>
+                <a:gd name="connsiteX4" fmla="*/ 540000 w 1080000"/>
+                <a:gd name="connsiteY4" fmla="*/ 1262947 h 1262947"/>
+                <a:gd name="connsiteX5" fmla="*/ 0 w 1080000"/>
+                <a:gd name="connsiteY5" fmla="*/ 992947 h 1262947"/>
+                <a:gd name="connsiteX6" fmla="*/ 10971 w 1080000"/>
+                <a:gd name="connsiteY6" fmla="*/ 938533 h 1262947"/>
+                <a:gd name="connsiteX7" fmla="*/ 15626 w 1080000"/>
+                <a:gd name="connsiteY7" fmla="*/ 931034 h 1262947"/>
+                <a:gd name="connsiteX8" fmla="*/ 540000 w 1080000"/>
+                <a:gd name="connsiteY8" fmla="*/ 0 h 1262947"/>
+              </a:gdLst>
+              <a:ahLst/>
+              <a:cxnLst>
+                <a:cxn ang="0">
+                  <a:pos x="connsiteX0" y="connsiteY0"/>
+                </a:cxn>
+                <a:cxn ang="0">
+                  <a:pos x="connsiteX1" y="connsiteY1"/>
+                </a:cxn>
+                <a:cxn ang="0">
+                  <a:pos x="connsiteX2" y="connsiteY2"/>
+                </a:cxn>
+                <a:cxn ang="0">
+                  <a:pos x="connsiteX3" y="connsiteY3"/>
+                </a:cxn>
+                <a:cxn ang="0">
+                  <a:pos x="connsiteX4" y="connsiteY4"/>
+                </a:cxn>
+                <a:cxn ang="0">
+                  <a:pos x="connsiteX5" y="connsiteY5"/>
+                </a:cxn>
+                <a:cxn ang="0">
+                  <a:pos x="connsiteX6" y="connsiteY6"/>
+                </a:cxn>
+                <a:cxn ang="0">
+                  <a:pos x="connsiteX7" y="connsiteY7"/>
+                </a:cxn>
+                <a:cxn ang="0">
+                  <a:pos x="connsiteX8" y="connsiteY8"/>
+                </a:cxn>
+              </a:cxnLst>
+              <a:rect l="l" t="t" r="r" b="b"/>
+              <a:pathLst>
+                <a:path w="1080000" h="1262947">
+                  <a:moveTo>
+                    <a:pt x="540000" y="0"/>
+                  </a:moveTo>
+                  <a:lnTo>
+                    <a:pt x="1064374" y="931034"/>
+                  </a:lnTo>
+                  <a:lnTo>
+                    <a:pt x="1069029" y="938533"/>
+                  </a:lnTo>
+                  <a:cubicBezTo>
+                    <a:pt x="1076223" y="956109"/>
+                    <a:pt x="1080000" y="974307"/>
+                    <a:pt x="1080000" y="992947"/>
+                  </a:cubicBezTo>
+                  <a:cubicBezTo>
+                    <a:pt x="1080000" y="1142064"/>
+                    <a:pt x="838234" y="1262947"/>
+                    <a:pt x="540000" y="1262947"/>
+                  </a:cubicBezTo>
+                  <a:cubicBezTo>
+                    <a:pt x="241766" y="1262947"/>
+                    <a:pt x="0" y="1142064"/>
+                    <a:pt x="0" y="992947"/>
+                  </a:cubicBezTo>
+                  <a:cubicBezTo>
+                    <a:pt x="0" y="974307"/>
+                    <a:pt x="3778" y="956109"/>
+                    <a:pt x="10971" y="938533"/>
+                  </a:cubicBezTo>
+                  <a:lnTo>
+                    <a:pt x="15626" y="931034"/>
+                  </a:lnTo>
+                  <a:lnTo>
+                    <a:pt x="540000" y="0"/>
+                  </a:lnTo>
+                  <a:close/>
+                </a:path>
+              </a:pathLst>
+            </a:custGeom>
+            <a:gradFill>
+              <a:gsLst>
+                <a:gs pos="60000">
+                  <a:schemeClr val="bg2">
+                    <a:lumMod val="90000"/>
+                    <a:lumOff val="10000"/>
+                  </a:schemeClr>
+                </a:gs>
+                <a:gs pos="30000">
+                  <a:schemeClr val="bg2">
+                    <a:lumMod val="90000"/>
+                    <a:lumOff val="10000"/>
+                  </a:schemeClr>
+                </a:gs>
+                <a:gs pos="40000">
+                  <a:schemeClr val="bg2">
+                    <a:lumMod val="80000"/>
+                    <a:lumOff val="20000"/>
+                  </a:schemeClr>
+                </a:gs>
+                <a:gs pos="100000">
+                  <a:schemeClr val="bg2"/>
+                </a:gs>
+              </a:gsLst>
+              <a:lin ang="600000" scaled="0"/>
+            </a:gradFill>
+            <a:ln>
+              <a:noFill/>
+            </a:ln>
+            <a:effectLst>
+              <a:innerShdw blurRad="254000" dist="101600" dir="7320000">
+                <a:schemeClr val="accent1">
+                  <a:lumMod val="60000"/>
+                  <a:lumOff val="40000"/>
+                  <a:alpha val="40000"/>
+                </a:schemeClr>
+              </a:innerShdw>
+            </a:effectLst>
+          </p:spPr>
+          <p:style>
+            <a:lnRef idx="2">
+              <a:schemeClr val="accent1">
+                <a:shade val="50000"/>
+              </a:schemeClr>
+            </a:lnRef>
+            <a:fillRef idx="1">
+              <a:schemeClr val="accent1"/>
+            </a:fillRef>
+            <a:effectRef idx="0">
+              <a:schemeClr val="accent1"/>
+            </a:effectRef>
+            <a:fontRef idx="minor">
+              <a:schemeClr val="lt1"/>
+            </a:fontRef>
+          </p:style>
+          <p:txBody>
+            <a:bodyPr rot="0" spcFirstLastPara="0" vertOverflow="overflow" horzOverflow="overflow" vert="horz" wrap="square" lIns="91440" tIns="45720" rIns="91440" bIns="45720" numCol="1" spcCol="0" rtlCol="0" fromWordArt="0" anchor="ctr" anchorCtr="0" forceAA="0" compatLnSpc="1">
+              <a:prstTxWarp prst="textNoShape">
+                <a:avLst/>
+              </a:prstTxWarp>
+              <a:noAutofit/>
+            </a:bodyPr>
+            <a:lstStyle/>
+            <a:p>
+              <a:pPr algn="ctr"/>
+              <a:endParaRPr lang="en-US"/>
+            </a:p>
+          </p:txBody>
+        </p:sp>
+        <p:sp>
+          <p:nvSpPr>
+            <p:cNvPr id="27" name="Oval 26">
+              <a:extLst>
+                <a:ext uri="{FF2B5EF4-FFF2-40B4-BE49-F238E27FC236}">
+                  <a16:creationId xmlns:a16="http://schemas.microsoft.com/office/drawing/2014/main" id="{962BE440-9634-4380-B142-5DB692420C52}"/>
+                </a:ext>
+              </a:extLst>
+            </p:cNvPr>
+            <p:cNvSpPr/>
+            <p:nvPr/>
+          </p:nvSpPr>
+          <p:spPr>
+            <a:xfrm rot="13500000">
+              <a:off x="10415015" y="2179851"/>
+              <a:ext cx="540000" cy="1080000"/>
+            </a:xfrm>
+            <a:prstGeom prst="ellipse">
+              <a:avLst/>
+            </a:prstGeom>
+            <a:gradFill>
+              <a:gsLst>
+                <a:gs pos="100000">
+                  <a:schemeClr val="accent1">
+                    <a:lumMod val="60000"/>
+                    <a:lumOff val="40000"/>
+                    <a:alpha val="0"/>
+                  </a:schemeClr>
+                </a:gs>
+                <a:gs pos="0">
+                  <a:schemeClr val="bg2">
+                    <a:lumMod val="75000"/>
+                    <a:lumOff val="25000"/>
+                    <a:alpha val="33000"/>
+                  </a:schemeClr>
+                </a:gs>
+              </a:gsLst>
+              <a:lin ang="5400000" scaled="0"/>
+            </a:gradFill>
+            <a:ln>
+              <a:noFill/>
+            </a:ln>
+            <a:effectLst>
+              <a:innerShdw blurRad="1270000" dist="2540000">
+                <a:schemeClr val="accent1">
+                  <a:lumMod val="60000"/>
+                  <a:lumOff val="40000"/>
+                  <a:alpha val="0"/>
+                </a:schemeClr>
+              </a:innerShdw>
+            </a:effectLst>
+          </p:spPr>
+          <p:style>
+            <a:lnRef idx="2">
+              <a:schemeClr val="accent1">
+                <a:shade val="50000"/>
+              </a:schemeClr>
+            </a:lnRef>
+            <a:fillRef idx="1">
+              <a:schemeClr val="accent1"/>
+            </a:fillRef>
+            <a:effectRef idx="0">
+              <a:schemeClr val="accent1"/>
+            </a:effectRef>
+            <a:fontRef idx="minor">
+              <a:schemeClr val="lt1"/>
+            </a:fontRef>
+          </p:style>
+          <p:txBody>
+            <a:bodyPr rot="0" spcFirstLastPara="0" vertOverflow="overflow" horzOverflow="overflow" vert="horz" wrap="square" lIns="91440" tIns="45720" rIns="91440" bIns="45720" numCol="1" spcCol="0" rtlCol="0" fromWordArt="0" anchor="ctr" anchorCtr="0" forceAA="0" compatLnSpc="1">
+              <a:prstTxWarp prst="textNoShape">
+                <a:avLst/>
+              </a:prstTxWarp>
+              <a:noAutofit/>
+            </a:bodyPr>
+            <a:lstStyle/>
+            <a:p>
+              <a:pPr algn="ctr"/>
+              <a:endParaRPr lang="en-US"/>
+            </a:p>
+          </p:txBody>
+        </p:sp>
+      </p:grpSp>
+      <p:sp>
+        <p:nvSpPr>
+          <p:cNvPr id="7" name="Title 6">
+            <a:extLst>
+              <a:ext uri="{FF2B5EF4-FFF2-40B4-BE49-F238E27FC236}">
+                <a16:creationId xmlns:a16="http://schemas.microsoft.com/office/drawing/2014/main" id="{4B18D636-CC10-4B1E-AA38-419DCCF2D9C9}"/>
+              </a:ext>
+            </a:extLst>
+          </p:cNvPr>
+          <p:cNvSpPr>
+            <a:spLocks noGrp="1"/>
+          </p:cNvSpPr>
+          <p:nvPr>
+            <p:ph type="title"/>
+          </p:nvPr>
+        </p:nvSpPr>
+        <p:spPr>
+          <a:xfrm>
+            <a:off x="550862" y="549275"/>
+            <a:ext cx="11097551" cy="1332000"/>
+          </a:xfrm>
+        </p:spPr>
+        <p:txBody>
+          <a:bodyPr>
+            <a:normAutofit/>
+          </a:bodyPr>
+          <a:lstStyle/>
+          <a:p>
+            <a:r>
+              <a:rPr lang="en-US" dirty="0"/>
+              <a:t>Azure Resources for CI / CD </a:t>
+            </a:r>
+          </a:p>
+        </p:txBody>
+      </p:sp>
+      <p:sp>
+        <p:nvSpPr>
+          <p:cNvPr id="5" name="Footer Placeholder 4">
+            <a:extLst>
+              <a:ext uri="{FF2B5EF4-FFF2-40B4-BE49-F238E27FC236}">
+                <a16:creationId xmlns:a16="http://schemas.microsoft.com/office/drawing/2014/main" id="{06A3302E-502D-4151-81C9-5FD6AF9596D6}"/>
+              </a:ext>
+            </a:extLst>
+          </p:cNvPr>
+          <p:cNvSpPr>
+            <a:spLocks noGrp="1"/>
+          </p:cNvSpPr>
+          <p:nvPr>
+            <p:ph type="ftr" sz="quarter" idx="11"/>
+          </p:nvPr>
+        </p:nvSpPr>
+        <p:spPr>
+          <a:xfrm>
+            <a:off x="3359150" y="6507212"/>
+            <a:ext cx="6379210" cy="153888"/>
+          </a:xfrm>
+        </p:spPr>
+        <p:txBody>
+          <a:bodyPr/>
+          <a:lstStyle/>
+          <a:p>
+            <a:r>
+              <a:rPr lang="en-US"/>
+              <a:t>Sample Footer Text</a:t>
+            </a:r>
+          </a:p>
+        </p:txBody>
+      </p:sp>
+      <p:sp>
+        <p:nvSpPr>
+          <p:cNvPr id="6" name="Slide Number Placeholder 5">
+            <a:extLst>
+              <a:ext uri="{FF2B5EF4-FFF2-40B4-BE49-F238E27FC236}">
+                <a16:creationId xmlns:a16="http://schemas.microsoft.com/office/drawing/2014/main" id="{9ED907F8-C614-4D59-A03F-BF9CD5E35703}"/>
+              </a:ext>
+            </a:extLst>
+          </p:cNvPr>
+          <p:cNvSpPr>
+            <a:spLocks noGrp="1"/>
+          </p:cNvSpPr>
+          <p:nvPr>
+            <p:ph type="sldNum" sz="quarter" idx="12"/>
+          </p:nvPr>
+        </p:nvSpPr>
+        <p:spPr>
+          <a:xfrm>
+            <a:off x="9948863" y="6507212"/>
+            <a:ext cx="1692274" cy="153888"/>
+          </a:xfrm>
+        </p:spPr>
+        <p:txBody>
+          <a:bodyPr/>
+          <a:lstStyle/>
+          <a:p>
+            <a:fld id="{DBA1B0FB-D917-4C8C-928F-313BD683BF39}" type="slidenum">
+              <a:rPr lang="en-US" smtClean="0"/>
+              <a:pPr/>
+              <a:t>4</a:t>
+            </a:fld>
+            <a:endParaRPr lang="en-US"/>
+          </a:p>
+        </p:txBody>
+      </p:sp>
+      <p:sp>
+        <p:nvSpPr>
+          <p:cNvPr id="22" name="Freeform: Shape 21">
+            <a:extLst>
+              <a:ext uri="{FF2B5EF4-FFF2-40B4-BE49-F238E27FC236}">
+                <a16:creationId xmlns:a16="http://schemas.microsoft.com/office/drawing/2014/main" id="{C6F3814E-455F-456B-B1AF-7B993965A2C0}"/>
+              </a:ext>
+              <a:ext uri="{C183D7F6-B498-43B3-948B-1728B52AA6E4}">
+                <adec:decorative xmlns:adec="http://schemas.microsoft.com/office/drawing/2017/decorative" val="1"/>
+              </a:ext>
+            </a:extLst>
+          </p:cNvPr>
+          <p:cNvSpPr>
+            <a:spLocks noChangeAspect="1"/>
+          </p:cNvSpPr>
+          <p:nvPr/>
+        </p:nvSpPr>
+        <p:spPr>
+          <a:xfrm>
+            <a:off x="4295775" y="0"/>
+            <a:ext cx="360000" cy="274638"/>
+          </a:xfrm>
+          <a:custGeom>
+            <a:avLst/>
+            <a:gdLst>
+              <a:gd name="connsiteX0" fmla="*/ 30714 w 360000"/>
+              <a:gd name="connsiteY0" fmla="*/ 0 h 274638"/>
+              <a:gd name="connsiteX1" fmla="*/ 329286 w 360000"/>
+              <a:gd name="connsiteY1" fmla="*/ 0 h 274638"/>
+              <a:gd name="connsiteX2" fmla="*/ 345855 w 360000"/>
+              <a:gd name="connsiteY2" fmla="*/ 24574 h 274638"/>
+              <a:gd name="connsiteX3" fmla="*/ 360000 w 360000"/>
+              <a:gd name="connsiteY3" fmla="*/ 94638 h 274638"/>
+              <a:gd name="connsiteX4" fmla="*/ 180000 w 360000"/>
+              <a:gd name="connsiteY4" fmla="*/ 274638 h 274638"/>
+              <a:gd name="connsiteX5" fmla="*/ 0 w 360000"/>
+              <a:gd name="connsiteY5" fmla="*/ 94638 h 274638"/>
+              <a:gd name="connsiteX6" fmla="*/ 14145 w 360000"/>
+              <a:gd name="connsiteY6" fmla="*/ 24574 h 274638"/>
+            </a:gdLst>
+            <a:ahLst/>
+            <a:cxnLst>
+              <a:cxn ang="0">
+                <a:pos x="connsiteX0" y="connsiteY0"/>
+              </a:cxn>
+              <a:cxn ang="0">
+                <a:pos x="connsiteX1" y="connsiteY1"/>
+              </a:cxn>
+              <a:cxn ang="0">
+                <a:pos x="connsiteX2" y="connsiteY2"/>
+              </a:cxn>
+              <a:cxn ang="0">
+                <a:pos x="connsiteX3" y="connsiteY3"/>
+              </a:cxn>
+              <a:cxn ang="0">
+                <a:pos x="connsiteX4" y="connsiteY4"/>
+              </a:cxn>
+              <a:cxn ang="0">
+                <a:pos x="connsiteX5" y="connsiteY5"/>
+              </a:cxn>
+              <a:cxn ang="0">
+                <a:pos x="connsiteX6" y="connsiteY6"/>
+              </a:cxn>
+            </a:cxnLst>
+            <a:rect l="l" t="t" r="r" b="b"/>
+            <a:pathLst>
+              <a:path w="360000" h="274638">
+                <a:moveTo>
+                  <a:pt x="30714" y="0"/>
+                </a:moveTo>
+                <a:lnTo>
+                  <a:pt x="329286" y="0"/>
+                </a:lnTo>
+                <a:lnTo>
+                  <a:pt x="345855" y="24574"/>
+                </a:lnTo>
+                <a:cubicBezTo>
+                  <a:pt x="354963" y="46109"/>
+                  <a:pt x="360000" y="69785"/>
+                  <a:pt x="360000" y="94638"/>
+                </a:cubicBezTo>
+                <a:cubicBezTo>
+                  <a:pt x="360000" y="194049"/>
+                  <a:pt x="279411" y="274638"/>
+                  <a:pt x="180000" y="274638"/>
+                </a:cubicBezTo>
+                <a:cubicBezTo>
+                  <a:pt x="80589" y="274638"/>
+                  <a:pt x="0" y="194049"/>
+                  <a:pt x="0" y="94638"/>
+                </a:cubicBezTo>
+                <a:cubicBezTo>
+                  <a:pt x="0" y="69785"/>
+                  <a:pt x="5037" y="46109"/>
+                  <a:pt x="14145" y="24574"/>
+                </a:cubicBezTo>
+                <a:close/>
+              </a:path>
+            </a:pathLst>
+          </a:custGeom>
+          <a:gradFill flip="none" rotWithShape="1">
+            <a:gsLst>
+              <a:gs pos="100000">
+                <a:schemeClr val="bg2">
+                  <a:lumMod val="50000"/>
+                  <a:lumOff val="50000"/>
+                </a:schemeClr>
+              </a:gs>
+              <a:gs pos="60000">
+                <a:schemeClr val="bg2"/>
+              </a:gs>
+            </a:gsLst>
+            <a:path path="circle">
+              <a:fillToRect l="100000" b="100000"/>
+            </a:path>
+            <a:tileRect t="-100000" r="-100000"/>
+          </a:gradFill>
+          <a:ln>
+            <a:noFill/>
+          </a:ln>
+          <a:effectLst>
+            <a:innerShdw blurRad="127000" dist="63500" dir="2700000">
+              <a:schemeClr val="accent1">
+                <a:lumMod val="60000"/>
+                <a:lumOff val="40000"/>
+                <a:alpha val="20000"/>
+              </a:schemeClr>
+            </a:innerShdw>
+            <a:softEdge rad="0"/>
+          </a:effectLst>
+        </p:spPr>
+        <p:style>
+          <a:lnRef idx="2">
+            <a:schemeClr val="accent1">
+              <a:shade val="50000"/>
+            </a:schemeClr>
+          </a:lnRef>
+          <a:fillRef idx="1">
+            <a:schemeClr val="accent1"/>
+          </a:fillRef>
+          <a:effectRef idx="0">
+            <a:schemeClr val="accent1"/>
+          </a:effectRef>
+          <a:fontRef idx="minor">
+            <a:schemeClr val="lt1"/>
+          </a:fontRef>
+        </p:style>
+        <p:txBody>
+          <a:bodyPr rot="0" spcFirstLastPara="0" vertOverflow="overflow" horzOverflow="overflow" vert="horz" wrap="square" lIns="91440" tIns="45720" rIns="91440" bIns="45720" numCol="1" spcCol="0" rtlCol="0" fromWordArt="0" anchor="ctr" anchorCtr="0" forceAA="0" compatLnSpc="1">
+            <a:prstTxWarp prst="textNoShape">
+              <a:avLst/>
+            </a:prstTxWarp>
+            <a:noAutofit/>
+          </a:bodyPr>
+          <a:lstStyle/>
+          <a:p>
+            <a:pPr algn="ctr"/>
+            <a:endParaRPr lang="en-US"/>
+          </a:p>
+        </p:txBody>
+      </p:sp>
+      <p:pic>
+        <p:nvPicPr>
+          <p:cNvPr id="9" name="Picture 8">
+            <a:extLst>
+              <a:ext uri="{FF2B5EF4-FFF2-40B4-BE49-F238E27FC236}">
+                <a16:creationId xmlns:a16="http://schemas.microsoft.com/office/drawing/2014/main" id="{91E63122-53BC-B250-E8D3-13C32D5D8824}"/>
+              </a:ext>
+            </a:extLst>
+          </p:cNvPr>
+          <p:cNvPicPr>
+            <a:picLocks noChangeAspect="1"/>
+          </p:cNvPicPr>
+          <p:nvPr/>
+        </p:nvPicPr>
+        <p:blipFill>
+          <a:blip r:embed="rId3"/>
+          <a:stretch>
+            <a:fillRect/>
+          </a:stretch>
+        </p:blipFill>
+        <p:spPr>
+          <a:xfrm>
+            <a:off x="2565098" y="5354511"/>
+            <a:ext cx="7061803" cy="1306589"/>
+          </a:xfrm>
+          <a:prstGeom prst="rect">
+            <a:avLst/>
+          </a:prstGeom>
+        </p:spPr>
+      </p:pic>
+      <p:sp>
+        <p:nvSpPr>
+          <p:cNvPr id="16" name="Content Placeholder 9">
+            <a:extLst>
+              <a:ext uri="{FF2B5EF4-FFF2-40B4-BE49-F238E27FC236}">
+                <a16:creationId xmlns:a16="http://schemas.microsoft.com/office/drawing/2014/main" id="{AB24676A-7877-5B85-E55B-540317CAB57F}"/>
+              </a:ext>
+            </a:extLst>
+          </p:cNvPr>
+          <p:cNvSpPr>
+            <a:spLocks noGrp="1"/>
+          </p:cNvSpPr>
+          <p:nvPr>
+            <p:ph sz="half" idx="2"/>
+          </p:nvPr>
+        </p:nvSpPr>
+        <p:spPr>
+          <a:xfrm>
+            <a:off x="543587" y="1534206"/>
+            <a:ext cx="9555038" cy="3515555"/>
+          </a:xfrm>
+        </p:spPr>
+        <p:txBody>
+          <a:bodyPr/>
+          <a:lstStyle/>
+          <a:p>
+            <a:pPr>
+              <a:lnSpc>
+                <a:spcPct val="100000"/>
+              </a:lnSpc>
+            </a:pPr>
+            <a:r>
+              <a:rPr lang="en-US" dirty="0">
+                <a:solidFill>
+                  <a:srgbClr val="FFFFFF"/>
+                </a:solidFill>
+              </a:rPr>
+              <a:t>Azure </a:t>
+            </a:r>
+            <a:r>
+              <a:rPr lang="en-US" dirty="0" err="1">
+                <a:solidFill>
+                  <a:srgbClr val="FFFFFF"/>
+                </a:solidFill>
+              </a:rPr>
+              <a:t>Devops</a:t>
+            </a:r>
+            <a:r>
+              <a:rPr lang="en-US" dirty="0">
+                <a:solidFill>
+                  <a:srgbClr val="FFFFFF"/>
+                </a:solidFill>
+              </a:rPr>
+              <a:t>:</a:t>
+            </a:r>
+          </a:p>
+          <a:p>
+            <a:pPr lvl="1"/>
+            <a:r>
+              <a:rPr lang="en-US" sz="2000" dirty="0">
+                <a:solidFill>
+                  <a:srgbClr val="FFFFFF"/>
+                </a:solidFill>
+              </a:rPr>
+              <a:t>Azure Boards:   plan, track, and discuss work across your teams</a:t>
+            </a:r>
+          </a:p>
+          <a:p>
+            <a:pPr lvl="1">
+              <a:lnSpc>
+                <a:spcPct val="100000"/>
+              </a:lnSpc>
+            </a:pPr>
+            <a:r>
+              <a:rPr lang="en-US" sz="2000" dirty="0">
+                <a:solidFill>
+                  <a:srgbClr val="FFFFFF"/>
+                </a:solidFill>
+              </a:rPr>
+              <a:t>Azure Repos:   like GitHub, but targets private project repositories</a:t>
+            </a:r>
+          </a:p>
+          <a:p>
+            <a:pPr lvl="1">
+              <a:lnSpc>
+                <a:spcPct val="100000"/>
+              </a:lnSpc>
+            </a:pPr>
+            <a:r>
+              <a:rPr lang="en-US" sz="2000" dirty="0">
+                <a:solidFill>
+                  <a:srgbClr val="FFFFFF"/>
+                </a:solidFill>
+              </a:rPr>
+              <a:t>Azure Pipelines:   build, test, and deploy to Azure platforms automatically</a:t>
+            </a:r>
+          </a:p>
+          <a:p>
+            <a:pPr lvl="1">
+              <a:lnSpc>
+                <a:spcPct val="100000"/>
+              </a:lnSpc>
+            </a:pPr>
+            <a:r>
+              <a:rPr lang="en-US" sz="2000" dirty="0">
+                <a:solidFill>
+                  <a:srgbClr val="FFFFFF"/>
+                </a:solidFill>
+              </a:rPr>
+              <a:t>Azure Test Plans:   plan, execute, and track scripted tests</a:t>
+            </a:r>
+          </a:p>
+          <a:p>
+            <a:pPr lvl="1"/>
+            <a:r>
+              <a:rPr lang="en-US" sz="2000" dirty="0">
+                <a:solidFill>
+                  <a:srgbClr val="FFFFFF"/>
+                </a:solidFill>
+              </a:rPr>
+              <a:t>Azure Artifacts:   create and share code and packages with your team</a:t>
+            </a:r>
+            <a:br>
+              <a:rPr lang="en-US" sz="2400" b="0" i="0" dirty="0">
+                <a:solidFill>
+                  <a:srgbClr val="4C4C51"/>
+                </a:solidFill>
+                <a:effectLst/>
+                <a:latin typeface="Segoe UI" panose="020B0502040204020203" pitchFamily="34" charset="0"/>
+              </a:rPr>
+            </a:br>
+            <a:endParaRPr lang="en-US" sz="2000" dirty="0">
+              <a:solidFill>
+                <a:srgbClr val="FFFFFF"/>
+              </a:solidFill>
+            </a:endParaRPr>
+          </a:p>
+        </p:txBody>
+      </p:sp>
+    </p:spTree>
+    <p:extLst>
+      <p:ext uri="{BB962C8B-B14F-4D97-AF65-F5344CB8AC3E}">
+        <p14:creationId xmlns:p14="http://schemas.microsoft.com/office/powerpoint/2010/main" val="2944377273"/>
+      </p:ext>
+    </p:extLst>
+  </p:cSld>
+  <p:clrMapOvr>
+    <a:masterClrMapping/>
+  </p:clrMapOvr>
+</p:sld>
+</file>
+
+<file path=ppt/slides/slide5.xml><?xml version="1.0" encoding="utf-8"?>
+<p:sld xmlns:a="http://schemas.openxmlformats.org/drawingml/2006/main" xmlns:r="http://schemas.openxmlformats.org/officeDocument/2006/relationships" xmlns:p="http://schemas.openxmlformats.org/presentationml/2006/main">
+  <p:cSld>
+    <p:spTree>
+      <p:nvGrpSpPr>
+        <p:cNvPr id="1" name=""/>
+        <p:cNvGrpSpPr/>
+        <p:nvPr/>
+      </p:nvGrpSpPr>
+      <p:grpSpPr>
+        <a:xfrm>
+          <a:off x="0" y="0"/>
+          <a:ext cx="0" cy="0"/>
+          <a:chOff x="0" y="0"/>
+          <a:chExt cx="0" cy="0"/>
+        </a:xfrm>
+      </p:grpSpPr>
+      <p:pic>
+        <p:nvPicPr>
+          <p:cNvPr id="8" name="Picture Placeholder 7" descr="Data Points Digital background">
+            <a:extLst>
+              <a:ext uri="{FF2B5EF4-FFF2-40B4-BE49-F238E27FC236}">
+                <a16:creationId xmlns:a16="http://schemas.microsoft.com/office/drawing/2014/main" id="{5FED7C55-F545-49A1-90FD-D853A25AB453}"/>
+              </a:ext>
+            </a:extLst>
+          </p:cNvPr>
+          <p:cNvPicPr>
+            <a:picLocks noGrp="1" noChangeAspect="1"/>
+          </p:cNvPicPr>
+          <p:nvPr>
+            <p:ph type="pic" sz="quarter" idx="13"/>
+          </p:nvPr>
+        </p:nvPicPr>
+        <p:blipFill>
+          <a:blip r:embed="rId3">
+            <a:extLst>
+              <a:ext uri="{28A0092B-C50C-407E-A947-70E740481C1C}">
+                <a14:useLocalDpi xmlns:a14="http://schemas.microsoft.com/office/drawing/2010/main" val="0"/>
+              </a:ext>
+            </a:extLst>
+          </a:blip>
+          <a:srcRect/>
+          <a:stretch>
+            <a:fillRect/>
+          </a:stretch>
+        </p:blipFill>
+        <p:spPr/>
+      </p:pic>
+      <p:sp>
+        <p:nvSpPr>
+          <p:cNvPr id="15" name="Title 14">
+            <a:extLst>
+              <a:ext uri="{FF2B5EF4-FFF2-40B4-BE49-F238E27FC236}">
+                <a16:creationId xmlns:a16="http://schemas.microsoft.com/office/drawing/2014/main" id="{40F1DF5B-353A-4270-8C10-6A1509441174}"/>
+              </a:ext>
+            </a:extLst>
+          </p:cNvPr>
+          <p:cNvSpPr>
+            <a:spLocks noGrp="1"/>
+          </p:cNvSpPr>
+          <p:nvPr>
+            <p:ph type="ctrTitle"/>
+          </p:nvPr>
+        </p:nvSpPr>
+        <p:spPr>
+          <a:xfrm>
+            <a:off x="550863" y="549275"/>
+            <a:ext cx="5437187" cy="2986234"/>
+          </a:xfrm>
+        </p:spPr>
+        <p:txBody>
+          <a:bodyPr vert="horz" wrap="square" lIns="0" tIns="0" rIns="0" bIns="0" rtlCol="0" anchor="b" anchorCtr="0">
+            <a:normAutofit/>
+          </a:bodyPr>
+          <a:lstStyle/>
+          <a:p>
+            <a:pPr>
+              <a:lnSpc>
+                <a:spcPct val="100000"/>
+              </a:lnSpc>
+            </a:pPr>
+            <a:r>
+              <a:rPr lang="en-US" dirty="0"/>
+              <a:t>CI / CD</a:t>
+            </a:r>
+            <a:endParaRPr lang="en-US" sz="6400" kern="1200" dirty="0">
+              <a:solidFill>
+                <a:schemeClr val="tx1"/>
+              </a:solidFill>
+              <a:latin typeface="+mj-lt"/>
+              <a:ea typeface="+mj-ea"/>
+              <a:cs typeface="+mj-cs"/>
+            </a:endParaRPr>
+          </a:p>
+        </p:txBody>
+      </p:sp>
+      <p:sp>
+        <p:nvSpPr>
+          <p:cNvPr id="16" name="Subtitle 15">
+            <a:extLst>
+              <a:ext uri="{FF2B5EF4-FFF2-40B4-BE49-F238E27FC236}">
+                <a16:creationId xmlns:a16="http://schemas.microsoft.com/office/drawing/2014/main" id="{4BDCF583-1D5D-4235-97C2-39272B80A0B1}"/>
+              </a:ext>
+            </a:extLst>
+          </p:cNvPr>
+          <p:cNvSpPr>
+            <a:spLocks noGrp="1"/>
+          </p:cNvSpPr>
+          <p:nvPr>
+            <p:ph type="subTitle" idx="1"/>
+          </p:nvPr>
+        </p:nvSpPr>
+        <p:spPr>
+          <a:xfrm>
+            <a:off x="550863" y="3827610"/>
+            <a:ext cx="5437187" cy="2265216"/>
+          </a:xfrm>
+        </p:spPr>
+        <p:txBody>
+          <a:bodyPr vert="horz" wrap="square" lIns="0" tIns="0" rIns="0" bIns="0" rtlCol="0">
+            <a:normAutofit/>
+          </a:bodyPr>
+          <a:lstStyle/>
+          <a:p>
+            <a:pPr marL="0" indent="0">
+              <a:lnSpc>
+                <a:spcPct val="100000"/>
+              </a:lnSpc>
+              <a:buNone/>
+            </a:pPr>
+            <a:r>
+              <a:rPr lang="en-US" sz="1800" dirty="0">
+                <a:effectLst/>
+                <a:latin typeface="Calibri" panose="020F0502020204030204" pitchFamily="34" charset="0"/>
+                <a:ea typeface="Calibri" panose="020F0502020204030204" pitchFamily="34" charset="0"/>
+              </a:rPr>
+              <a:t>What Azure resources can we use to set up and implement</a:t>
+            </a:r>
+            <a:r>
+              <a:rPr lang="en-US" sz="1800" spc="5" dirty="0">
+                <a:effectLst/>
+                <a:latin typeface="Calibri" panose="020F0502020204030204" pitchFamily="34" charset="0"/>
+                <a:ea typeface="Calibri" panose="020F0502020204030204" pitchFamily="34" charset="0"/>
+              </a:rPr>
+              <a:t> </a:t>
+            </a:r>
+            <a:r>
+              <a:rPr lang="en-US" sz="1800" dirty="0">
+                <a:effectLst/>
+                <a:latin typeface="Calibri" panose="020F0502020204030204" pitchFamily="34" charset="0"/>
+                <a:ea typeface="Calibri" panose="020F0502020204030204" pitchFamily="34" charset="0"/>
+              </a:rPr>
+              <a:t>CI /</a:t>
+            </a:r>
+            <a:r>
+              <a:rPr lang="en-US" sz="1800" spc="15" dirty="0">
+                <a:effectLst/>
+                <a:latin typeface="Calibri" panose="020F0502020204030204" pitchFamily="34" charset="0"/>
+                <a:ea typeface="Calibri" panose="020F0502020204030204" pitchFamily="34" charset="0"/>
+              </a:rPr>
+              <a:t> </a:t>
+            </a:r>
+            <a:r>
+              <a:rPr lang="en-US" sz="1800" dirty="0">
+                <a:effectLst/>
+                <a:latin typeface="Calibri" panose="020F0502020204030204" pitchFamily="34" charset="0"/>
+                <a:ea typeface="Calibri" panose="020F0502020204030204" pitchFamily="34" charset="0"/>
+              </a:rPr>
+              <a:t>CD</a:t>
+            </a:r>
+            <a:r>
+              <a:rPr lang="en-US" sz="1800" spc="-5" dirty="0">
+                <a:effectLst/>
+                <a:latin typeface="Calibri" panose="020F0502020204030204" pitchFamily="34" charset="0"/>
+                <a:ea typeface="Calibri" panose="020F0502020204030204" pitchFamily="34" charset="0"/>
+              </a:rPr>
+              <a:t> </a:t>
+            </a:r>
+            <a:r>
+              <a:rPr lang="en-US" sz="1800" dirty="0">
+                <a:effectLst/>
+                <a:latin typeface="Calibri" panose="020F0502020204030204" pitchFamily="34" charset="0"/>
+                <a:ea typeface="Calibri" panose="020F0502020204030204" pitchFamily="34" charset="0"/>
+              </a:rPr>
+              <a:t>in</a:t>
+            </a:r>
+            <a:r>
+              <a:rPr lang="en-US" sz="1800" spc="-25" dirty="0">
+                <a:effectLst/>
+                <a:latin typeface="Calibri" panose="020F0502020204030204" pitchFamily="34" charset="0"/>
+                <a:ea typeface="Calibri" panose="020F0502020204030204" pitchFamily="34" charset="0"/>
+              </a:rPr>
+              <a:t> </a:t>
+            </a:r>
+            <a:r>
+              <a:rPr lang="en-US" sz="1800" dirty="0">
+                <a:effectLst/>
+                <a:latin typeface="Calibri" panose="020F0502020204030204" pitchFamily="34" charset="0"/>
+                <a:ea typeface="Calibri" panose="020F0502020204030204" pitchFamily="34" charset="0"/>
+              </a:rPr>
+              <a:t>our</a:t>
+            </a:r>
+            <a:r>
+              <a:rPr lang="en-US" sz="1800" spc="-15" dirty="0">
+                <a:effectLst/>
+                <a:latin typeface="Calibri" panose="020F0502020204030204" pitchFamily="34" charset="0"/>
+                <a:ea typeface="Calibri" panose="020F0502020204030204" pitchFamily="34" charset="0"/>
+              </a:rPr>
+              <a:t> </a:t>
+            </a:r>
+            <a:r>
+              <a:rPr lang="en-US" sz="1800" dirty="0">
+                <a:effectLst/>
+                <a:latin typeface="Calibri" panose="020F0502020204030204" pitchFamily="34" charset="0"/>
+                <a:ea typeface="Calibri" panose="020F0502020204030204" pitchFamily="34" charset="0"/>
+              </a:rPr>
+              <a:t>work</a:t>
+            </a:r>
+            <a:r>
+              <a:rPr lang="en-US" sz="1800" spc="-10" dirty="0">
+                <a:effectLst/>
+                <a:latin typeface="Calibri" panose="020F0502020204030204" pitchFamily="34" charset="0"/>
+                <a:ea typeface="Calibri" panose="020F0502020204030204" pitchFamily="34" charset="0"/>
+              </a:rPr>
+              <a:t> </a:t>
+            </a:r>
+            <a:r>
+              <a:rPr lang="en-US" sz="1800" dirty="0">
+                <a:effectLst/>
+                <a:latin typeface="Calibri" panose="020F0502020204030204" pitchFamily="34" charset="0"/>
+                <a:ea typeface="Calibri" panose="020F0502020204030204" pitchFamily="34" charset="0"/>
+              </a:rPr>
+              <a:t>environment?</a:t>
+            </a:r>
+            <a:endParaRPr lang="en-US" kern="1200" dirty="0">
+              <a:latin typeface="+mn-lt"/>
+              <a:ea typeface="+mn-ea"/>
+              <a:cs typeface="+mn-cs"/>
+            </a:endParaRPr>
+          </a:p>
+        </p:txBody>
+      </p:sp>
+      <p:sp>
+        <p:nvSpPr>
+          <p:cNvPr id="4" name="Slide Number Placeholder 3">
+            <a:extLst>
+              <a:ext uri="{FF2B5EF4-FFF2-40B4-BE49-F238E27FC236}">
+                <a16:creationId xmlns:a16="http://schemas.microsoft.com/office/drawing/2014/main" id="{E1E7D98D-6710-41D2-B258-E1A1059D29F8}"/>
+              </a:ext>
+            </a:extLst>
+          </p:cNvPr>
+          <p:cNvSpPr>
+            <a:spLocks noGrp="1"/>
+          </p:cNvSpPr>
+          <p:nvPr>
+            <p:ph type="sldNum" sz="quarter" idx="12"/>
+          </p:nvPr>
+        </p:nvSpPr>
+        <p:spPr/>
+        <p:txBody>
+          <a:bodyPr/>
+          <a:lstStyle/>
+          <a:p>
+            <a:fld id="{DBA1B0FB-D917-4C8C-928F-313BD683BF39}" type="slidenum">
+              <a:rPr lang="en-US" smtClean="0"/>
+              <a:t>5</a:t>
+            </a:fld>
+            <a:endParaRPr lang="en-US"/>
+          </a:p>
+        </p:txBody>
+      </p:sp>
+    </p:spTree>
+    <p:extLst>
+      <p:ext uri="{BB962C8B-B14F-4D97-AF65-F5344CB8AC3E}">
+        <p14:creationId xmlns:p14="http://schemas.microsoft.com/office/powerpoint/2010/main" val="1493445995"/>
+      </p:ext>
+    </p:extLst>
+  </p:cSld>
+  <p:clrMapOvr>
+    <a:masterClrMapping/>
+  </p:clrMapOvr>
+</p:sld>
+</file>
+
+<file path=ppt/slides/slide6.xml><?xml version="1.0" encoding="utf-8"?>
+<p:sld xmlns:a="http://schemas.openxmlformats.org/drawingml/2006/main" xmlns:r="http://schemas.openxmlformats.org/officeDocument/2006/relationships" xmlns:p="http://schemas.openxmlformats.org/presentationml/2006/main">
+  <p:cSld>
+    <p:spTree>
+      <p:nvGrpSpPr>
+        <p:cNvPr id="1" name=""/>
+        <p:cNvGrpSpPr/>
+        <p:nvPr/>
+      </p:nvGrpSpPr>
+      <p:grpSpPr>
+        <a:xfrm>
+          <a:off x="0" y="0"/>
+          <a:ext cx="0" cy="0"/>
+          <a:chOff x="0" y="0"/>
+          <a:chExt cx="0" cy="0"/>
+        </a:xfrm>
+      </p:grpSpPr>
+      <p:pic>
+        <p:nvPicPr>
+          <p:cNvPr id="8" name="Picture Placeholder 7" descr="Data Points Digital background">
+            <a:extLst>
+              <a:ext uri="{FF2B5EF4-FFF2-40B4-BE49-F238E27FC236}">
+                <a16:creationId xmlns:a16="http://schemas.microsoft.com/office/drawing/2014/main" id="{5FED7C55-F545-49A1-90FD-D853A25AB453}"/>
+              </a:ext>
+            </a:extLst>
+          </p:cNvPr>
+          <p:cNvPicPr>
+            <a:picLocks noGrp="1" noChangeAspect="1"/>
+          </p:cNvPicPr>
+          <p:nvPr>
+            <p:ph type="pic" sz="quarter" idx="13"/>
+          </p:nvPr>
+        </p:nvPicPr>
+        <p:blipFill>
+          <a:blip r:embed="rId3">
+            <a:extLst>
+              <a:ext uri="{28A0092B-C50C-407E-A947-70E740481C1C}">
+                <a14:useLocalDpi xmlns:a14="http://schemas.microsoft.com/office/drawing/2010/main" val="0"/>
+              </a:ext>
+            </a:extLst>
+          </a:blip>
+          <a:srcRect/>
+          <a:stretch>
+            <a:fillRect/>
+          </a:stretch>
+        </p:blipFill>
+        <p:spPr/>
+      </p:pic>
+      <p:sp>
+        <p:nvSpPr>
+          <p:cNvPr id="15" name="Title 14">
+            <a:extLst>
+              <a:ext uri="{FF2B5EF4-FFF2-40B4-BE49-F238E27FC236}">
+                <a16:creationId xmlns:a16="http://schemas.microsoft.com/office/drawing/2014/main" id="{40F1DF5B-353A-4270-8C10-6A1509441174}"/>
+              </a:ext>
+            </a:extLst>
+          </p:cNvPr>
+          <p:cNvSpPr>
+            <a:spLocks noGrp="1"/>
+          </p:cNvSpPr>
+          <p:nvPr>
+            <p:ph type="ctrTitle"/>
+          </p:nvPr>
+        </p:nvSpPr>
+        <p:spPr>
+          <a:xfrm>
+            <a:off x="550863" y="549275"/>
+            <a:ext cx="5437187" cy="2986234"/>
+          </a:xfrm>
+        </p:spPr>
+        <p:txBody>
+          <a:bodyPr vert="horz" wrap="square" lIns="0" tIns="0" rIns="0" bIns="0" rtlCol="0" anchor="b" anchorCtr="0">
+            <a:normAutofit/>
+          </a:bodyPr>
+          <a:lstStyle/>
+          <a:p>
+            <a:pPr>
+              <a:lnSpc>
+                <a:spcPct val="100000"/>
+              </a:lnSpc>
+            </a:pPr>
+            <a:r>
+              <a:rPr lang="en-US" dirty="0"/>
+              <a:t>CI / CD</a:t>
+            </a:r>
+            <a:endParaRPr lang="en-US" sz="6400" kern="1200" dirty="0">
+              <a:solidFill>
+                <a:schemeClr val="tx1"/>
+              </a:solidFill>
+              <a:latin typeface="+mj-lt"/>
+              <a:ea typeface="+mj-ea"/>
+              <a:cs typeface="+mj-cs"/>
+            </a:endParaRPr>
+          </a:p>
+        </p:txBody>
+      </p:sp>
+      <p:sp>
+        <p:nvSpPr>
+          <p:cNvPr id="16" name="Subtitle 15">
+            <a:extLst>
+              <a:ext uri="{FF2B5EF4-FFF2-40B4-BE49-F238E27FC236}">
+                <a16:creationId xmlns:a16="http://schemas.microsoft.com/office/drawing/2014/main" id="{4BDCF583-1D5D-4235-97C2-39272B80A0B1}"/>
+              </a:ext>
+            </a:extLst>
+          </p:cNvPr>
+          <p:cNvSpPr>
+            <a:spLocks noGrp="1"/>
+          </p:cNvSpPr>
+          <p:nvPr>
+            <p:ph type="subTitle" idx="1"/>
+          </p:nvPr>
+        </p:nvSpPr>
+        <p:spPr>
+          <a:xfrm>
+            <a:off x="550863" y="3827610"/>
+            <a:ext cx="5437187" cy="2265216"/>
+          </a:xfrm>
+        </p:spPr>
+        <p:txBody>
+          <a:bodyPr vert="horz" wrap="square" lIns="0" tIns="0" rIns="0" bIns="0" rtlCol="0">
+            <a:normAutofit/>
+          </a:bodyPr>
+          <a:lstStyle/>
+          <a:p>
+            <a:pPr marL="0" indent="0">
+              <a:lnSpc>
+                <a:spcPct val="100000"/>
+              </a:lnSpc>
+              <a:buNone/>
+            </a:pPr>
+            <a:r>
+              <a:rPr lang="en-US" sz="1800" dirty="0">
+                <a:effectLst/>
+                <a:latin typeface="Calibri" panose="020F0502020204030204" pitchFamily="34" charset="0"/>
+                <a:ea typeface="Calibri" panose="020F0502020204030204" pitchFamily="34" charset="0"/>
+              </a:rPr>
+              <a:t>What Azure resources can we use to set up and implement</a:t>
+            </a:r>
+            <a:r>
+              <a:rPr lang="en-US" sz="1800" spc="5" dirty="0">
+                <a:effectLst/>
+                <a:latin typeface="Calibri" panose="020F0502020204030204" pitchFamily="34" charset="0"/>
+                <a:ea typeface="Calibri" panose="020F0502020204030204" pitchFamily="34" charset="0"/>
+              </a:rPr>
+              <a:t> </a:t>
+            </a:r>
+            <a:r>
+              <a:rPr lang="en-US" sz="1800" dirty="0">
+                <a:effectLst/>
+                <a:latin typeface="Calibri" panose="020F0502020204030204" pitchFamily="34" charset="0"/>
+                <a:ea typeface="Calibri" panose="020F0502020204030204" pitchFamily="34" charset="0"/>
+              </a:rPr>
+              <a:t>CI /</a:t>
+            </a:r>
+            <a:r>
+              <a:rPr lang="en-US" sz="1800" spc="15" dirty="0">
+                <a:effectLst/>
+                <a:latin typeface="Calibri" panose="020F0502020204030204" pitchFamily="34" charset="0"/>
+                <a:ea typeface="Calibri" panose="020F0502020204030204" pitchFamily="34" charset="0"/>
+              </a:rPr>
+              <a:t> </a:t>
+            </a:r>
+            <a:r>
+              <a:rPr lang="en-US" sz="1800" dirty="0">
+                <a:effectLst/>
+                <a:latin typeface="Calibri" panose="020F0502020204030204" pitchFamily="34" charset="0"/>
+                <a:ea typeface="Calibri" panose="020F0502020204030204" pitchFamily="34" charset="0"/>
+              </a:rPr>
+              <a:t>CD</a:t>
+            </a:r>
+            <a:r>
+              <a:rPr lang="en-US" sz="1800" spc="-5" dirty="0">
+                <a:effectLst/>
+                <a:latin typeface="Calibri" panose="020F0502020204030204" pitchFamily="34" charset="0"/>
+                <a:ea typeface="Calibri" panose="020F0502020204030204" pitchFamily="34" charset="0"/>
+              </a:rPr>
+              <a:t> </a:t>
+            </a:r>
+            <a:r>
+              <a:rPr lang="en-US" sz="1800" dirty="0">
+                <a:effectLst/>
+                <a:latin typeface="Calibri" panose="020F0502020204030204" pitchFamily="34" charset="0"/>
+                <a:ea typeface="Calibri" panose="020F0502020204030204" pitchFamily="34" charset="0"/>
+              </a:rPr>
+              <a:t>in</a:t>
+            </a:r>
+            <a:r>
+              <a:rPr lang="en-US" sz="1800" spc="-25" dirty="0">
+                <a:effectLst/>
+                <a:latin typeface="Calibri" panose="020F0502020204030204" pitchFamily="34" charset="0"/>
+                <a:ea typeface="Calibri" panose="020F0502020204030204" pitchFamily="34" charset="0"/>
+              </a:rPr>
+              <a:t> </a:t>
+            </a:r>
+            <a:r>
+              <a:rPr lang="en-US" sz="1800" dirty="0">
+                <a:effectLst/>
+                <a:latin typeface="Calibri" panose="020F0502020204030204" pitchFamily="34" charset="0"/>
+                <a:ea typeface="Calibri" panose="020F0502020204030204" pitchFamily="34" charset="0"/>
+              </a:rPr>
+              <a:t>our</a:t>
+            </a:r>
+            <a:r>
+              <a:rPr lang="en-US" sz="1800" spc="-15" dirty="0">
+                <a:effectLst/>
+                <a:latin typeface="Calibri" panose="020F0502020204030204" pitchFamily="34" charset="0"/>
+                <a:ea typeface="Calibri" panose="020F0502020204030204" pitchFamily="34" charset="0"/>
+              </a:rPr>
+              <a:t> </a:t>
+            </a:r>
+            <a:r>
+              <a:rPr lang="en-US" sz="1800" dirty="0">
+                <a:effectLst/>
+                <a:latin typeface="Calibri" panose="020F0502020204030204" pitchFamily="34" charset="0"/>
+                <a:ea typeface="Calibri" panose="020F0502020204030204" pitchFamily="34" charset="0"/>
+              </a:rPr>
+              <a:t>work</a:t>
+            </a:r>
+            <a:r>
+              <a:rPr lang="en-US" sz="1800" spc="-10" dirty="0">
+                <a:effectLst/>
+                <a:latin typeface="Calibri" panose="020F0502020204030204" pitchFamily="34" charset="0"/>
+                <a:ea typeface="Calibri" panose="020F0502020204030204" pitchFamily="34" charset="0"/>
+              </a:rPr>
+              <a:t> </a:t>
+            </a:r>
+            <a:r>
+              <a:rPr lang="en-US" sz="1800" dirty="0">
+                <a:effectLst/>
+                <a:latin typeface="Calibri" panose="020F0502020204030204" pitchFamily="34" charset="0"/>
+                <a:ea typeface="Calibri" panose="020F0502020204030204" pitchFamily="34" charset="0"/>
+              </a:rPr>
+              <a:t>environment?</a:t>
+            </a:r>
+            <a:endParaRPr lang="en-US" kern="1200" dirty="0">
+              <a:latin typeface="+mn-lt"/>
+              <a:ea typeface="+mn-ea"/>
+              <a:cs typeface="+mn-cs"/>
+            </a:endParaRPr>
+          </a:p>
+        </p:txBody>
+      </p:sp>
+      <p:sp>
+        <p:nvSpPr>
+          <p:cNvPr id="4" name="Slide Number Placeholder 3">
+            <a:extLst>
+              <a:ext uri="{FF2B5EF4-FFF2-40B4-BE49-F238E27FC236}">
+                <a16:creationId xmlns:a16="http://schemas.microsoft.com/office/drawing/2014/main" id="{E1E7D98D-6710-41D2-B258-E1A1059D29F8}"/>
+              </a:ext>
+            </a:extLst>
+          </p:cNvPr>
+          <p:cNvSpPr>
+            <a:spLocks noGrp="1"/>
+          </p:cNvSpPr>
+          <p:nvPr>
+            <p:ph type="sldNum" sz="quarter" idx="12"/>
+          </p:nvPr>
+        </p:nvSpPr>
+        <p:spPr/>
+        <p:txBody>
+          <a:bodyPr/>
+          <a:lstStyle/>
+          <a:p>
+            <a:fld id="{DBA1B0FB-D917-4C8C-928F-313BD683BF39}" type="slidenum">
+              <a:rPr lang="en-US" smtClean="0"/>
+              <a:t>6</a:t>
+            </a:fld>
+            <a:endParaRPr lang="en-US"/>
+          </a:p>
+        </p:txBody>
+      </p:sp>
+    </p:spTree>
+    <p:extLst>
+      <p:ext uri="{BB962C8B-B14F-4D97-AF65-F5344CB8AC3E}">
+        <p14:creationId xmlns:p14="http://schemas.microsoft.com/office/powerpoint/2010/main" val="1879230169"/>
+      </p:ext>
+    </p:extLst>
+  </p:cSld>
+  <p:clrMapOvr>
+    <a:masterClrMapping/>
+  </p:clrMapOvr>
+</p:sld>
+</file>
+
+<file path=ppt/slides/slide7.xml><?xml version="1.0" encoding="utf-8"?>
 <p:sld xmlns:a="http://schemas.openxmlformats.org/drawingml/2006/main" xmlns:r="http://schemas.openxmlformats.org/officeDocument/2006/relationships" xmlns:p="http://schemas.openxmlformats.org/presentationml/2006/main">
   <p:cSld>
     <p:spTree>
@@ -21597,7 +24717,7 @@
             <a:fld id="{DBA1B0FB-D917-4C8C-928F-313BD683BF39}" type="slidenum">
               <a:rPr lang="en-US" smtClean="0"/>
               <a:pPr/>
-              <a:t>4</a:t>
+              <a:t>7</a:t>
             </a:fld>
             <a:endParaRPr lang="en-US"/>
           </a:p>
@@ -21616,7 +24736,7 @@
 </p:sld>
 </file>
 
-<file path=ppt/slides/slide5.xml><?xml version="1.0" encoding="utf-8"?>
+<file path=ppt/slides/slide8.xml><?xml version="1.0" encoding="utf-8"?>
 <p:sld xmlns:a="http://schemas.openxmlformats.org/drawingml/2006/main" xmlns:r="http://schemas.openxmlformats.org/officeDocument/2006/relationships" xmlns:p="http://schemas.openxmlformats.org/presentationml/2006/main">
   <p:cSld>
     <p:spTree>
@@ -21834,7 +24954,7 @@
             <a:fld id="{DBA1B0FB-D917-4C8C-928F-313BD683BF39}" type="slidenum">
               <a:rPr lang="en-US" smtClean="0"/>
               <a:pPr/>
-              <a:t>5</a:t>
+              <a:t>8</a:t>
             </a:fld>
             <a:endParaRPr lang="en-US"/>
           </a:p>
@@ -21853,7 +24973,7 @@
 </p:sld>
 </file>
 
-<file path=ppt/slides/slide6.xml><?xml version="1.0" encoding="utf-8"?>
+<file path=ppt/slides/slide9.xml><?xml version="1.0" encoding="utf-8"?>
 <p:sld xmlns:a="http://schemas.openxmlformats.org/drawingml/2006/main" xmlns:r="http://schemas.openxmlformats.org/officeDocument/2006/relationships" xmlns:p="http://schemas.openxmlformats.org/presentationml/2006/main">
   <p:cSld>
     <p:spTree>
@@ -22030,7 +25150,7 @@
             <a:fld id="{DBA1B0FB-D917-4C8C-928F-313BD683BF39}" type="slidenum">
               <a:rPr lang="en-US" smtClean="0"/>
               <a:pPr/>
-              <a:t>6</a:t>
+              <a:t>9</a:t>
             </a:fld>
             <a:endParaRPr lang="en-US"/>
           </a:p>
@@ -22040,1508 +25160,6 @@
     <p:extLst>
       <p:ext uri="{BB962C8B-B14F-4D97-AF65-F5344CB8AC3E}">
         <p14:creationId xmlns:p14="http://schemas.microsoft.com/office/powerpoint/2010/main" val="2624630061"/>
-      </p:ext>
-    </p:extLst>
-  </p:cSld>
-  <p:clrMapOvr>
-    <a:masterClrMapping/>
-  </p:clrMapOvr>
-</p:sld>
-</file>
-
-<file path=ppt/slides/slide7.xml><?xml version="1.0" encoding="utf-8"?>
-<p:sld xmlns:a="http://schemas.openxmlformats.org/drawingml/2006/main" xmlns:r="http://schemas.openxmlformats.org/officeDocument/2006/relationships" xmlns:p="http://schemas.openxmlformats.org/presentationml/2006/main">
-  <p:cSld>
-    <p:spTree>
-      <p:nvGrpSpPr>
-        <p:cNvPr id="1" name=""/>
-        <p:cNvGrpSpPr/>
-        <p:nvPr/>
-      </p:nvGrpSpPr>
-      <p:grpSpPr>
-        <a:xfrm>
-          <a:off x="0" y="0"/>
-          <a:ext cx="0" cy="0"/>
-          <a:chOff x="0" y="0"/>
-          <a:chExt cx="0" cy="0"/>
-        </a:xfrm>
-      </p:grpSpPr>
-      <p:grpSp>
-        <p:nvGrpSpPr>
-          <p:cNvPr id="25" name="Group 24">
-            <a:extLst>
-              <a:ext uri="{FF2B5EF4-FFF2-40B4-BE49-F238E27FC236}">
-                <a16:creationId xmlns:a16="http://schemas.microsoft.com/office/drawing/2014/main" id="{D10F3D66-0109-4903-90B9-66D0E288F721}"/>
-              </a:ext>
-              <a:ext uri="{C183D7F6-B498-43B3-948B-1728B52AA6E4}">
-                <adec:decorative xmlns:adec="http://schemas.microsoft.com/office/drawing/2017/decorative" val="1"/>
-              </a:ext>
-            </a:extLst>
-          </p:cNvPr>
-          <p:cNvGrpSpPr/>
-          <p:nvPr/>
-        </p:nvGrpSpPr>
-        <p:grpSpPr>
-          <a:xfrm>
-            <a:off x="10379261" y="2030035"/>
-            <a:ext cx="1335600" cy="1262947"/>
-            <a:chOff x="10145015" y="2343978"/>
-            <a:chExt cx="1335600" cy="1262947"/>
-          </a:xfrm>
-        </p:grpSpPr>
-        <p:sp>
-          <p:nvSpPr>
-            <p:cNvPr id="26" name="Freeform: Shape 25">
-              <a:extLst>
-                <a:ext uri="{FF2B5EF4-FFF2-40B4-BE49-F238E27FC236}">
-                  <a16:creationId xmlns:a16="http://schemas.microsoft.com/office/drawing/2014/main" id="{57DAB968-9B52-4EFF-AD39-7657DFEA6E48}"/>
-                </a:ext>
-              </a:extLst>
-            </p:cNvPr>
-            <p:cNvSpPr>
-              <a:spLocks noChangeAspect="1"/>
-            </p:cNvSpPr>
-            <p:nvPr/>
-          </p:nvSpPr>
-          <p:spPr>
-            <a:xfrm rot="8100000">
-              <a:off x="10400615" y="2343978"/>
-              <a:ext cx="1080000" cy="1262947"/>
-            </a:xfrm>
-            <a:custGeom>
-              <a:avLst/>
-              <a:gdLst>
-                <a:gd name="connsiteX0" fmla="*/ 540000 w 1080000"/>
-                <a:gd name="connsiteY0" fmla="*/ 0 h 1262947"/>
-                <a:gd name="connsiteX1" fmla="*/ 1080000 w 1080000"/>
-                <a:gd name="connsiteY1" fmla="*/ 931034 h 1262947"/>
-                <a:gd name="connsiteX2" fmla="*/ 1064374 w 1080000"/>
-                <a:gd name="connsiteY2" fmla="*/ 931034 h 1262947"/>
-                <a:gd name="connsiteX3" fmla="*/ 1069029 w 1080000"/>
-                <a:gd name="connsiteY3" fmla="*/ 938533 h 1262947"/>
-                <a:gd name="connsiteX4" fmla="*/ 1080000 w 1080000"/>
-                <a:gd name="connsiteY4" fmla="*/ 992947 h 1262947"/>
-                <a:gd name="connsiteX5" fmla="*/ 540000 w 1080000"/>
-                <a:gd name="connsiteY5" fmla="*/ 1262947 h 1262947"/>
-                <a:gd name="connsiteX6" fmla="*/ 0 w 1080000"/>
-                <a:gd name="connsiteY6" fmla="*/ 992947 h 1262947"/>
-                <a:gd name="connsiteX7" fmla="*/ 10971 w 1080000"/>
-                <a:gd name="connsiteY7" fmla="*/ 938533 h 1262947"/>
-                <a:gd name="connsiteX8" fmla="*/ 15626 w 1080000"/>
-                <a:gd name="connsiteY8" fmla="*/ 931034 h 1262947"/>
-                <a:gd name="connsiteX9" fmla="*/ 0 w 1080000"/>
-                <a:gd name="connsiteY9" fmla="*/ 931034 h 1262947"/>
-                <a:gd name="connsiteX0" fmla="*/ 540000 w 1080000"/>
-                <a:gd name="connsiteY0" fmla="*/ 0 h 1262947"/>
-                <a:gd name="connsiteX1" fmla="*/ 1080000 w 1080000"/>
-                <a:gd name="connsiteY1" fmla="*/ 931034 h 1262947"/>
-                <a:gd name="connsiteX2" fmla="*/ 1064374 w 1080000"/>
-                <a:gd name="connsiteY2" fmla="*/ 931034 h 1262947"/>
-                <a:gd name="connsiteX3" fmla="*/ 1069029 w 1080000"/>
-                <a:gd name="connsiteY3" fmla="*/ 938533 h 1262947"/>
-                <a:gd name="connsiteX4" fmla="*/ 1080000 w 1080000"/>
-                <a:gd name="connsiteY4" fmla="*/ 992947 h 1262947"/>
-                <a:gd name="connsiteX5" fmla="*/ 540000 w 1080000"/>
-                <a:gd name="connsiteY5" fmla="*/ 1262947 h 1262947"/>
-                <a:gd name="connsiteX6" fmla="*/ 0 w 1080000"/>
-                <a:gd name="connsiteY6" fmla="*/ 992947 h 1262947"/>
-                <a:gd name="connsiteX7" fmla="*/ 10971 w 1080000"/>
-                <a:gd name="connsiteY7" fmla="*/ 938533 h 1262947"/>
-                <a:gd name="connsiteX8" fmla="*/ 15626 w 1080000"/>
-                <a:gd name="connsiteY8" fmla="*/ 931034 h 1262947"/>
-                <a:gd name="connsiteX9" fmla="*/ 540000 w 1080000"/>
-                <a:gd name="connsiteY9" fmla="*/ 0 h 1262947"/>
-                <a:gd name="connsiteX0" fmla="*/ 540000 w 1080000"/>
-                <a:gd name="connsiteY0" fmla="*/ 0 h 1262947"/>
-                <a:gd name="connsiteX1" fmla="*/ 1064374 w 1080000"/>
-                <a:gd name="connsiteY1" fmla="*/ 931034 h 1262947"/>
-                <a:gd name="connsiteX2" fmla="*/ 1069029 w 1080000"/>
-                <a:gd name="connsiteY2" fmla="*/ 938533 h 1262947"/>
-                <a:gd name="connsiteX3" fmla="*/ 1080000 w 1080000"/>
-                <a:gd name="connsiteY3" fmla="*/ 992947 h 1262947"/>
-                <a:gd name="connsiteX4" fmla="*/ 540000 w 1080000"/>
-                <a:gd name="connsiteY4" fmla="*/ 1262947 h 1262947"/>
-                <a:gd name="connsiteX5" fmla="*/ 0 w 1080000"/>
-                <a:gd name="connsiteY5" fmla="*/ 992947 h 1262947"/>
-                <a:gd name="connsiteX6" fmla="*/ 10971 w 1080000"/>
-                <a:gd name="connsiteY6" fmla="*/ 938533 h 1262947"/>
-                <a:gd name="connsiteX7" fmla="*/ 15626 w 1080000"/>
-                <a:gd name="connsiteY7" fmla="*/ 931034 h 1262947"/>
-                <a:gd name="connsiteX8" fmla="*/ 540000 w 1080000"/>
-                <a:gd name="connsiteY8" fmla="*/ 0 h 1262947"/>
-              </a:gdLst>
-              <a:ahLst/>
-              <a:cxnLst>
-                <a:cxn ang="0">
-                  <a:pos x="connsiteX0" y="connsiteY0"/>
-                </a:cxn>
-                <a:cxn ang="0">
-                  <a:pos x="connsiteX1" y="connsiteY1"/>
-                </a:cxn>
-                <a:cxn ang="0">
-                  <a:pos x="connsiteX2" y="connsiteY2"/>
-                </a:cxn>
-                <a:cxn ang="0">
-                  <a:pos x="connsiteX3" y="connsiteY3"/>
-                </a:cxn>
-                <a:cxn ang="0">
-                  <a:pos x="connsiteX4" y="connsiteY4"/>
-                </a:cxn>
-                <a:cxn ang="0">
-                  <a:pos x="connsiteX5" y="connsiteY5"/>
-                </a:cxn>
-                <a:cxn ang="0">
-                  <a:pos x="connsiteX6" y="connsiteY6"/>
-                </a:cxn>
-                <a:cxn ang="0">
-                  <a:pos x="connsiteX7" y="connsiteY7"/>
-                </a:cxn>
-                <a:cxn ang="0">
-                  <a:pos x="connsiteX8" y="connsiteY8"/>
-                </a:cxn>
-              </a:cxnLst>
-              <a:rect l="l" t="t" r="r" b="b"/>
-              <a:pathLst>
-                <a:path w="1080000" h="1262947">
-                  <a:moveTo>
-                    <a:pt x="540000" y="0"/>
-                  </a:moveTo>
-                  <a:lnTo>
-                    <a:pt x="1064374" y="931034"/>
-                  </a:lnTo>
-                  <a:lnTo>
-                    <a:pt x="1069029" y="938533"/>
-                  </a:lnTo>
-                  <a:cubicBezTo>
-                    <a:pt x="1076223" y="956109"/>
-                    <a:pt x="1080000" y="974307"/>
-                    <a:pt x="1080000" y="992947"/>
-                  </a:cubicBezTo>
-                  <a:cubicBezTo>
-                    <a:pt x="1080000" y="1142064"/>
-                    <a:pt x="838234" y="1262947"/>
-                    <a:pt x="540000" y="1262947"/>
-                  </a:cubicBezTo>
-                  <a:cubicBezTo>
-                    <a:pt x="241766" y="1262947"/>
-                    <a:pt x="0" y="1142064"/>
-                    <a:pt x="0" y="992947"/>
-                  </a:cubicBezTo>
-                  <a:cubicBezTo>
-                    <a:pt x="0" y="974307"/>
-                    <a:pt x="3778" y="956109"/>
-                    <a:pt x="10971" y="938533"/>
-                  </a:cubicBezTo>
-                  <a:lnTo>
-                    <a:pt x="15626" y="931034"/>
-                  </a:lnTo>
-                  <a:lnTo>
-                    <a:pt x="540000" y="0"/>
-                  </a:lnTo>
-                  <a:close/>
-                </a:path>
-              </a:pathLst>
-            </a:custGeom>
-            <a:gradFill>
-              <a:gsLst>
-                <a:gs pos="60000">
-                  <a:schemeClr val="bg2">
-                    <a:lumMod val="90000"/>
-                    <a:lumOff val="10000"/>
-                  </a:schemeClr>
-                </a:gs>
-                <a:gs pos="30000">
-                  <a:schemeClr val="bg2">
-                    <a:lumMod val="90000"/>
-                    <a:lumOff val="10000"/>
-                  </a:schemeClr>
-                </a:gs>
-                <a:gs pos="40000">
-                  <a:schemeClr val="bg2">
-                    <a:lumMod val="80000"/>
-                    <a:lumOff val="20000"/>
-                  </a:schemeClr>
-                </a:gs>
-                <a:gs pos="100000">
-                  <a:schemeClr val="bg2"/>
-                </a:gs>
-              </a:gsLst>
-              <a:lin ang="600000" scaled="0"/>
-            </a:gradFill>
-            <a:ln>
-              <a:noFill/>
-            </a:ln>
-            <a:effectLst>
-              <a:innerShdw blurRad="254000" dist="101600" dir="7320000">
-                <a:schemeClr val="accent1">
-                  <a:lumMod val="60000"/>
-                  <a:lumOff val="40000"/>
-                  <a:alpha val="40000"/>
-                </a:schemeClr>
-              </a:innerShdw>
-            </a:effectLst>
-          </p:spPr>
-          <p:style>
-            <a:lnRef idx="2">
-              <a:schemeClr val="accent1">
-                <a:shade val="50000"/>
-              </a:schemeClr>
-            </a:lnRef>
-            <a:fillRef idx="1">
-              <a:schemeClr val="accent1"/>
-            </a:fillRef>
-            <a:effectRef idx="0">
-              <a:schemeClr val="accent1"/>
-            </a:effectRef>
-            <a:fontRef idx="minor">
-              <a:schemeClr val="lt1"/>
-            </a:fontRef>
-          </p:style>
-          <p:txBody>
-            <a:bodyPr rot="0" spcFirstLastPara="0" vertOverflow="overflow" horzOverflow="overflow" vert="horz" wrap="square" lIns="91440" tIns="45720" rIns="91440" bIns="45720" numCol="1" spcCol="0" rtlCol="0" fromWordArt="0" anchor="ctr" anchorCtr="0" forceAA="0" compatLnSpc="1">
-              <a:prstTxWarp prst="textNoShape">
-                <a:avLst/>
-              </a:prstTxWarp>
-              <a:noAutofit/>
-            </a:bodyPr>
-            <a:lstStyle/>
-            <a:p>
-              <a:pPr algn="ctr"/>
-              <a:endParaRPr lang="en-US"/>
-            </a:p>
-          </p:txBody>
-        </p:sp>
-        <p:sp>
-          <p:nvSpPr>
-            <p:cNvPr id="27" name="Oval 26">
-              <a:extLst>
-                <a:ext uri="{FF2B5EF4-FFF2-40B4-BE49-F238E27FC236}">
-                  <a16:creationId xmlns:a16="http://schemas.microsoft.com/office/drawing/2014/main" id="{962BE440-9634-4380-B142-5DB692420C52}"/>
-                </a:ext>
-              </a:extLst>
-            </p:cNvPr>
-            <p:cNvSpPr/>
-            <p:nvPr/>
-          </p:nvSpPr>
-          <p:spPr>
-            <a:xfrm rot="13500000">
-              <a:off x="10415015" y="2179851"/>
-              <a:ext cx="540000" cy="1080000"/>
-            </a:xfrm>
-            <a:prstGeom prst="ellipse">
-              <a:avLst/>
-            </a:prstGeom>
-            <a:gradFill>
-              <a:gsLst>
-                <a:gs pos="100000">
-                  <a:schemeClr val="accent1">
-                    <a:lumMod val="60000"/>
-                    <a:lumOff val="40000"/>
-                    <a:alpha val="0"/>
-                  </a:schemeClr>
-                </a:gs>
-                <a:gs pos="0">
-                  <a:schemeClr val="bg2">
-                    <a:lumMod val="75000"/>
-                    <a:lumOff val="25000"/>
-                    <a:alpha val="33000"/>
-                  </a:schemeClr>
-                </a:gs>
-              </a:gsLst>
-              <a:lin ang="5400000" scaled="0"/>
-            </a:gradFill>
-            <a:ln>
-              <a:noFill/>
-            </a:ln>
-            <a:effectLst>
-              <a:innerShdw blurRad="1270000" dist="2540000">
-                <a:schemeClr val="accent1">
-                  <a:lumMod val="60000"/>
-                  <a:lumOff val="40000"/>
-                  <a:alpha val="0"/>
-                </a:schemeClr>
-              </a:innerShdw>
-            </a:effectLst>
-          </p:spPr>
-          <p:style>
-            <a:lnRef idx="2">
-              <a:schemeClr val="accent1">
-                <a:shade val="50000"/>
-              </a:schemeClr>
-            </a:lnRef>
-            <a:fillRef idx="1">
-              <a:schemeClr val="accent1"/>
-            </a:fillRef>
-            <a:effectRef idx="0">
-              <a:schemeClr val="accent1"/>
-            </a:effectRef>
-            <a:fontRef idx="minor">
-              <a:schemeClr val="lt1"/>
-            </a:fontRef>
-          </p:style>
-          <p:txBody>
-            <a:bodyPr rot="0" spcFirstLastPara="0" vertOverflow="overflow" horzOverflow="overflow" vert="horz" wrap="square" lIns="91440" tIns="45720" rIns="91440" bIns="45720" numCol="1" spcCol="0" rtlCol="0" fromWordArt="0" anchor="ctr" anchorCtr="0" forceAA="0" compatLnSpc="1">
-              <a:prstTxWarp prst="textNoShape">
-                <a:avLst/>
-              </a:prstTxWarp>
-              <a:noAutofit/>
-            </a:bodyPr>
-            <a:lstStyle/>
-            <a:p>
-              <a:pPr algn="ctr"/>
-              <a:endParaRPr lang="en-US"/>
-            </a:p>
-          </p:txBody>
-        </p:sp>
-      </p:grpSp>
-      <p:sp>
-        <p:nvSpPr>
-          <p:cNvPr id="7" name="Title 6">
-            <a:extLst>
-              <a:ext uri="{FF2B5EF4-FFF2-40B4-BE49-F238E27FC236}">
-                <a16:creationId xmlns:a16="http://schemas.microsoft.com/office/drawing/2014/main" id="{4B18D636-CC10-4B1E-AA38-419DCCF2D9C9}"/>
-              </a:ext>
-            </a:extLst>
-          </p:cNvPr>
-          <p:cNvSpPr>
-            <a:spLocks noGrp="1"/>
-          </p:cNvSpPr>
-          <p:nvPr>
-            <p:ph type="title"/>
-          </p:nvPr>
-        </p:nvSpPr>
-        <p:spPr>
-          <a:xfrm>
-            <a:off x="550862" y="549275"/>
-            <a:ext cx="11097551" cy="1332000"/>
-          </a:xfrm>
-        </p:spPr>
-        <p:txBody>
-          <a:bodyPr>
-            <a:normAutofit/>
-          </a:bodyPr>
-          <a:lstStyle/>
-          <a:p>
-            <a:r>
-              <a:rPr lang="en-US" dirty="0"/>
-              <a:t>Content </a:t>
-            </a:r>
-          </a:p>
-        </p:txBody>
-      </p:sp>
-      <p:sp>
-        <p:nvSpPr>
-          <p:cNvPr id="9" name="Text Placeholder 8">
-            <a:extLst>
-              <a:ext uri="{FF2B5EF4-FFF2-40B4-BE49-F238E27FC236}">
-                <a16:creationId xmlns:a16="http://schemas.microsoft.com/office/drawing/2014/main" id="{0D098C43-2F2A-4100-89BC-5931039293FA}"/>
-              </a:ext>
-            </a:extLst>
-          </p:cNvPr>
-          <p:cNvSpPr>
-            <a:spLocks noGrp="1"/>
-          </p:cNvSpPr>
-          <p:nvPr>
-            <p:ph type="body" idx="1"/>
-          </p:nvPr>
-        </p:nvSpPr>
-        <p:spPr>
-          <a:xfrm>
-            <a:off x="550864" y="1731375"/>
-            <a:ext cx="5437186" cy="535354"/>
-          </a:xfrm>
-        </p:spPr>
-        <p:txBody>
-          <a:bodyPr/>
-          <a:lstStyle/>
-          <a:p>
-            <a:r>
-              <a:rPr lang="en-US"/>
-              <a:t>Subtitle</a:t>
-            </a:r>
-            <a:endParaRPr lang="en-US" dirty="0"/>
-          </a:p>
-        </p:txBody>
-      </p:sp>
-      <p:sp>
-        <p:nvSpPr>
-          <p:cNvPr id="10" name="Content Placeholder 9">
-            <a:extLst>
-              <a:ext uri="{FF2B5EF4-FFF2-40B4-BE49-F238E27FC236}">
-                <a16:creationId xmlns:a16="http://schemas.microsoft.com/office/drawing/2014/main" id="{1DB251F7-EBE7-46AC-A920-FFE2C5AF68EA}"/>
-              </a:ext>
-            </a:extLst>
-          </p:cNvPr>
-          <p:cNvSpPr>
-            <a:spLocks noGrp="1"/>
-          </p:cNvSpPr>
-          <p:nvPr>
-            <p:ph sz="half" idx="2"/>
-          </p:nvPr>
-        </p:nvSpPr>
-        <p:spPr>
-          <a:xfrm>
-            <a:off x="550863" y="2427370"/>
-            <a:ext cx="5429114" cy="3515555"/>
-          </a:xfrm>
-        </p:spPr>
-        <p:txBody>
-          <a:bodyPr/>
-          <a:lstStyle/>
-          <a:p>
-            <a:r>
-              <a:rPr lang="en-US" dirty="0"/>
-              <a:t>Add text, images, art, and videos. </a:t>
-            </a:r>
-          </a:p>
-          <a:p>
-            <a:r>
-              <a:rPr lang="en-US" dirty="0"/>
-              <a:t>Add transitions, animations, and motion. </a:t>
-            </a:r>
-          </a:p>
-          <a:p>
-            <a:r>
-              <a:rPr lang="en-US" dirty="0"/>
-              <a:t>Save to OneDrive, to get to your presentations from your computer, tablet, or phone. </a:t>
-            </a:r>
-          </a:p>
-        </p:txBody>
-      </p:sp>
-      <p:sp>
-        <p:nvSpPr>
-          <p:cNvPr id="11" name="Text Placeholder 10">
-            <a:extLst>
-              <a:ext uri="{FF2B5EF4-FFF2-40B4-BE49-F238E27FC236}">
-                <a16:creationId xmlns:a16="http://schemas.microsoft.com/office/drawing/2014/main" id="{60726BA7-44D6-4116-90E3-38325026EAAD}"/>
-              </a:ext>
-            </a:extLst>
-          </p:cNvPr>
-          <p:cNvSpPr>
-            <a:spLocks noGrp="1"/>
-          </p:cNvSpPr>
-          <p:nvPr>
-            <p:ph type="body" sz="quarter" idx="3"/>
-          </p:nvPr>
-        </p:nvSpPr>
-        <p:spPr>
-          <a:xfrm>
-            <a:off x="6212024" y="1731375"/>
-            <a:ext cx="5436392" cy="535354"/>
-          </a:xfrm>
-        </p:spPr>
-        <p:txBody>
-          <a:bodyPr/>
-          <a:lstStyle/>
-          <a:p>
-            <a:r>
-              <a:rPr lang="en-US" dirty="0"/>
-              <a:t>Subtitle</a:t>
-            </a:r>
-          </a:p>
-        </p:txBody>
-      </p:sp>
-      <p:sp>
-        <p:nvSpPr>
-          <p:cNvPr id="12" name="Content Placeholder 11">
-            <a:extLst>
-              <a:ext uri="{FF2B5EF4-FFF2-40B4-BE49-F238E27FC236}">
-                <a16:creationId xmlns:a16="http://schemas.microsoft.com/office/drawing/2014/main" id="{7FB7F30B-2A84-4C44-BC5A-E826ED6E74A2}"/>
-              </a:ext>
-            </a:extLst>
-          </p:cNvPr>
-          <p:cNvSpPr>
-            <a:spLocks noGrp="1"/>
-          </p:cNvSpPr>
-          <p:nvPr>
-            <p:ph sz="quarter" idx="4"/>
-          </p:nvPr>
-        </p:nvSpPr>
-        <p:spPr>
-          <a:xfrm>
-            <a:off x="6212023" y="2427370"/>
-            <a:ext cx="5436391" cy="3515555"/>
-          </a:xfrm>
-        </p:spPr>
-        <p:txBody>
-          <a:bodyPr/>
-          <a:lstStyle/>
-          <a:p>
-            <a:r>
-              <a:rPr lang="en-US" dirty="0"/>
-              <a:t>Open the Design Ideas pane for instant slide makeovers. </a:t>
-            </a:r>
-          </a:p>
-          <a:p>
-            <a:r>
-              <a:rPr lang="en-US" dirty="0"/>
-              <a:t>When we have design ideas, we’ll show them to you right there. </a:t>
-            </a:r>
-          </a:p>
-          <a:p>
-            <a:endParaRPr lang="en-US" dirty="0"/>
-          </a:p>
-        </p:txBody>
-      </p:sp>
-      <p:sp>
-        <p:nvSpPr>
-          <p:cNvPr id="4" name="Date Placeholder 3">
-            <a:extLst>
-              <a:ext uri="{FF2B5EF4-FFF2-40B4-BE49-F238E27FC236}">
-                <a16:creationId xmlns:a16="http://schemas.microsoft.com/office/drawing/2014/main" id="{0C329F70-04F7-4C70-BCF8-D4371F54EF2F}"/>
-              </a:ext>
-            </a:extLst>
-          </p:cNvPr>
-          <p:cNvSpPr>
-            <a:spLocks noGrp="1"/>
-          </p:cNvSpPr>
-          <p:nvPr>
-            <p:ph type="dt" sz="half" idx="10"/>
-          </p:nvPr>
-        </p:nvSpPr>
-        <p:spPr>
-          <a:xfrm>
-            <a:off x="550863" y="6507212"/>
-            <a:ext cx="2628900" cy="153888"/>
-          </a:xfrm>
-        </p:spPr>
-        <p:txBody>
-          <a:bodyPr/>
-          <a:lstStyle/>
-          <a:p>
-            <a:r>
-              <a:rPr lang="en-US"/>
-              <a:t>Tuesday, February 2, 20XX</a:t>
-            </a:r>
-            <a:endParaRPr lang="en-US" dirty="0"/>
-          </a:p>
-        </p:txBody>
-      </p:sp>
-      <p:sp>
-        <p:nvSpPr>
-          <p:cNvPr id="5" name="Footer Placeholder 4">
-            <a:extLst>
-              <a:ext uri="{FF2B5EF4-FFF2-40B4-BE49-F238E27FC236}">
-                <a16:creationId xmlns:a16="http://schemas.microsoft.com/office/drawing/2014/main" id="{06A3302E-502D-4151-81C9-5FD6AF9596D6}"/>
-              </a:ext>
-            </a:extLst>
-          </p:cNvPr>
-          <p:cNvSpPr>
-            <a:spLocks noGrp="1"/>
-          </p:cNvSpPr>
-          <p:nvPr>
-            <p:ph type="ftr" sz="quarter" idx="11"/>
-          </p:nvPr>
-        </p:nvSpPr>
-        <p:spPr>
-          <a:xfrm>
-            <a:off x="3359150" y="6507212"/>
-            <a:ext cx="6379210" cy="153888"/>
-          </a:xfrm>
-        </p:spPr>
-        <p:txBody>
-          <a:bodyPr/>
-          <a:lstStyle/>
-          <a:p>
-            <a:r>
-              <a:rPr lang="en-US"/>
-              <a:t>Sample Footer Text</a:t>
-            </a:r>
-          </a:p>
-        </p:txBody>
-      </p:sp>
-      <p:sp>
-        <p:nvSpPr>
-          <p:cNvPr id="6" name="Slide Number Placeholder 5">
-            <a:extLst>
-              <a:ext uri="{FF2B5EF4-FFF2-40B4-BE49-F238E27FC236}">
-                <a16:creationId xmlns:a16="http://schemas.microsoft.com/office/drawing/2014/main" id="{9ED907F8-C614-4D59-A03F-BF9CD5E35703}"/>
-              </a:ext>
-            </a:extLst>
-          </p:cNvPr>
-          <p:cNvSpPr>
-            <a:spLocks noGrp="1"/>
-          </p:cNvSpPr>
-          <p:nvPr>
-            <p:ph type="sldNum" sz="quarter" idx="12"/>
-          </p:nvPr>
-        </p:nvSpPr>
-        <p:spPr>
-          <a:xfrm>
-            <a:off x="9948863" y="6507212"/>
-            <a:ext cx="1692274" cy="153888"/>
-          </a:xfrm>
-        </p:spPr>
-        <p:txBody>
-          <a:bodyPr/>
-          <a:lstStyle/>
-          <a:p>
-            <a:fld id="{DBA1B0FB-D917-4C8C-928F-313BD683BF39}" type="slidenum">
-              <a:rPr lang="en-US" smtClean="0"/>
-              <a:pPr/>
-              <a:t>7</a:t>
-            </a:fld>
-            <a:endParaRPr lang="en-US"/>
-          </a:p>
-        </p:txBody>
-      </p:sp>
-      <p:sp>
-        <p:nvSpPr>
-          <p:cNvPr id="22" name="Freeform: Shape 21">
-            <a:extLst>
-              <a:ext uri="{FF2B5EF4-FFF2-40B4-BE49-F238E27FC236}">
-                <a16:creationId xmlns:a16="http://schemas.microsoft.com/office/drawing/2014/main" id="{C6F3814E-455F-456B-B1AF-7B993965A2C0}"/>
-              </a:ext>
-              <a:ext uri="{C183D7F6-B498-43B3-948B-1728B52AA6E4}">
-                <adec:decorative xmlns:adec="http://schemas.microsoft.com/office/drawing/2017/decorative" val="1"/>
-              </a:ext>
-            </a:extLst>
-          </p:cNvPr>
-          <p:cNvSpPr>
-            <a:spLocks noChangeAspect="1"/>
-          </p:cNvSpPr>
-          <p:nvPr/>
-        </p:nvSpPr>
-        <p:spPr>
-          <a:xfrm>
-            <a:off x="4295775" y="0"/>
-            <a:ext cx="360000" cy="274638"/>
-          </a:xfrm>
-          <a:custGeom>
-            <a:avLst/>
-            <a:gdLst>
-              <a:gd name="connsiteX0" fmla="*/ 30714 w 360000"/>
-              <a:gd name="connsiteY0" fmla="*/ 0 h 274638"/>
-              <a:gd name="connsiteX1" fmla="*/ 329286 w 360000"/>
-              <a:gd name="connsiteY1" fmla="*/ 0 h 274638"/>
-              <a:gd name="connsiteX2" fmla="*/ 345855 w 360000"/>
-              <a:gd name="connsiteY2" fmla="*/ 24574 h 274638"/>
-              <a:gd name="connsiteX3" fmla="*/ 360000 w 360000"/>
-              <a:gd name="connsiteY3" fmla="*/ 94638 h 274638"/>
-              <a:gd name="connsiteX4" fmla="*/ 180000 w 360000"/>
-              <a:gd name="connsiteY4" fmla="*/ 274638 h 274638"/>
-              <a:gd name="connsiteX5" fmla="*/ 0 w 360000"/>
-              <a:gd name="connsiteY5" fmla="*/ 94638 h 274638"/>
-              <a:gd name="connsiteX6" fmla="*/ 14145 w 360000"/>
-              <a:gd name="connsiteY6" fmla="*/ 24574 h 274638"/>
-            </a:gdLst>
-            <a:ahLst/>
-            <a:cxnLst>
-              <a:cxn ang="0">
-                <a:pos x="connsiteX0" y="connsiteY0"/>
-              </a:cxn>
-              <a:cxn ang="0">
-                <a:pos x="connsiteX1" y="connsiteY1"/>
-              </a:cxn>
-              <a:cxn ang="0">
-                <a:pos x="connsiteX2" y="connsiteY2"/>
-              </a:cxn>
-              <a:cxn ang="0">
-                <a:pos x="connsiteX3" y="connsiteY3"/>
-              </a:cxn>
-              <a:cxn ang="0">
-                <a:pos x="connsiteX4" y="connsiteY4"/>
-              </a:cxn>
-              <a:cxn ang="0">
-                <a:pos x="connsiteX5" y="connsiteY5"/>
-              </a:cxn>
-              <a:cxn ang="0">
-                <a:pos x="connsiteX6" y="connsiteY6"/>
-              </a:cxn>
-            </a:cxnLst>
-            <a:rect l="l" t="t" r="r" b="b"/>
-            <a:pathLst>
-              <a:path w="360000" h="274638">
-                <a:moveTo>
-                  <a:pt x="30714" y="0"/>
-                </a:moveTo>
-                <a:lnTo>
-                  <a:pt x="329286" y="0"/>
-                </a:lnTo>
-                <a:lnTo>
-                  <a:pt x="345855" y="24574"/>
-                </a:lnTo>
-                <a:cubicBezTo>
-                  <a:pt x="354963" y="46109"/>
-                  <a:pt x="360000" y="69785"/>
-                  <a:pt x="360000" y="94638"/>
-                </a:cubicBezTo>
-                <a:cubicBezTo>
-                  <a:pt x="360000" y="194049"/>
-                  <a:pt x="279411" y="274638"/>
-                  <a:pt x="180000" y="274638"/>
-                </a:cubicBezTo>
-                <a:cubicBezTo>
-                  <a:pt x="80589" y="274638"/>
-                  <a:pt x="0" y="194049"/>
-                  <a:pt x="0" y="94638"/>
-                </a:cubicBezTo>
-                <a:cubicBezTo>
-                  <a:pt x="0" y="69785"/>
-                  <a:pt x="5037" y="46109"/>
-                  <a:pt x="14145" y="24574"/>
-                </a:cubicBezTo>
-                <a:close/>
-              </a:path>
-            </a:pathLst>
-          </a:custGeom>
-          <a:gradFill flip="none" rotWithShape="1">
-            <a:gsLst>
-              <a:gs pos="100000">
-                <a:schemeClr val="bg2">
-                  <a:lumMod val="50000"/>
-                  <a:lumOff val="50000"/>
-                </a:schemeClr>
-              </a:gs>
-              <a:gs pos="60000">
-                <a:schemeClr val="bg2"/>
-              </a:gs>
-            </a:gsLst>
-            <a:path path="circle">
-              <a:fillToRect l="100000" b="100000"/>
-            </a:path>
-            <a:tileRect t="-100000" r="-100000"/>
-          </a:gradFill>
-          <a:ln>
-            <a:noFill/>
-          </a:ln>
-          <a:effectLst>
-            <a:innerShdw blurRad="127000" dist="63500" dir="2700000">
-              <a:schemeClr val="accent1">
-                <a:lumMod val="60000"/>
-                <a:lumOff val="40000"/>
-                <a:alpha val="20000"/>
-              </a:schemeClr>
-            </a:innerShdw>
-            <a:softEdge rad="0"/>
-          </a:effectLst>
-        </p:spPr>
-        <p:style>
-          <a:lnRef idx="2">
-            <a:schemeClr val="accent1">
-              <a:shade val="50000"/>
-            </a:schemeClr>
-          </a:lnRef>
-          <a:fillRef idx="1">
-            <a:schemeClr val="accent1"/>
-          </a:fillRef>
-          <a:effectRef idx="0">
-            <a:schemeClr val="accent1"/>
-          </a:effectRef>
-          <a:fontRef idx="minor">
-            <a:schemeClr val="lt1"/>
-          </a:fontRef>
-        </p:style>
-        <p:txBody>
-          <a:bodyPr rot="0" spcFirstLastPara="0" vertOverflow="overflow" horzOverflow="overflow" vert="horz" wrap="square" lIns="91440" tIns="45720" rIns="91440" bIns="45720" numCol="1" spcCol="0" rtlCol="0" fromWordArt="0" anchor="ctr" anchorCtr="0" forceAA="0" compatLnSpc="1">
-            <a:prstTxWarp prst="textNoShape">
-              <a:avLst/>
-            </a:prstTxWarp>
-            <a:noAutofit/>
-          </a:bodyPr>
-          <a:lstStyle/>
-          <a:p>
-            <a:pPr algn="ctr"/>
-            <a:endParaRPr lang="en-US"/>
-          </a:p>
-        </p:txBody>
-      </p:sp>
-    </p:spTree>
-    <p:extLst>
-      <p:ext uri="{BB962C8B-B14F-4D97-AF65-F5344CB8AC3E}">
-        <p14:creationId xmlns:p14="http://schemas.microsoft.com/office/powerpoint/2010/main" val="3891345585"/>
-      </p:ext>
-    </p:extLst>
-  </p:cSld>
-  <p:clrMapOvr>
-    <a:masterClrMapping/>
-  </p:clrMapOvr>
-</p:sld>
-</file>
-
-<file path=ppt/slides/slide8.xml><?xml version="1.0" encoding="utf-8"?>
-<p:sld xmlns:a="http://schemas.openxmlformats.org/drawingml/2006/main" xmlns:r="http://schemas.openxmlformats.org/officeDocument/2006/relationships" xmlns:p="http://schemas.openxmlformats.org/presentationml/2006/main">
-  <p:cSld>
-    <p:spTree>
-      <p:nvGrpSpPr>
-        <p:cNvPr id="1" name=""/>
-        <p:cNvGrpSpPr/>
-        <p:nvPr/>
-      </p:nvGrpSpPr>
-      <p:grpSpPr>
-        <a:xfrm>
-          <a:off x="0" y="0"/>
-          <a:ext cx="0" cy="0"/>
-          <a:chOff x="0" y="0"/>
-          <a:chExt cx="0" cy="0"/>
-        </a:xfrm>
-      </p:grpSpPr>
-      <p:sp>
-        <p:nvSpPr>
-          <p:cNvPr id="7" name="Title 6">
-            <a:extLst>
-              <a:ext uri="{FF2B5EF4-FFF2-40B4-BE49-F238E27FC236}">
-                <a16:creationId xmlns:a16="http://schemas.microsoft.com/office/drawing/2014/main" id="{47788B34-4190-4916-9048-47720EA5ABF1}"/>
-              </a:ext>
-            </a:extLst>
-          </p:cNvPr>
-          <p:cNvSpPr>
-            <a:spLocks noGrp="1"/>
-          </p:cNvSpPr>
-          <p:nvPr>
-            <p:ph type="title"/>
-          </p:nvPr>
-        </p:nvSpPr>
-        <p:spPr>
-          <a:xfrm>
-            <a:off x="550862" y="549275"/>
-            <a:ext cx="11097551" cy="1332000"/>
-          </a:xfrm>
-        </p:spPr>
-        <p:txBody>
-          <a:bodyPr/>
-          <a:lstStyle/>
-          <a:p>
-            <a:r>
-              <a:rPr lang="en-US" dirty="0"/>
-              <a:t>Content 2 </a:t>
-            </a:r>
-          </a:p>
-        </p:txBody>
-      </p:sp>
-      <p:sp>
-        <p:nvSpPr>
-          <p:cNvPr id="8" name="Text Placeholder 7">
-            <a:extLst>
-              <a:ext uri="{FF2B5EF4-FFF2-40B4-BE49-F238E27FC236}">
-                <a16:creationId xmlns:a16="http://schemas.microsoft.com/office/drawing/2014/main" id="{ABA415A0-3B77-43FB-A408-5F1DA4B0AAFA}"/>
-              </a:ext>
-            </a:extLst>
-          </p:cNvPr>
-          <p:cNvSpPr>
-            <a:spLocks noGrp="1"/>
-          </p:cNvSpPr>
-          <p:nvPr>
-            <p:ph type="body" idx="1"/>
-          </p:nvPr>
-        </p:nvSpPr>
-        <p:spPr>
-          <a:xfrm>
-            <a:off x="550864" y="1731375"/>
-            <a:ext cx="3563936" cy="535354"/>
-          </a:xfrm>
-        </p:spPr>
-        <p:txBody>
-          <a:bodyPr/>
-          <a:lstStyle/>
-          <a:p>
-            <a:r>
-              <a:rPr lang="en-US" dirty="0"/>
-              <a:t>Subtitle</a:t>
-            </a:r>
-          </a:p>
-        </p:txBody>
-      </p:sp>
-      <p:sp>
-        <p:nvSpPr>
-          <p:cNvPr id="9" name="Content Placeholder 8">
-            <a:extLst>
-              <a:ext uri="{FF2B5EF4-FFF2-40B4-BE49-F238E27FC236}">
-                <a16:creationId xmlns:a16="http://schemas.microsoft.com/office/drawing/2014/main" id="{8598ECEC-4413-4244-8F21-0076EC511806}"/>
-              </a:ext>
-            </a:extLst>
-          </p:cNvPr>
-          <p:cNvSpPr>
-            <a:spLocks noGrp="1"/>
-          </p:cNvSpPr>
-          <p:nvPr>
-            <p:ph sz="half" idx="2"/>
-          </p:nvPr>
-        </p:nvSpPr>
-        <p:spPr>
-          <a:xfrm>
-            <a:off x="559476" y="2432304"/>
-            <a:ext cx="3563936" cy="3515555"/>
-          </a:xfrm>
-        </p:spPr>
-        <p:txBody>
-          <a:bodyPr>
-            <a:normAutofit fontScale="92500" lnSpcReduction="20000"/>
-          </a:bodyPr>
-          <a:lstStyle/>
-          <a:p>
-            <a:pPr lvl="0"/>
-            <a:r>
-              <a:rPr lang="en-US" dirty="0"/>
-              <a:t>Add text, images, art, and videos. </a:t>
-            </a:r>
-          </a:p>
-          <a:p>
-            <a:pPr lvl="0"/>
-            <a:r>
-              <a:rPr lang="en-US" dirty="0"/>
-              <a:t>Add transitions, animations, and motion. </a:t>
-            </a:r>
-          </a:p>
-          <a:p>
-            <a:pPr lvl="0"/>
-            <a:r>
-              <a:rPr lang="en-US" dirty="0"/>
-              <a:t>Save to OneDrive, to get to your presentations from your computer, tablet, or phone. </a:t>
-            </a:r>
-          </a:p>
-          <a:p>
-            <a:r>
-              <a:rPr lang="en-US" dirty="0"/>
-              <a:t>Open the Design Ideas pane for instant slide makeovers. </a:t>
-            </a:r>
-          </a:p>
-          <a:p>
-            <a:r>
-              <a:rPr lang="en-US" dirty="0"/>
-              <a:t>When we have design ideas, we’ll show them to you right there. </a:t>
-            </a:r>
-          </a:p>
-          <a:p>
-            <a:pPr lvl="0"/>
-            <a:endParaRPr lang="en-US" dirty="0"/>
-          </a:p>
-          <a:p>
-            <a:endParaRPr lang="en-US" dirty="0"/>
-          </a:p>
-        </p:txBody>
-      </p:sp>
-      <p:sp>
-        <p:nvSpPr>
-          <p:cNvPr id="12" name="Text Placeholder 11">
-            <a:extLst>
-              <a:ext uri="{FF2B5EF4-FFF2-40B4-BE49-F238E27FC236}">
-                <a16:creationId xmlns:a16="http://schemas.microsoft.com/office/drawing/2014/main" id="{3A63626D-0E6E-4023-ABFC-A744C9862159}"/>
-              </a:ext>
-            </a:extLst>
-          </p:cNvPr>
-          <p:cNvSpPr>
-            <a:spLocks noGrp="1"/>
-          </p:cNvSpPr>
-          <p:nvPr>
-            <p:ph type="body" sz="quarter" idx="13"/>
-          </p:nvPr>
-        </p:nvSpPr>
-        <p:spPr>
-          <a:xfrm>
-            <a:off x="4341573" y="1731375"/>
-            <a:ext cx="3566160" cy="535354"/>
-          </a:xfrm>
-        </p:spPr>
-        <p:txBody>
-          <a:bodyPr/>
-          <a:lstStyle/>
-          <a:p>
-            <a:r>
-              <a:rPr lang="en-US" dirty="0"/>
-              <a:t>subtitle</a:t>
-            </a:r>
-          </a:p>
-        </p:txBody>
-      </p:sp>
-      <p:sp>
-        <p:nvSpPr>
-          <p:cNvPr id="13" name="Content Placeholder 12">
-            <a:extLst>
-              <a:ext uri="{FF2B5EF4-FFF2-40B4-BE49-F238E27FC236}">
-                <a16:creationId xmlns:a16="http://schemas.microsoft.com/office/drawing/2014/main" id="{258E9390-685C-4BAD-BFAD-EC56E81C4745}"/>
-              </a:ext>
-            </a:extLst>
-          </p:cNvPr>
-          <p:cNvSpPr>
-            <a:spLocks noGrp="1"/>
-          </p:cNvSpPr>
-          <p:nvPr>
-            <p:ph sz="quarter" idx="14"/>
-          </p:nvPr>
-        </p:nvSpPr>
-        <p:spPr>
-          <a:xfrm>
-            <a:off x="4341573" y="2427370"/>
-            <a:ext cx="3508755" cy="3515555"/>
-          </a:xfrm>
-        </p:spPr>
-        <p:txBody>
-          <a:bodyPr>
-            <a:normAutofit lnSpcReduction="10000"/>
-          </a:bodyPr>
-          <a:lstStyle/>
-          <a:p>
-            <a:pPr lvl="0"/>
-            <a:r>
-              <a:rPr lang="en-US" dirty="0"/>
-              <a:t>Add text, images, art, and videos. </a:t>
-            </a:r>
-          </a:p>
-          <a:p>
-            <a:pPr lvl="0"/>
-            <a:r>
-              <a:rPr lang="en-US" dirty="0"/>
-              <a:t>Add transitions, animations, and motion. </a:t>
-            </a:r>
-          </a:p>
-          <a:p>
-            <a:pPr lvl="0"/>
-            <a:r>
-              <a:rPr lang="en-US" dirty="0"/>
-              <a:t>Save to OneDrive, to get to your presentations from your computer, tablet, or phone. </a:t>
-            </a:r>
-          </a:p>
-          <a:p>
-            <a:r>
-              <a:rPr lang="en-US" dirty="0"/>
-              <a:t>Open the Design Ideas pane for instant slide makeovers. </a:t>
-            </a:r>
-          </a:p>
-          <a:p>
-            <a:r>
-              <a:rPr lang="en-US" dirty="0"/>
-              <a:t>When we have design ideas, we’ll show them to you right there.</a:t>
-            </a:r>
-          </a:p>
-        </p:txBody>
-      </p:sp>
-      <p:sp>
-        <p:nvSpPr>
-          <p:cNvPr id="10" name="Text Placeholder 9">
-            <a:extLst>
-              <a:ext uri="{FF2B5EF4-FFF2-40B4-BE49-F238E27FC236}">
-                <a16:creationId xmlns:a16="http://schemas.microsoft.com/office/drawing/2014/main" id="{34A9BC34-CFDB-4D7A-8D6C-1CE608D0909F}"/>
-              </a:ext>
-            </a:extLst>
-          </p:cNvPr>
-          <p:cNvSpPr>
-            <a:spLocks noGrp="1"/>
-          </p:cNvSpPr>
-          <p:nvPr>
-            <p:ph type="body" sz="quarter" idx="3"/>
-          </p:nvPr>
-        </p:nvSpPr>
-        <p:spPr>
-          <a:xfrm>
-            <a:off x="8139659" y="1731375"/>
-            <a:ext cx="3566160" cy="535354"/>
-          </a:xfrm>
-        </p:spPr>
-        <p:txBody>
-          <a:bodyPr/>
-          <a:lstStyle/>
-          <a:p>
-            <a:r>
-              <a:rPr lang="en-US"/>
-              <a:t>subtitle</a:t>
-            </a:r>
-            <a:endParaRPr lang="en-US" dirty="0"/>
-          </a:p>
-        </p:txBody>
-      </p:sp>
-      <p:sp>
-        <p:nvSpPr>
-          <p:cNvPr id="11" name="Content Placeholder 10">
-            <a:extLst>
-              <a:ext uri="{FF2B5EF4-FFF2-40B4-BE49-F238E27FC236}">
-                <a16:creationId xmlns:a16="http://schemas.microsoft.com/office/drawing/2014/main" id="{1D014E48-5DD9-49CE-AD5B-0FEF69204F68}"/>
-              </a:ext>
-            </a:extLst>
-          </p:cNvPr>
-          <p:cNvSpPr>
-            <a:spLocks noGrp="1"/>
-          </p:cNvSpPr>
-          <p:nvPr>
-            <p:ph sz="quarter" idx="4"/>
-          </p:nvPr>
-        </p:nvSpPr>
-        <p:spPr>
-          <a:xfrm>
-            <a:off x="8139659" y="2427370"/>
-            <a:ext cx="3508755" cy="3515555"/>
-          </a:xfrm>
-        </p:spPr>
-        <p:txBody>
-          <a:bodyPr>
-            <a:normAutofit lnSpcReduction="10000"/>
-          </a:bodyPr>
-          <a:lstStyle/>
-          <a:p>
-            <a:pPr lvl="0"/>
-            <a:r>
-              <a:rPr lang="en-US" dirty="0"/>
-              <a:t>Add text, images, art, and videos. </a:t>
-            </a:r>
-          </a:p>
-          <a:p>
-            <a:pPr lvl="0"/>
-            <a:r>
-              <a:rPr lang="en-US" dirty="0"/>
-              <a:t>Add transitions, animations, and motion. </a:t>
-            </a:r>
-          </a:p>
-          <a:p>
-            <a:pPr lvl="0"/>
-            <a:r>
-              <a:rPr lang="en-US" dirty="0"/>
-              <a:t>Save to OneDrive, to get to your presentations from your computer, tablet, or phone. </a:t>
-            </a:r>
-          </a:p>
-          <a:p>
-            <a:r>
-              <a:rPr lang="en-US" dirty="0"/>
-              <a:t>Open the Design Ideas pane for instant slide makeovers. </a:t>
-            </a:r>
-          </a:p>
-          <a:p>
-            <a:r>
-              <a:rPr lang="en-US" dirty="0"/>
-              <a:t>When we have design ideas, we’ll show them to you right there.</a:t>
-            </a:r>
-          </a:p>
-        </p:txBody>
-      </p:sp>
-      <p:sp>
-        <p:nvSpPr>
-          <p:cNvPr id="14" name="Date Placeholder 13">
-            <a:extLst>
-              <a:ext uri="{FF2B5EF4-FFF2-40B4-BE49-F238E27FC236}">
-                <a16:creationId xmlns:a16="http://schemas.microsoft.com/office/drawing/2014/main" id="{D236478C-E242-44E0-8357-C72C9B588CA7}"/>
-              </a:ext>
-            </a:extLst>
-          </p:cNvPr>
-          <p:cNvSpPr>
-            <a:spLocks noGrp="1"/>
-          </p:cNvSpPr>
-          <p:nvPr>
-            <p:ph type="dt" sz="half" idx="10"/>
-          </p:nvPr>
-        </p:nvSpPr>
-        <p:spPr>
-          <a:xfrm>
-            <a:off x="550863" y="6507212"/>
-            <a:ext cx="2628900" cy="153888"/>
-          </a:xfrm>
-        </p:spPr>
-        <p:txBody>
-          <a:bodyPr/>
-          <a:lstStyle/>
-          <a:p>
-            <a:r>
-              <a:rPr lang="en-US"/>
-              <a:t>Tuesday, February 2, 20XX</a:t>
-            </a:r>
-            <a:endParaRPr lang="en-US" dirty="0"/>
-          </a:p>
-        </p:txBody>
-      </p:sp>
-      <p:sp>
-        <p:nvSpPr>
-          <p:cNvPr id="15" name="Footer Placeholder 14">
-            <a:extLst>
-              <a:ext uri="{FF2B5EF4-FFF2-40B4-BE49-F238E27FC236}">
-                <a16:creationId xmlns:a16="http://schemas.microsoft.com/office/drawing/2014/main" id="{65A6DC02-681E-4AF7-AC6E-57CDDB2FBA28}"/>
-              </a:ext>
-            </a:extLst>
-          </p:cNvPr>
-          <p:cNvSpPr>
-            <a:spLocks noGrp="1"/>
-          </p:cNvSpPr>
-          <p:nvPr>
-            <p:ph type="ftr" sz="quarter" idx="11"/>
-          </p:nvPr>
-        </p:nvSpPr>
-        <p:spPr>
-          <a:xfrm>
-            <a:off x="3359150" y="6507212"/>
-            <a:ext cx="6379210" cy="153888"/>
-          </a:xfrm>
-        </p:spPr>
-        <p:txBody>
-          <a:bodyPr/>
-          <a:lstStyle/>
-          <a:p>
-            <a:r>
-              <a:rPr lang="en-US"/>
-              <a:t>Sample Footer Text</a:t>
-            </a:r>
-          </a:p>
-        </p:txBody>
-      </p:sp>
-      <p:sp>
-        <p:nvSpPr>
-          <p:cNvPr id="16" name="Slide Number Placeholder 15">
-            <a:extLst>
-              <a:ext uri="{FF2B5EF4-FFF2-40B4-BE49-F238E27FC236}">
-                <a16:creationId xmlns:a16="http://schemas.microsoft.com/office/drawing/2014/main" id="{CF0A8666-4477-461C-A79D-E91232EE973E}"/>
-              </a:ext>
-            </a:extLst>
-          </p:cNvPr>
-          <p:cNvSpPr>
-            <a:spLocks noGrp="1"/>
-          </p:cNvSpPr>
-          <p:nvPr>
-            <p:ph type="sldNum" sz="quarter" idx="12"/>
-          </p:nvPr>
-        </p:nvSpPr>
-        <p:spPr>
-          <a:xfrm>
-            <a:off x="9948863" y="6507212"/>
-            <a:ext cx="1692274" cy="153888"/>
-          </a:xfrm>
-        </p:spPr>
-        <p:txBody>
-          <a:bodyPr/>
-          <a:lstStyle/>
-          <a:p>
-            <a:fld id="{DBA1B0FB-D917-4C8C-928F-313BD683BF39}" type="slidenum">
-              <a:rPr lang="en-US" smtClean="0"/>
-              <a:pPr/>
-              <a:t>8</a:t>
-            </a:fld>
-            <a:endParaRPr lang="en-US"/>
-          </a:p>
-        </p:txBody>
-      </p:sp>
-    </p:spTree>
-    <p:extLst>
-      <p:ext uri="{BB962C8B-B14F-4D97-AF65-F5344CB8AC3E}">
-        <p14:creationId xmlns:p14="http://schemas.microsoft.com/office/powerpoint/2010/main" val="1420547054"/>
-      </p:ext>
-    </p:extLst>
-  </p:cSld>
-  <p:clrMapOvr>
-    <a:masterClrMapping/>
-  </p:clrMapOvr>
-</p:sld>
-</file>
-
-<file path=ppt/slides/slide9.xml><?xml version="1.0" encoding="utf-8"?>
-<p:sld xmlns:a="http://schemas.openxmlformats.org/drawingml/2006/main" xmlns:r="http://schemas.openxmlformats.org/officeDocument/2006/relationships" xmlns:p="http://schemas.openxmlformats.org/presentationml/2006/main">
-  <p:cSld>
-    <p:spTree>
-      <p:nvGrpSpPr>
-        <p:cNvPr id="1" name=""/>
-        <p:cNvGrpSpPr/>
-        <p:nvPr/>
-      </p:nvGrpSpPr>
-      <p:grpSpPr>
-        <a:xfrm>
-          <a:off x="0" y="0"/>
-          <a:ext cx="0" cy="0"/>
-          <a:chOff x="0" y="0"/>
-          <a:chExt cx="0" cy="0"/>
-        </a:xfrm>
-      </p:grpSpPr>
-      <p:sp>
-        <p:nvSpPr>
-          <p:cNvPr id="11" name="Title 10">
-            <a:extLst>
-              <a:ext uri="{FF2B5EF4-FFF2-40B4-BE49-F238E27FC236}">
-                <a16:creationId xmlns:a16="http://schemas.microsoft.com/office/drawing/2014/main" id="{581E8936-2270-47FE-94A4-398CB123EF90}"/>
-              </a:ext>
-            </a:extLst>
-          </p:cNvPr>
-          <p:cNvSpPr>
-            <a:spLocks noGrp="1"/>
-          </p:cNvSpPr>
-          <p:nvPr>
-            <p:ph type="title"/>
-          </p:nvPr>
-        </p:nvSpPr>
-        <p:spPr>
-          <a:xfrm>
-            <a:off x="550863" y="4508500"/>
-            <a:ext cx="4500562" cy="1562959"/>
-          </a:xfrm>
-        </p:spPr>
-        <p:txBody>
-          <a:bodyPr/>
-          <a:lstStyle/>
-          <a:p>
-            <a:r>
-              <a:rPr lang="en-US" dirty="0"/>
-              <a:t>Summary</a:t>
-            </a:r>
-          </a:p>
-        </p:txBody>
-      </p:sp>
-      <p:pic>
-        <p:nvPicPr>
-          <p:cNvPr id="16" name="Picture Placeholder 15" descr="Data Points Digital background">
-            <a:extLst>
-              <a:ext uri="{FF2B5EF4-FFF2-40B4-BE49-F238E27FC236}">
-                <a16:creationId xmlns:a16="http://schemas.microsoft.com/office/drawing/2014/main" id="{361E9ADB-7377-4CF1-9AE4-AEFBDEBEEEEC}"/>
-              </a:ext>
-            </a:extLst>
-          </p:cNvPr>
-          <p:cNvPicPr>
-            <a:picLocks noGrp="1" noChangeAspect="1"/>
-          </p:cNvPicPr>
-          <p:nvPr>
-            <p:ph type="pic" sz="quarter" idx="13"/>
-          </p:nvPr>
-        </p:nvPicPr>
-        <p:blipFill rotWithShape="1">
-          <a:blip r:embed="rId3" cstate="screen">
-            <a:extLst>
-              <a:ext uri="{28A0092B-C50C-407E-A947-70E740481C1C}">
-                <a14:useLocalDpi xmlns:a14="http://schemas.microsoft.com/office/drawing/2010/main" val="0"/>
-              </a:ext>
-            </a:extLst>
-          </a:blip>
-          <a:srcRect/>
-          <a:stretch/>
-        </p:blipFill>
-        <p:spPr>
-          <a:xfrm>
-            <a:off x="0" y="0"/>
-            <a:ext cx="12192000" cy="3776472"/>
-          </a:xfrm>
-        </p:spPr>
-      </p:pic>
-      <p:sp>
-        <p:nvSpPr>
-          <p:cNvPr id="13" name="Content Placeholder 12">
-            <a:extLst>
-              <a:ext uri="{FF2B5EF4-FFF2-40B4-BE49-F238E27FC236}">
-                <a16:creationId xmlns:a16="http://schemas.microsoft.com/office/drawing/2014/main" id="{C0287FEC-3826-4868-8D93-52429C6156F5}"/>
-              </a:ext>
-            </a:extLst>
-          </p:cNvPr>
-          <p:cNvSpPr>
-            <a:spLocks noGrp="1"/>
-          </p:cNvSpPr>
-          <p:nvPr>
-            <p:ph sz="quarter" idx="15"/>
-          </p:nvPr>
-        </p:nvSpPr>
-        <p:spPr>
-          <a:xfrm>
-            <a:off x="5262411" y="4508500"/>
-            <a:ext cx="6221412" cy="1563688"/>
-          </a:xfrm>
-        </p:spPr>
-        <p:txBody>
-          <a:bodyPr>
-            <a:normAutofit lnSpcReduction="10000"/>
-          </a:bodyPr>
-          <a:lstStyle/>
-          <a:p>
-            <a:r>
-              <a:rPr lang="en-US" dirty="0"/>
-              <a:t>With PowerPoint, you can create presentations and share your work with others, wherever they are. Type the text you want here to get started. You can also add images, art, and videos on this template. Save to OneDrive and access your presentations from your computer, tablet, or phone. </a:t>
-            </a:r>
-          </a:p>
-        </p:txBody>
-      </p:sp>
-      <p:sp>
-        <p:nvSpPr>
-          <p:cNvPr id="4" name="Date Placeholder 3">
-            <a:extLst>
-              <a:ext uri="{FF2B5EF4-FFF2-40B4-BE49-F238E27FC236}">
-                <a16:creationId xmlns:a16="http://schemas.microsoft.com/office/drawing/2014/main" id="{0C329F70-04F7-4C70-BCF8-D4371F54EF2F}"/>
-              </a:ext>
-            </a:extLst>
-          </p:cNvPr>
-          <p:cNvSpPr>
-            <a:spLocks noGrp="1"/>
-          </p:cNvSpPr>
-          <p:nvPr>
-            <p:ph type="dt" sz="half" idx="10"/>
-          </p:nvPr>
-        </p:nvSpPr>
-        <p:spPr>
-          <a:xfrm>
-            <a:off x="550863" y="6507212"/>
-            <a:ext cx="2628900" cy="153888"/>
-          </a:xfrm>
-        </p:spPr>
-        <p:txBody>
-          <a:bodyPr/>
-          <a:lstStyle/>
-          <a:p>
-            <a:r>
-              <a:rPr lang="en-US"/>
-              <a:t>Tuesday, February 2, 20XX</a:t>
-            </a:r>
-            <a:endParaRPr lang="en-US" dirty="0"/>
-          </a:p>
-        </p:txBody>
-      </p:sp>
-      <p:sp>
-        <p:nvSpPr>
-          <p:cNvPr id="5" name="Footer Placeholder 4">
-            <a:extLst>
-              <a:ext uri="{FF2B5EF4-FFF2-40B4-BE49-F238E27FC236}">
-                <a16:creationId xmlns:a16="http://schemas.microsoft.com/office/drawing/2014/main" id="{06A3302E-502D-4151-81C9-5FD6AF9596D6}"/>
-              </a:ext>
-            </a:extLst>
-          </p:cNvPr>
-          <p:cNvSpPr>
-            <a:spLocks noGrp="1"/>
-          </p:cNvSpPr>
-          <p:nvPr>
-            <p:ph type="ftr" sz="quarter" idx="11"/>
-          </p:nvPr>
-        </p:nvSpPr>
-        <p:spPr>
-          <a:xfrm>
-            <a:off x="3359150" y="6507212"/>
-            <a:ext cx="6379210" cy="153888"/>
-          </a:xfrm>
-        </p:spPr>
-        <p:txBody>
-          <a:bodyPr/>
-          <a:lstStyle/>
-          <a:p>
-            <a:r>
-              <a:rPr lang="en-US"/>
-              <a:t>Sample Footer Text</a:t>
-            </a:r>
-          </a:p>
-        </p:txBody>
-      </p:sp>
-      <p:sp>
-        <p:nvSpPr>
-          <p:cNvPr id="6" name="Slide Number Placeholder 5">
-            <a:extLst>
-              <a:ext uri="{FF2B5EF4-FFF2-40B4-BE49-F238E27FC236}">
-                <a16:creationId xmlns:a16="http://schemas.microsoft.com/office/drawing/2014/main" id="{9ED907F8-C614-4D59-A03F-BF9CD5E35703}"/>
-              </a:ext>
-            </a:extLst>
-          </p:cNvPr>
-          <p:cNvSpPr>
-            <a:spLocks noGrp="1"/>
-          </p:cNvSpPr>
-          <p:nvPr>
-            <p:ph type="sldNum" sz="quarter" idx="12"/>
-          </p:nvPr>
-        </p:nvSpPr>
-        <p:spPr>
-          <a:xfrm>
-            <a:off x="9948863" y="6507212"/>
-            <a:ext cx="1692274" cy="153888"/>
-          </a:xfrm>
-        </p:spPr>
-        <p:txBody>
-          <a:bodyPr/>
-          <a:lstStyle/>
-          <a:p>
-            <a:fld id="{DBA1B0FB-D917-4C8C-928F-313BD683BF39}" type="slidenum">
-              <a:rPr lang="en-US" smtClean="0"/>
-              <a:pPr/>
-              <a:t>9</a:t>
-            </a:fld>
-            <a:endParaRPr lang="en-US"/>
-          </a:p>
-        </p:txBody>
-      </p:sp>
-    </p:spTree>
-    <p:extLst>
-      <p:ext uri="{BB962C8B-B14F-4D97-AF65-F5344CB8AC3E}">
-        <p14:creationId xmlns:p14="http://schemas.microsoft.com/office/powerpoint/2010/main" val="3521561301"/>
       </p:ext>
     </p:extLst>
   </p:cSld>
@@ -24343,6 +25961,15 @@
 </file>
 
 <file path=customXml/item1.xml><?xml version="1.0" encoding="utf-8"?>
+<?mso-contentType ?>
+<FormTemplates xmlns="http://schemas.microsoft.com/sharepoint/v3/contenttype/forms">
+  <Display>DocumentLibraryForm</Display>
+  <Edit>DocumentLibraryForm</Edit>
+  <New>DocumentLibraryForm</New>
+</FormTemplates>
+</file>
+
+<file path=customXml/item2.xml><?xml version="1.0" encoding="utf-8"?>
 <p:properties xmlns:p="http://schemas.microsoft.com/office/2006/metadata/properties" xmlns:xsi="http://www.w3.org/2001/XMLSchema-instance" xmlns:pc="http://schemas.microsoft.com/office/infopath/2007/PartnerControls">
   <documentManagement>
     <_ip_UnifiedCompliancePolicyUIAction xmlns="http://schemas.microsoft.com/sharepoint/v3" xsi:nil="true"/>
@@ -24359,15 +25986,6 @@
     <MediaServiceKeyPoints xmlns="71af3243-3dd4-4a8d-8c0d-dd76da1f02a5" xsi:nil="true"/>
   </documentManagement>
 </p:properties>
-</file>
-
-<file path=customXml/item2.xml><?xml version="1.0" encoding="utf-8"?>
-<?mso-contentType ?>
-<FormTemplates xmlns="http://schemas.microsoft.com/sharepoint/v3/contenttype/forms">
-  <Display>DocumentLibraryForm</Display>
-  <Edit>DocumentLibraryForm</Edit>
-  <New>DocumentLibraryForm</New>
-</FormTemplates>
 </file>
 
 <file path=customXml/item3.xml><?xml version="1.0" encoding="utf-8"?>
@@ -24647,6 +26265,14 @@
 </file>
 
 <file path=customXml/itemProps1.xml><?xml version="1.0" encoding="utf-8"?>
+<ds:datastoreItem xmlns:ds="http://schemas.openxmlformats.org/officeDocument/2006/customXml" ds:itemID="{904751AB-E840-446F-8D49-E697067EC887}">
+  <ds:schemaRefs>
+    <ds:schemaRef ds:uri="http://schemas.microsoft.com/sharepoint/v3/contenttype/forms"/>
+  </ds:schemaRefs>
+</ds:datastoreItem>
+</file>
+
+<file path=customXml/itemProps2.xml><?xml version="1.0" encoding="utf-8"?>
 <ds:datastoreItem xmlns:ds="http://schemas.openxmlformats.org/officeDocument/2006/customXml" ds:itemID="{50811A92-D464-4AC4-A396-BA73B10CEEAC}">
   <ds:schemaRefs>
     <ds:schemaRef ds:uri="http://schemas.microsoft.com/office/2006/metadata/properties"/>
@@ -24654,14 +26280,6 @@
     <ds:schemaRef ds:uri="http://schemas.microsoft.com/sharepoint/v3"/>
     <ds:schemaRef ds:uri="71af3243-3dd4-4a8d-8c0d-dd76da1f02a5"/>
     <ds:schemaRef ds:uri="230e9df3-be65-4c73-a93b-d1236ebd677e"/>
-  </ds:schemaRefs>
-</ds:datastoreItem>
-</file>
-
-<file path=customXml/itemProps2.xml><?xml version="1.0" encoding="utf-8"?>
-<ds:datastoreItem xmlns:ds="http://schemas.openxmlformats.org/officeDocument/2006/customXml" ds:itemID="{904751AB-E840-446F-8D49-E697067EC887}">
-  <ds:schemaRefs>
-    <ds:schemaRef ds:uri="http://schemas.microsoft.com/sharepoint/v3/contenttype/forms"/>
   </ds:schemaRefs>
 </ds:datastoreItem>
 </file>

</xml_diff>